<commit_message>
updated presentation and saved some figures
</commit_message>
<xml_diff>
--- a/Presentation/Presentation_draft.pptx
+++ b/Presentation/Presentation_draft.pptx
@@ -5,7 +5,7 @@
     <p:sldMasterId id="2147483685" r:id="rId4"/>
   </p:sldMasterIdLst>
   <p:notesMasterIdLst>
-    <p:notesMasterId r:id="rId17"/>
+    <p:notesMasterId r:id="rId21"/>
   </p:notesMasterIdLst>
   <p:sldIdLst>
     <p:sldId id="256" r:id="rId5"/>
@@ -15,11 +15,15 @@
     <p:sldId id="261" r:id="rId9"/>
     <p:sldId id="264" r:id="rId10"/>
     <p:sldId id="262" r:id="rId11"/>
-    <p:sldId id="263" r:id="rId12"/>
-    <p:sldId id="265" r:id="rId13"/>
-    <p:sldId id="266" r:id="rId14"/>
-    <p:sldId id="267" r:id="rId15"/>
-    <p:sldId id="268" r:id="rId16"/>
+    <p:sldId id="272" r:id="rId12"/>
+    <p:sldId id="273" r:id="rId13"/>
+    <p:sldId id="263" r:id="rId14"/>
+    <p:sldId id="265" r:id="rId15"/>
+    <p:sldId id="266" r:id="rId16"/>
+    <p:sldId id="267" r:id="rId17"/>
+    <p:sldId id="271" r:id="rId18"/>
+    <p:sldId id="269" r:id="rId19"/>
+    <p:sldId id="268" r:id="rId20"/>
   </p:sldIdLst>
   <p:sldSz cx="12192000" cy="6858000"/>
   <p:notesSz cx="6858000" cy="9144000"/>
@@ -1113,6 +1117,13 @@
         </dgm:presLayoutVars>
       </dgm:prSet>
       <dgm:spPr/>
+      <dgm:t>
+        <a:bodyPr/>
+        <a:lstStyle/>
+        <a:p>
+          <a:endParaRPr lang="en-US"/>
+        </a:p>
+      </dgm:t>
     </dgm:pt>
     <dgm:pt modelId="{82A510AF-C8D6-4485-BA39-D9F72DC5FEA3}" type="pres">
       <dgm:prSet presAssocID="{69E4A25E-F95B-4337-80E0-5EF100D3E056}" presName="dummy" presStyleCnt="0"/>
@@ -1125,10 +1136,24 @@
         </dgm:presLayoutVars>
       </dgm:prSet>
       <dgm:spPr/>
+      <dgm:t>
+        <a:bodyPr/>
+        <a:lstStyle/>
+        <a:p>
+          <a:endParaRPr lang="en-US"/>
+        </a:p>
+      </dgm:t>
     </dgm:pt>
     <dgm:pt modelId="{588FAB03-9982-40BA-8038-E23529257094}" type="pres">
       <dgm:prSet presAssocID="{8CCDE618-BB92-4DC4-803B-C7AAB9D28F25}" presName="sibTrans" presStyleLbl="node1" presStyleIdx="0" presStyleCnt="5"/>
       <dgm:spPr/>
+      <dgm:t>
+        <a:bodyPr/>
+        <a:lstStyle/>
+        <a:p>
+          <a:endParaRPr lang="en-US"/>
+        </a:p>
+      </dgm:t>
     </dgm:pt>
     <dgm:pt modelId="{DFFC6596-A7D7-408C-925F-EA3045B74FC5}" type="pres">
       <dgm:prSet presAssocID="{7C3276A6-2382-40C4-9BA4-CBE8733F1A4D}" presName="dummy" presStyleCnt="0"/>
@@ -1141,10 +1166,24 @@
         </dgm:presLayoutVars>
       </dgm:prSet>
       <dgm:spPr/>
+      <dgm:t>
+        <a:bodyPr/>
+        <a:lstStyle/>
+        <a:p>
+          <a:endParaRPr lang="en-US"/>
+        </a:p>
+      </dgm:t>
     </dgm:pt>
     <dgm:pt modelId="{AAD8481C-290B-48E3-BA78-6662703126BD}" type="pres">
       <dgm:prSet presAssocID="{E6ACEB1C-33B6-4EA7-9740-559D04C19F8A}" presName="sibTrans" presStyleLbl="node1" presStyleIdx="1" presStyleCnt="5"/>
       <dgm:spPr/>
+      <dgm:t>
+        <a:bodyPr/>
+        <a:lstStyle/>
+        <a:p>
+          <a:endParaRPr lang="en-US"/>
+        </a:p>
+      </dgm:t>
     </dgm:pt>
     <dgm:pt modelId="{BAD986B7-432B-4270-80BB-C07054CB9863}" type="pres">
       <dgm:prSet presAssocID="{E9F45950-754A-4801-BC05-AF412EED09F1}" presName="dummy" presStyleCnt="0"/>
@@ -1168,6 +1207,13 @@
     <dgm:pt modelId="{B8145B59-6CB0-4C69-8ACD-99E23D2ADC21}" type="pres">
       <dgm:prSet presAssocID="{3520DB36-3E73-4E40-93D9-3E0F2E94FB04}" presName="sibTrans" presStyleLbl="node1" presStyleIdx="2" presStyleCnt="5"/>
       <dgm:spPr/>
+      <dgm:t>
+        <a:bodyPr/>
+        <a:lstStyle/>
+        <a:p>
+          <a:endParaRPr lang="en-US"/>
+        </a:p>
+      </dgm:t>
     </dgm:pt>
     <dgm:pt modelId="{53F0AC98-6257-4687-96BC-22F555DE6C31}" type="pres">
       <dgm:prSet presAssocID="{A9E0E4A8-D191-4E38-95F8-7423DB8D801A}" presName="dummy" presStyleCnt="0"/>
@@ -1191,6 +1237,13 @@
     <dgm:pt modelId="{34F37970-415A-424E-85D6-5E279655BBF7}" type="pres">
       <dgm:prSet presAssocID="{62EE23A0-CC72-42D6-84F6-0E292FED3C6D}" presName="sibTrans" presStyleLbl="node1" presStyleIdx="3" presStyleCnt="5"/>
       <dgm:spPr/>
+      <dgm:t>
+        <a:bodyPr/>
+        <a:lstStyle/>
+        <a:p>
+          <a:endParaRPr lang="en-US"/>
+        </a:p>
+      </dgm:t>
     </dgm:pt>
     <dgm:pt modelId="{43945035-83DE-48B7-915C-4A849C74365A}" type="pres">
       <dgm:prSet presAssocID="{D7954394-3201-4B32-AFEC-9AF5D03BB555}" presName="dummy" presStyleCnt="0"/>
@@ -1203,10 +1256,24 @@
         </dgm:presLayoutVars>
       </dgm:prSet>
       <dgm:spPr/>
+      <dgm:t>
+        <a:bodyPr/>
+        <a:lstStyle/>
+        <a:p>
+          <a:endParaRPr lang="en-US"/>
+        </a:p>
+      </dgm:t>
     </dgm:pt>
     <dgm:pt modelId="{38B6899E-80D7-4B88-86BD-842065AEAB40}" type="pres">
       <dgm:prSet presAssocID="{B1E72209-6C81-4D87-B320-6100A21F9FC4}" presName="sibTrans" presStyleLbl="node1" presStyleIdx="4" presStyleCnt="5"/>
       <dgm:spPr/>
+      <dgm:t>
+        <a:bodyPr/>
+        <a:lstStyle/>
+        <a:p>
+          <a:endParaRPr lang="en-US"/>
+        </a:p>
+      </dgm:t>
     </dgm:pt>
   </dgm:ptLst>
   <dgm:cxnLst>
@@ -3574,7 +3641,7 @@
           <a:p>
             <a:fld id="{F09D8E69-1E5C-4075-A2AB-1D2B8D4679AB}" type="datetimeFigureOut">
               <a:rPr lang="en-US" smtClean="0"/>
-              <a:t>9/16/2021</a:t>
+              <a:t>9/18/2021</a:t>
             </a:fld>
             <a:endParaRPr lang="en-US"/>
           </a:p>
@@ -4030,7 +4097,7 @@
           <a:p>
             <a:fld id="{C4FB36FD-63E9-4B21-B460-CBDD71FD9678}" type="slidenum">
               <a:rPr lang="en-US" smtClean="0"/>
-              <a:t>9</a:t>
+              <a:t>11</a:t>
             </a:fld>
             <a:endParaRPr lang="en-US"/>
           </a:p>
@@ -4316,7 +4383,7 @@
           <a:p>
             <a:fld id="{9184DA70-C731-4C70-880D-CCD4705E623C}" type="datetime1">
               <a:rPr lang="en-US" noProof="0" smtClean="0"/>
-              <a:t>9/16/2021</a:t>
+              <a:t>9/18/2021</a:t>
             </a:fld>
             <a:endParaRPr lang="en-US" noProof="0" dirty="0"/>
           </a:p>
@@ -4437,7 +4504,7 @@
           <a:p>
             <a:fld id="{39667345-2558-425A-8533-9BFDBCE15005}" type="datetime1">
               <a:rPr lang="en-US" noProof="0" smtClean="0"/>
-              <a:t>9/16/2021</a:t>
+              <a:t>9/18/2021</a:t>
             </a:fld>
             <a:endParaRPr lang="en-US" noProof="0" dirty="0"/>
           </a:p>
@@ -4826,7 +4893,7 @@
           <a:p>
             <a:fld id="{39667345-2558-425A-8533-9BFDBCE15005}" type="datetime1">
               <a:rPr lang="en-US" noProof="0" smtClean="0"/>
-              <a:t>9/16/2021</a:t>
+              <a:t>9/18/2021</a:t>
             </a:fld>
             <a:endParaRPr lang="en-US" noProof="0" dirty="0"/>
           </a:p>
@@ -5664,7 +5731,7 @@
           <a:p>
             <a:fld id="{4907D986-8816-4272-A432-0437A28A9828}" type="datetime1">
               <a:rPr lang="en-US" noProof="0" smtClean="0"/>
-              <a:t>9/16/2021</a:t>
+              <a:t>9/18/2021</a:t>
             </a:fld>
             <a:endParaRPr lang="en-US" noProof="0" dirty="0"/>
           </a:p>
@@ -5998,7 +6065,7 @@
           <a:p>
             <a:fld id="{9184DA70-C731-4C70-880D-CCD4705E623C}" type="datetime1">
               <a:rPr lang="en-US" noProof="0" smtClean="0"/>
-              <a:t>9/16/2021</a:t>
+              <a:t>9/18/2021</a:t>
             </a:fld>
             <a:endParaRPr lang="en-US" noProof="0" dirty="0"/>
           </a:p>
@@ -6307,7 +6374,7 @@
           <a:p>
             <a:fld id="{4BE1D723-8F53-4F53-90B0-1982A396982E}" type="datetime1">
               <a:rPr lang="en-US" noProof="0" smtClean="0"/>
-              <a:t>9/16/2021</a:t>
+              <a:t>9/18/2021</a:t>
             </a:fld>
             <a:endParaRPr lang="en-US" noProof="0" dirty="0"/>
           </a:p>
@@ -6902,7 +6969,7 @@
           <a:p>
             <a:fld id="{D9DF0F1C-5577-4ACB-BB62-DF8F3C494C7E}" type="datetime1">
               <a:rPr lang="en-US" noProof="0" smtClean="0"/>
-              <a:t>9/16/2021</a:t>
+              <a:t>9/18/2021</a:t>
             </a:fld>
             <a:endParaRPr lang="en-US" noProof="0" dirty="0"/>
           </a:p>
@@ -7165,7 +7232,7 @@
           <a:p>
             <a:fld id="{1775B394-D9F9-4F0C-B15D-605F45CB9E9F}" type="datetime1">
               <a:rPr lang="en-US" noProof="0" smtClean="0"/>
-              <a:t>9/16/2021</a:t>
+              <a:t>9/18/2021</a:t>
             </a:fld>
             <a:endParaRPr lang="en-US" noProof="0" dirty="0"/>
           </a:p>
@@ -7428,7 +7495,7 @@
           <a:p>
             <a:fld id="{1775B394-D9F9-4F0C-B15D-605F45CB9E9F}" type="datetime1">
               <a:rPr lang="en-US" noProof="0" smtClean="0"/>
-              <a:t>9/16/2021</a:t>
+              <a:t>9/18/2021</a:t>
             </a:fld>
             <a:endParaRPr lang="en-US" noProof="0" dirty="0"/>
           </a:p>
@@ -7945,7 +8012,7 @@
           <a:p>
             <a:fld id="{39667345-2558-425A-8533-9BFDBCE15005}" type="datetime1">
               <a:rPr lang="en-US" noProof="0" smtClean="0"/>
-              <a:t>9/16/2021</a:t>
+              <a:t>9/18/2021</a:t>
             </a:fld>
             <a:endParaRPr lang="en-US" noProof="0" dirty="0"/>
           </a:p>
@@ -8066,7 +8133,7 @@
           <a:p>
             <a:fld id="{39667345-2558-425A-8533-9BFDBCE15005}" type="datetime1">
               <a:rPr lang="en-US" noProof="0" smtClean="0"/>
-              <a:t>9/16/2021</a:t>
+              <a:t>9/18/2021</a:t>
             </a:fld>
             <a:endParaRPr lang="en-US" noProof="0" dirty="0"/>
           </a:p>
@@ -8499,7 +8566,7 @@
           <a:p>
             <a:fld id="{39667345-2558-425A-8533-9BFDBCE15005}" type="datetime1">
               <a:rPr lang="en-US" noProof="0" smtClean="0"/>
-              <a:t>9/16/2021</a:t>
+              <a:t>9/18/2021</a:t>
             </a:fld>
             <a:endParaRPr lang="en-US" noProof="0" dirty="0"/>
           </a:p>
@@ -9043,7 +9110,7 @@
           <a:p>
             <a:fld id="{62D6E202-B606-4609-B914-27C9371A1F6D}" type="datetime1">
               <a:rPr lang="en-US" noProof="0" smtClean="0"/>
-              <a:t>9/16/2021</a:t>
+              <a:t>9/18/2021</a:t>
             </a:fld>
             <a:endParaRPr lang="en-US" noProof="0" dirty="0"/>
           </a:p>
@@ -9593,6 +9660,368 @@
 </file>
 
 <file path=ppt/slides/slide10.xml><?xml version="1.0" encoding="utf-8"?>
+<p:sld xmlns:a="http://schemas.openxmlformats.org/drawingml/2006/main" xmlns:r="http://schemas.openxmlformats.org/officeDocument/2006/relationships" xmlns:p="http://schemas.openxmlformats.org/presentationml/2006/main">
+  <p:cSld>
+    <p:spTree>
+      <p:nvGrpSpPr>
+        <p:cNvPr id="1" name=""/>
+        <p:cNvGrpSpPr/>
+        <p:nvPr/>
+      </p:nvGrpSpPr>
+      <p:grpSpPr>
+        <a:xfrm>
+          <a:off x="0" y="0"/>
+          <a:ext cx="0" cy="0"/>
+          <a:chOff x="0" y="0"/>
+          <a:chExt cx="0" cy="0"/>
+        </a:xfrm>
+      </p:grpSpPr>
+      <p:pic>
+        <p:nvPicPr>
+          <p:cNvPr id="4" name="Content Placeholder 3"/>
+          <p:cNvPicPr>
+            <a:picLocks noGrp="1" noChangeAspect="1"/>
+          </p:cNvPicPr>
+          <p:nvPr>
+            <p:ph idx="1"/>
+          </p:nvPr>
+        </p:nvPicPr>
+        <p:blipFill>
+          <a:blip r:embed="rId2">
+            <a:extLst>
+              <a:ext uri="{28A0092B-C50C-407E-A947-70E740481C1C}">
+                <a14:useLocalDpi xmlns:a14="http://schemas.microsoft.com/office/drawing/2010/main" val="0"/>
+              </a:ext>
+            </a:extLst>
+          </a:blip>
+          <a:stretch>
+            <a:fillRect/>
+          </a:stretch>
+        </p:blipFill>
+        <p:spPr>
+          <a:xfrm>
+            <a:off x="3476762" y="2133600"/>
+            <a:ext cx="5299436" cy="3569286"/>
+          </a:xfrm>
+        </p:spPr>
+      </p:pic>
+      <p:sp>
+        <p:nvSpPr>
+          <p:cNvPr id="3" name="Title 2"/>
+          <p:cNvSpPr>
+            <a:spLocks noGrp="1"/>
+          </p:cNvSpPr>
+          <p:nvPr>
+            <p:ph type="title"/>
+          </p:nvPr>
+        </p:nvSpPr>
+        <p:spPr>
+          <a:xfrm>
+            <a:off x="1097280" y="942871"/>
+            <a:ext cx="10058400" cy="919796"/>
+          </a:xfrm>
+        </p:spPr>
+        <p:txBody>
+          <a:bodyPr>
+            <a:noAutofit/>
+          </a:bodyPr>
+          <a:lstStyle/>
+          <a:p>
+            <a:r>
+              <a:rPr lang="en-US" dirty="0" smtClean="0"/>
+              <a:t>States: discrepancy between percent reporting poor mental health and those with a diagnosis of depression</a:t>
+            </a:r>
+            <a:endParaRPr lang="en-US" dirty="0"/>
+          </a:p>
+        </p:txBody>
+      </p:sp>
+      <p:sp>
+        <p:nvSpPr>
+          <p:cNvPr id="5" name="TextBox 4"/>
+          <p:cNvSpPr txBox="1"/>
+          <p:nvPr/>
+        </p:nvSpPr>
+        <p:spPr>
+          <a:xfrm>
+            <a:off x="5638801" y="5702886"/>
+            <a:ext cx="1233030" cy="369332"/>
+          </a:xfrm>
+          <a:prstGeom prst="rect">
+            <a:avLst/>
+          </a:prstGeom>
+        </p:spPr>
+        <p:style>
+          <a:lnRef idx="2">
+            <a:schemeClr val="dk1"/>
+          </a:lnRef>
+          <a:fillRef idx="1">
+            <a:schemeClr val="lt1"/>
+          </a:fillRef>
+          <a:effectRef idx="0">
+            <a:schemeClr val="dk1"/>
+          </a:effectRef>
+          <a:fontRef idx="minor">
+            <a:schemeClr val="dk1"/>
+          </a:fontRef>
+        </p:style>
+        <p:txBody>
+          <a:bodyPr wrap="none" rtlCol="0">
+            <a:spAutoFit/>
+          </a:bodyPr>
+          <a:lstStyle/>
+          <a:p>
+            <a:r>
+              <a:rPr lang="en-US" dirty="0" smtClean="0"/>
+              <a:t>R</a:t>
+            </a:r>
+            <a:r>
+              <a:rPr lang="en-US" baseline="30000" dirty="0" smtClean="0"/>
+              <a:t>2</a:t>
+            </a:r>
+            <a:r>
+              <a:rPr lang="en-US" dirty="0" smtClean="0"/>
+              <a:t>= 0.088</a:t>
+            </a:r>
+            <a:endParaRPr lang="en-US" dirty="0"/>
+          </a:p>
+        </p:txBody>
+      </p:sp>
+    </p:spTree>
+    <p:extLst>
+      <p:ext uri="{BB962C8B-B14F-4D97-AF65-F5344CB8AC3E}">
+        <p14:creationId xmlns:p14="http://schemas.microsoft.com/office/powerpoint/2010/main" val="1572569241"/>
+      </p:ext>
+    </p:extLst>
+  </p:cSld>
+  <p:clrMapOvr>
+    <a:masterClrMapping/>
+  </p:clrMapOvr>
+</p:sld>
+</file>
+
+<file path=ppt/slides/slide11.xml><?xml version="1.0" encoding="utf-8"?>
+<p:sld xmlns:a="http://schemas.openxmlformats.org/drawingml/2006/main" xmlns:r="http://schemas.openxmlformats.org/officeDocument/2006/relationships" xmlns:p="http://schemas.openxmlformats.org/presentationml/2006/main">
+  <p:cSld>
+    <p:spTree>
+      <p:nvGrpSpPr>
+        <p:cNvPr id="1" name=""/>
+        <p:cNvGrpSpPr/>
+        <p:nvPr/>
+      </p:nvGrpSpPr>
+      <p:grpSpPr>
+        <a:xfrm>
+          <a:off x="0" y="0"/>
+          <a:ext cx="0" cy="0"/>
+          <a:chOff x="0" y="0"/>
+          <a:chExt cx="0" cy="0"/>
+        </a:xfrm>
+      </p:grpSpPr>
+      <p:sp>
+        <p:nvSpPr>
+          <p:cNvPr id="3" name="Title 2"/>
+          <p:cNvSpPr>
+            <a:spLocks noGrp="1"/>
+          </p:cNvSpPr>
+          <p:nvPr>
+            <p:ph type="title"/>
+          </p:nvPr>
+        </p:nvSpPr>
+        <p:spPr>
+          <a:xfrm>
+            <a:off x="1097280" y="942871"/>
+            <a:ext cx="10058400" cy="919796"/>
+          </a:xfrm>
+        </p:spPr>
+        <p:txBody>
+          <a:bodyPr>
+            <a:noAutofit/>
+          </a:bodyPr>
+          <a:lstStyle/>
+          <a:p>
+            <a:r>
+              <a:rPr lang="en-US" dirty="0" smtClean="0"/>
+              <a:t>No correlation between Mental Illness and Unemployment at the state level</a:t>
+            </a:r>
+            <a:endParaRPr lang="en-US" dirty="0"/>
+          </a:p>
+        </p:txBody>
+      </p:sp>
+      <p:sp>
+        <p:nvSpPr>
+          <p:cNvPr id="5" name="TextBox 4"/>
+          <p:cNvSpPr txBox="1"/>
+          <p:nvPr/>
+        </p:nvSpPr>
+        <p:spPr>
+          <a:xfrm>
+            <a:off x="3183468" y="5518659"/>
+            <a:ext cx="1189749" cy="369332"/>
+          </a:xfrm>
+          <a:prstGeom prst="rect">
+            <a:avLst/>
+          </a:prstGeom>
+        </p:spPr>
+        <p:style>
+          <a:lnRef idx="2">
+            <a:schemeClr val="dk1"/>
+          </a:lnRef>
+          <a:fillRef idx="1">
+            <a:schemeClr val="lt1"/>
+          </a:fillRef>
+          <a:effectRef idx="0">
+            <a:schemeClr val="dk1"/>
+          </a:effectRef>
+          <a:fontRef idx="minor">
+            <a:schemeClr val="dk1"/>
+          </a:fontRef>
+        </p:style>
+        <p:txBody>
+          <a:bodyPr wrap="none" rtlCol="0">
+            <a:spAutoFit/>
+          </a:bodyPr>
+          <a:lstStyle/>
+          <a:p>
+            <a:r>
+              <a:rPr lang="en-US" dirty="0" smtClean="0"/>
+              <a:t>R</a:t>
+            </a:r>
+            <a:r>
+              <a:rPr lang="en-US" baseline="30000" dirty="0" smtClean="0"/>
+              <a:t>2</a:t>
+            </a:r>
+            <a:r>
+              <a:rPr lang="en-US" dirty="0" smtClean="0"/>
+              <a:t>= 0.061</a:t>
+            </a:r>
+            <a:endParaRPr lang="en-US" dirty="0"/>
+          </a:p>
+        </p:txBody>
+      </p:sp>
+      <p:sp>
+        <p:nvSpPr>
+          <p:cNvPr id="8" name="TextBox 7"/>
+          <p:cNvSpPr txBox="1"/>
+          <p:nvPr/>
+        </p:nvSpPr>
+        <p:spPr>
+          <a:xfrm>
+            <a:off x="8297334" y="5518659"/>
+            <a:ext cx="1189749" cy="369332"/>
+          </a:xfrm>
+          <a:prstGeom prst="rect">
+            <a:avLst/>
+          </a:prstGeom>
+        </p:spPr>
+        <p:style>
+          <a:lnRef idx="2">
+            <a:schemeClr val="dk1"/>
+          </a:lnRef>
+          <a:fillRef idx="1">
+            <a:schemeClr val="lt1"/>
+          </a:fillRef>
+          <a:effectRef idx="0">
+            <a:schemeClr val="dk1"/>
+          </a:effectRef>
+          <a:fontRef idx="minor">
+            <a:schemeClr val="dk1"/>
+          </a:fontRef>
+        </p:style>
+        <p:txBody>
+          <a:bodyPr wrap="none" rtlCol="0">
+            <a:spAutoFit/>
+          </a:bodyPr>
+          <a:lstStyle/>
+          <a:p>
+            <a:r>
+              <a:rPr lang="en-US" dirty="0" smtClean="0"/>
+              <a:t>R</a:t>
+            </a:r>
+            <a:r>
+              <a:rPr lang="en-US" baseline="30000" dirty="0" smtClean="0"/>
+              <a:t>2</a:t>
+            </a:r>
+            <a:r>
+              <a:rPr lang="en-US" dirty="0" smtClean="0"/>
+              <a:t>= 0.002</a:t>
+            </a:r>
+            <a:endParaRPr lang="en-US" dirty="0"/>
+          </a:p>
+        </p:txBody>
+      </p:sp>
+      <p:pic>
+        <p:nvPicPr>
+          <p:cNvPr id="2" name="Picture 1"/>
+          <p:cNvPicPr>
+            <a:picLocks noChangeAspect="1"/>
+          </p:cNvPicPr>
+          <p:nvPr/>
+        </p:nvPicPr>
+        <p:blipFill>
+          <a:blip r:embed="rId3">
+            <a:extLst>
+              <a:ext uri="{28A0092B-C50C-407E-A947-70E740481C1C}">
+                <a14:useLocalDpi xmlns:a14="http://schemas.microsoft.com/office/drawing/2010/main" val="0"/>
+              </a:ext>
+            </a:extLst>
+          </a:blip>
+          <a:stretch>
+            <a:fillRect/>
+          </a:stretch>
+        </p:blipFill>
+        <p:spPr>
+          <a:xfrm>
+            <a:off x="944337" y="2112287"/>
+            <a:ext cx="4850793" cy="3377778"/>
+          </a:xfrm>
+          <a:prstGeom prst="rect">
+            <a:avLst/>
+          </a:prstGeom>
+        </p:spPr>
+      </p:pic>
+      <p:pic>
+        <p:nvPicPr>
+          <p:cNvPr id="4" name="Picture 3"/>
+          <p:cNvPicPr>
+            <a:picLocks noChangeAspect="1"/>
+          </p:cNvPicPr>
+          <p:nvPr/>
+        </p:nvPicPr>
+        <p:blipFill>
+          <a:blip r:embed="rId4">
+            <a:extLst>
+              <a:ext uri="{28A0092B-C50C-407E-A947-70E740481C1C}">
+                <a14:useLocalDpi xmlns:a14="http://schemas.microsoft.com/office/drawing/2010/main" val="0"/>
+              </a:ext>
+            </a:extLst>
+          </a:blip>
+          <a:stretch>
+            <a:fillRect/>
+          </a:stretch>
+        </p:blipFill>
+        <p:spPr>
+          <a:xfrm>
+            <a:off x="6126480" y="2191675"/>
+            <a:ext cx="4850793" cy="3326984"/>
+          </a:xfrm>
+          <a:prstGeom prst="rect">
+            <a:avLst/>
+          </a:prstGeom>
+        </p:spPr>
+      </p:pic>
+    </p:spTree>
+    <p:extLst>
+      <p:ext uri="{BB962C8B-B14F-4D97-AF65-F5344CB8AC3E}">
+        <p14:creationId xmlns:p14="http://schemas.microsoft.com/office/powerpoint/2010/main" val="3235081919"/>
+      </p:ext>
+    </p:extLst>
+  </p:cSld>
+  <p:clrMapOvr>
+    <a:masterClrMapping/>
+  </p:clrMapOvr>
+</p:sld>
+</file>
+
+<file path=ppt/slides/slide12.xml><?xml version="1.0" encoding="utf-8"?>
 <p:sld xmlns:a="http://schemas.openxmlformats.org/drawingml/2006/main" xmlns:r="http://schemas.openxmlformats.org/officeDocument/2006/relationships" xmlns:p="http://schemas.openxmlformats.org/presentationml/2006/main">
   <p:cSld>
     <p:spTree>
@@ -10751,7 +11180,7 @@
 </p:sld>
 </file>
 
-<file path=ppt/slides/slide11.xml><?xml version="1.0" encoding="utf-8"?>
+<file path=ppt/slides/slide13.xml><?xml version="1.0" encoding="utf-8"?>
 <p:sld xmlns:a="http://schemas.openxmlformats.org/drawingml/2006/main" xmlns:r="http://schemas.openxmlformats.org/officeDocument/2006/relationships" xmlns:p="http://schemas.openxmlformats.org/presentationml/2006/main">
   <p:cSld>
     <p:spTree>
@@ -11910,7 +12339,371 @@
 </p:sld>
 </file>
 
-<file path=ppt/slides/slide12.xml><?xml version="1.0" encoding="utf-8"?>
+<file path=ppt/slides/slide14.xml><?xml version="1.0" encoding="utf-8"?>
+<p:sld xmlns:a="http://schemas.openxmlformats.org/drawingml/2006/main" xmlns:r="http://schemas.openxmlformats.org/officeDocument/2006/relationships" xmlns:p="http://schemas.openxmlformats.org/presentationml/2006/main">
+  <p:cSld>
+    <p:spTree>
+      <p:nvGrpSpPr>
+        <p:cNvPr id="1" name=""/>
+        <p:cNvGrpSpPr/>
+        <p:nvPr/>
+      </p:nvGrpSpPr>
+      <p:grpSpPr>
+        <a:xfrm>
+          <a:off x="0" y="0"/>
+          <a:ext cx="0" cy="0"/>
+          <a:chOff x="0" y="0"/>
+          <a:chExt cx="0" cy="0"/>
+        </a:xfrm>
+      </p:grpSpPr>
+      <p:pic>
+        <p:nvPicPr>
+          <p:cNvPr id="4" name="Content Placeholder 3"/>
+          <p:cNvPicPr>
+            <a:picLocks noGrp="1" noChangeAspect="1"/>
+          </p:cNvPicPr>
+          <p:nvPr>
+            <p:ph idx="1"/>
+          </p:nvPr>
+        </p:nvPicPr>
+        <p:blipFill>
+          <a:blip r:embed="rId2">
+            <a:extLst>
+              <a:ext uri="{28A0092B-C50C-407E-A947-70E740481C1C}">
+                <a14:useLocalDpi xmlns:a14="http://schemas.microsoft.com/office/drawing/2010/main" val="0"/>
+              </a:ext>
+            </a:extLst>
+          </a:blip>
+          <a:stretch>
+            <a:fillRect/>
+          </a:stretch>
+        </p:blipFill>
+        <p:spPr>
+          <a:xfrm>
+            <a:off x="863071" y="2490500"/>
+            <a:ext cx="5029200" cy="2839063"/>
+          </a:xfrm>
+        </p:spPr>
+      </p:pic>
+      <p:sp>
+        <p:nvSpPr>
+          <p:cNvPr id="3" name="Title 2"/>
+          <p:cNvSpPr>
+            <a:spLocks noGrp="1"/>
+          </p:cNvSpPr>
+          <p:nvPr>
+            <p:ph type="title"/>
+          </p:nvPr>
+        </p:nvSpPr>
+        <p:spPr>
+          <a:xfrm>
+            <a:off x="1097280" y="942871"/>
+            <a:ext cx="10058400" cy="868996"/>
+          </a:xfrm>
+        </p:spPr>
+        <p:txBody>
+          <a:bodyPr>
+            <a:normAutofit fontScale="90000"/>
+          </a:bodyPr>
+          <a:lstStyle/>
+          <a:p>
+            <a:r>
+              <a:rPr lang="en-US" dirty="0" smtClean="0"/>
+              <a:t>Geographically, high rates of unemployment correlate with clustered areas of poor mental health</a:t>
+            </a:r>
+            <a:endParaRPr lang="en-US" dirty="0"/>
+          </a:p>
+        </p:txBody>
+      </p:sp>
+      <p:pic>
+        <p:nvPicPr>
+          <p:cNvPr id="5" name="Picture 4"/>
+          <p:cNvPicPr>
+            <a:picLocks noChangeAspect="1"/>
+          </p:cNvPicPr>
+          <p:nvPr/>
+        </p:nvPicPr>
+        <p:blipFill>
+          <a:blip r:embed="rId3">
+            <a:extLst>
+              <a:ext uri="{28A0092B-C50C-407E-A947-70E740481C1C}">
+                <a14:useLocalDpi xmlns:a14="http://schemas.microsoft.com/office/drawing/2010/main" val="0"/>
+              </a:ext>
+            </a:extLst>
+          </a:blip>
+          <a:stretch>
+            <a:fillRect/>
+          </a:stretch>
+        </p:blipFill>
+        <p:spPr>
+          <a:xfrm>
+            <a:off x="6278880" y="2490500"/>
+            <a:ext cx="5029200" cy="2839063"/>
+          </a:xfrm>
+          <a:prstGeom prst="rect">
+            <a:avLst/>
+          </a:prstGeom>
+        </p:spPr>
+      </p:pic>
+      <p:sp>
+        <p:nvSpPr>
+          <p:cNvPr id="6" name="TextBox 5"/>
+          <p:cNvSpPr txBox="1"/>
+          <p:nvPr/>
+        </p:nvSpPr>
+        <p:spPr>
+          <a:xfrm>
+            <a:off x="1598177" y="2121168"/>
+            <a:ext cx="3558988" cy="369332"/>
+          </a:xfrm>
+          <a:prstGeom prst="rect">
+            <a:avLst/>
+          </a:prstGeom>
+          <a:noFill/>
+        </p:spPr>
+        <p:txBody>
+          <a:bodyPr wrap="none" rtlCol="0">
+            <a:spAutoFit/>
+          </a:bodyPr>
+          <a:lstStyle/>
+          <a:p>
+            <a:pPr algn="ctr"/>
+            <a:r>
+              <a:rPr lang="en-US" dirty="0" smtClean="0"/>
+              <a:t>Percent Unemployed by State</a:t>
+            </a:r>
+            <a:endParaRPr lang="en-US" dirty="0"/>
+          </a:p>
+        </p:txBody>
+      </p:sp>
+      <p:sp>
+        <p:nvSpPr>
+          <p:cNvPr id="7" name="TextBox 6"/>
+          <p:cNvSpPr txBox="1"/>
+          <p:nvPr/>
+        </p:nvSpPr>
+        <p:spPr>
+          <a:xfrm>
+            <a:off x="6278880" y="2108736"/>
+            <a:ext cx="5073825" cy="369332"/>
+          </a:xfrm>
+          <a:prstGeom prst="rect">
+            <a:avLst/>
+          </a:prstGeom>
+          <a:noFill/>
+        </p:spPr>
+        <p:txBody>
+          <a:bodyPr wrap="none" rtlCol="0">
+            <a:spAutoFit/>
+          </a:bodyPr>
+          <a:lstStyle/>
+          <a:p>
+            <a:pPr algn="ctr"/>
+            <a:r>
+              <a:rPr lang="en-US" dirty="0" smtClean="0"/>
+              <a:t>Percent Report Poor Mental Health by State</a:t>
+            </a:r>
+            <a:endParaRPr lang="en-US" dirty="0"/>
+          </a:p>
+        </p:txBody>
+      </p:sp>
+    </p:spTree>
+    <p:extLst>
+      <p:ext uri="{BB962C8B-B14F-4D97-AF65-F5344CB8AC3E}">
+        <p14:creationId xmlns:p14="http://schemas.microsoft.com/office/powerpoint/2010/main" val="4228216414"/>
+      </p:ext>
+    </p:extLst>
+  </p:cSld>
+  <p:clrMapOvr>
+    <a:masterClrMapping/>
+  </p:clrMapOvr>
+</p:sld>
+</file>
+
+<file path=ppt/slides/slide15.xml><?xml version="1.0" encoding="utf-8"?>
+<p:sld xmlns:a="http://schemas.openxmlformats.org/drawingml/2006/main" xmlns:r="http://schemas.openxmlformats.org/officeDocument/2006/relationships" xmlns:p="http://schemas.openxmlformats.org/presentationml/2006/main">
+  <p:cSld>
+    <p:spTree>
+      <p:nvGrpSpPr>
+        <p:cNvPr id="1" name=""/>
+        <p:cNvGrpSpPr/>
+        <p:nvPr/>
+      </p:nvGrpSpPr>
+      <p:grpSpPr>
+        <a:xfrm>
+          <a:off x="0" y="0"/>
+          <a:ext cx="0" cy="0"/>
+          <a:chOff x="0" y="0"/>
+          <a:chExt cx="0" cy="0"/>
+        </a:xfrm>
+      </p:grpSpPr>
+      <p:pic>
+        <p:nvPicPr>
+          <p:cNvPr id="4" name="Content Placeholder 3"/>
+          <p:cNvPicPr>
+            <a:picLocks noGrp="1" noChangeAspect="1"/>
+          </p:cNvPicPr>
+          <p:nvPr>
+            <p:ph idx="1"/>
+          </p:nvPr>
+        </p:nvPicPr>
+        <p:blipFill>
+          <a:blip r:embed="rId2">
+            <a:extLst>
+              <a:ext uri="{28A0092B-C50C-407E-A947-70E740481C1C}">
+                <a14:useLocalDpi xmlns:a14="http://schemas.microsoft.com/office/drawing/2010/main" val="0"/>
+              </a:ext>
+            </a:extLst>
+          </a:blip>
+          <a:stretch>
+            <a:fillRect/>
+          </a:stretch>
+        </p:blipFill>
+        <p:spPr>
+          <a:xfrm>
+            <a:off x="1275687" y="2240436"/>
+            <a:ext cx="4850793" cy="3326984"/>
+          </a:xfrm>
+        </p:spPr>
+      </p:pic>
+      <p:sp>
+        <p:nvSpPr>
+          <p:cNvPr id="3" name="Title 2"/>
+          <p:cNvSpPr>
+            <a:spLocks noGrp="1"/>
+          </p:cNvSpPr>
+          <p:nvPr>
+            <p:ph type="title"/>
+          </p:nvPr>
+        </p:nvSpPr>
+        <p:spPr>
+          <a:xfrm>
+            <a:off x="1097280" y="942870"/>
+            <a:ext cx="10058400" cy="1038329"/>
+          </a:xfrm>
+        </p:spPr>
+        <p:txBody>
+          <a:bodyPr>
+            <a:normAutofit fontScale="90000"/>
+          </a:bodyPr>
+          <a:lstStyle/>
+          <a:p>
+            <a:r>
+              <a:rPr lang="en-US" dirty="0" smtClean="0"/>
+              <a:t>At the state level, not a strong correlation between poor mental health and access to mental health care</a:t>
+            </a:r>
+            <a:endParaRPr lang="en-US" dirty="0"/>
+          </a:p>
+        </p:txBody>
+      </p:sp>
+      <p:pic>
+        <p:nvPicPr>
+          <p:cNvPr id="5" name="Picture 4"/>
+          <p:cNvPicPr>
+            <a:picLocks noChangeAspect="1"/>
+          </p:cNvPicPr>
+          <p:nvPr/>
+        </p:nvPicPr>
+        <p:blipFill>
+          <a:blip r:embed="rId3">
+            <a:clrChange>
+              <a:clrFrom>
+                <a:srgbClr val="FFFFFF"/>
+              </a:clrFrom>
+              <a:clrTo>
+                <a:srgbClr val="FFFFFF">
+                  <a:alpha val="0"/>
+                </a:srgbClr>
+              </a:clrTo>
+            </a:clrChange>
+          </a:blip>
+          <a:stretch>
+            <a:fillRect/>
+          </a:stretch>
+        </p:blipFill>
+        <p:spPr>
+          <a:xfrm>
+            <a:off x="6211447" y="2240436"/>
+            <a:ext cx="4944233" cy="3531595"/>
+          </a:xfrm>
+          <a:prstGeom prst="rect">
+            <a:avLst/>
+          </a:prstGeom>
+        </p:spPr>
+      </p:pic>
+      <p:sp>
+        <p:nvSpPr>
+          <p:cNvPr id="6" name="TextBox 5"/>
+          <p:cNvSpPr txBox="1"/>
+          <p:nvPr/>
+        </p:nvSpPr>
+        <p:spPr>
+          <a:xfrm>
+            <a:off x="6881247" y="2055770"/>
+            <a:ext cx="4047903" cy="369332"/>
+          </a:xfrm>
+          <a:prstGeom prst="rect">
+            <a:avLst/>
+          </a:prstGeom>
+          <a:noFill/>
+        </p:spPr>
+        <p:txBody>
+          <a:bodyPr wrap="none" rtlCol="0">
+            <a:spAutoFit/>
+          </a:bodyPr>
+          <a:lstStyle/>
+          <a:p>
+            <a:r>
+              <a:rPr lang="en-US" dirty="0" smtClean="0"/>
+              <a:t>Access to Care Ranking MHA 2020</a:t>
+            </a:r>
+            <a:endParaRPr lang="en-US" dirty="0"/>
+          </a:p>
+        </p:txBody>
+      </p:sp>
+      <p:sp>
+        <p:nvSpPr>
+          <p:cNvPr id="7" name="TextBox 6"/>
+          <p:cNvSpPr txBox="1"/>
+          <p:nvPr/>
+        </p:nvSpPr>
+        <p:spPr>
+          <a:xfrm>
+            <a:off x="6192849" y="5956697"/>
+            <a:ext cx="5421677" cy="246221"/>
+          </a:xfrm>
+          <a:prstGeom prst="rect">
+            <a:avLst/>
+          </a:prstGeom>
+          <a:noFill/>
+        </p:spPr>
+        <p:txBody>
+          <a:bodyPr wrap="none" rtlCol="0">
+            <a:spAutoFit/>
+          </a:bodyPr>
+          <a:lstStyle/>
+          <a:p>
+            <a:r>
+              <a:rPr lang="en-US" sz="1000" dirty="0"/>
+              <a:t>https://mhanational.org/issues/2020/mental-health-america-access-care-data#one</a:t>
+            </a:r>
+          </a:p>
+        </p:txBody>
+      </p:sp>
+    </p:spTree>
+    <p:extLst>
+      <p:ext uri="{BB962C8B-B14F-4D97-AF65-F5344CB8AC3E}">
+        <p14:creationId xmlns:p14="http://schemas.microsoft.com/office/powerpoint/2010/main" val="1446036977"/>
+      </p:ext>
+    </p:extLst>
+  </p:cSld>
+  <p:clrMapOvr>
+    <a:masterClrMapping/>
+  </p:clrMapOvr>
+</p:sld>
+</file>
+
+<file path=ppt/slides/slide16.xml><?xml version="1.0" encoding="utf-8"?>
 <p:sld xmlns:a="http://schemas.openxmlformats.org/drawingml/2006/main" xmlns:r="http://schemas.openxmlformats.org/officeDocument/2006/relationships" xmlns:p="http://schemas.openxmlformats.org/presentationml/2006/main">
   <p:cSld>
     <p:spTree>
@@ -11942,10 +12735,6 @@
           <a:bodyPr/>
           <a:lstStyle/>
           <a:p>
-            <a:r>
-              <a:rPr lang="en-US" dirty="0" smtClean="0"/>
-              <a:t>&lt;Need map and access to mental health care analysis&gt;</a:t>
-            </a:r>
             <a:endParaRPr lang="en-US" dirty="0"/>
           </a:p>
         </p:txBody>
@@ -11965,7 +12754,11 @@
           <a:bodyPr/>
           <a:lstStyle/>
           <a:p>
-            <a:endParaRPr lang="en-US"/>
+            <a:r>
+              <a:rPr lang="en-US" dirty="0" smtClean="0"/>
+              <a:t>Findings Summary</a:t>
+            </a:r>
+            <a:endParaRPr lang="en-US" dirty="0"/>
           </a:p>
         </p:txBody>
       </p:sp>
@@ -12039,15 +12832,7 @@
           <a:p>
             <a:r>
               <a:rPr lang="en-US" dirty="0" smtClean="0"/>
-              <a:t>4</a:t>
-            </a:r>
-            <a:r>
-              <a:rPr lang="en-US" dirty="0" smtClean="0"/>
-              <a:t>. Geographic analysis using </a:t>
-            </a:r>
-            <a:r>
-              <a:rPr lang="en-US" dirty="0" smtClean="0"/>
-              <a:t>MHA data and </a:t>
+              <a:t>4. Geographic analysis using MHA data and </a:t>
             </a:r>
             <a:r>
               <a:rPr lang="en-US" dirty="0" err="1" smtClean="0"/>
@@ -12492,7 +13277,18 @@
             <a:pPr lvl="1"/>
             <a:r>
               <a:rPr lang="en-US" dirty="0" smtClean="0"/>
-              <a:t>aggregated state-level data on various behavioral and demographic factors</a:t>
+              <a:t>aggregated state-level data on various behavioral and demographic </a:t>
+            </a:r>
+            <a:r>
+              <a:rPr lang="en-US" dirty="0" smtClean="0"/>
+              <a:t>factors</a:t>
+            </a:r>
+          </a:p>
+          <a:p>
+            <a:pPr lvl="1"/>
+            <a:r>
+              <a:rPr lang="en-US" dirty="0" smtClean="0"/>
+              <a:t>NOTE: New Jersey is excluded for not meeting minimum data requirements</a:t>
             </a:r>
             <a:endParaRPr lang="en-US" dirty="0"/>
           </a:p>
@@ -12913,536 +13709,100 @@
           </a:p>
         </p:txBody>
       </p:sp>
-      <p:graphicFrame>
-        <p:nvGraphicFramePr>
-          <p:cNvPr id="6" name="Content Placeholder 3"/>
-          <p:cNvGraphicFramePr>
-            <a:graphicFrameLocks/>
-          </p:cNvGraphicFramePr>
-          <p:nvPr>
-            <p:extLst>
-              <p:ext uri="{D42A27DB-BD31-4B8C-83A1-F6EECF244321}">
-                <p14:modId xmlns:p14="http://schemas.microsoft.com/office/powerpoint/2010/main" val="1104481243"/>
-              </p:ext>
-            </p:extLst>
-          </p:nvPr>
-        </p:nvGraphicFramePr>
-        <p:xfrm>
-          <a:off x="6126480" y="2260600"/>
-          <a:ext cx="4504100" cy="1112520"/>
-        </p:xfrm>
-        <a:graphic>
-          <a:graphicData uri="http://schemas.openxmlformats.org/drawingml/2006/table">
-            <a:tbl>
-              <a:tblPr firstRow="1" bandRow="1">
-                <a:tableStyleId>{5C22544A-7EE6-4342-B048-85BDC9FD1C3A}</a:tableStyleId>
-              </a:tblPr>
-              <a:tblGrid>
-                <a:gridCol w="1678305">
-                  <a:extLst>
-                    <a:ext uri="{9D8B030D-6E8A-4147-A177-3AD203B41FA5}">
-                      <a16:colId xmlns:a16="http://schemas.microsoft.com/office/drawing/2014/main" val="4057277645"/>
-                    </a:ext>
-                  </a:extLst>
-                </a:gridCol>
-                <a:gridCol w="895668">
-                  <a:extLst>
-                    <a:ext uri="{9D8B030D-6E8A-4147-A177-3AD203B41FA5}">
-                      <a16:colId xmlns:a16="http://schemas.microsoft.com/office/drawing/2014/main" val="3700732752"/>
-                    </a:ext>
-                  </a:extLst>
-                </a:gridCol>
-                <a:gridCol w="1930127">
-                  <a:extLst>
-                    <a:ext uri="{9D8B030D-6E8A-4147-A177-3AD203B41FA5}">
-                      <a16:colId xmlns:a16="http://schemas.microsoft.com/office/drawing/2014/main" val="3451909123"/>
-                    </a:ext>
-                  </a:extLst>
-                </a:gridCol>
-              </a:tblGrid>
-              <a:tr h="370840">
-                <a:tc>
-                  <a:txBody>
-                    <a:bodyPr/>
-                    <a:lstStyle/>
-                    <a:p>
-                      <a:endParaRPr lang="en-US" dirty="0">
-                        <a:solidFill>
-                          <a:schemeClr val="tx1"/>
-                        </a:solidFill>
-                      </a:endParaRPr>
-                    </a:p>
-                  </a:txBody>
-                  <a:tcPr/>
-                </a:tc>
-                <a:tc>
-                  <a:txBody>
-                    <a:bodyPr/>
-                    <a:lstStyle/>
-                    <a:p>
-                      <a:r>
-                        <a:rPr lang="en-US" dirty="0" smtClean="0">
-                          <a:solidFill>
-                            <a:schemeClr val="tx1"/>
-                          </a:solidFill>
-                        </a:rPr>
-                        <a:t>No MI</a:t>
-                      </a:r>
-                      <a:endParaRPr lang="en-US" dirty="0">
-                        <a:solidFill>
-                          <a:schemeClr val="tx1"/>
-                        </a:solidFill>
-                      </a:endParaRPr>
-                    </a:p>
-                  </a:txBody>
-                  <a:tcPr/>
-                </a:tc>
-                <a:tc>
-                  <a:txBody>
-                    <a:bodyPr/>
-                    <a:lstStyle/>
-                    <a:p>
-                      <a:r>
-                        <a:rPr lang="en-US" dirty="0" smtClean="0">
-                          <a:solidFill>
-                            <a:schemeClr val="tx1"/>
-                          </a:solidFill>
-                        </a:rPr>
-                        <a:t>Diagnosed</a:t>
-                      </a:r>
-                      <a:r>
-                        <a:rPr lang="en-US" baseline="0" dirty="0" smtClean="0">
-                          <a:solidFill>
-                            <a:schemeClr val="tx1"/>
-                          </a:solidFill>
-                        </a:rPr>
-                        <a:t> MI</a:t>
-                      </a:r>
-                      <a:endParaRPr lang="en-US" dirty="0">
-                        <a:solidFill>
-                          <a:schemeClr val="tx1"/>
-                        </a:solidFill>
-                      </a:endParaRPr>
-                    </a:p>
-                  </a:txBody>
-                  <a:tcPr/>
-                </a:tc>
-                <a:extLst>
-                  <a:ext uri="{0D108BD9-81ED-4DB2-BD59-A6C34878D82A}">
-                    <a16:rowId xmlns:a16="http://schemas.microsoft.com/office/drawing/2014/main" val="1263015633"/>
-                  </a:ext>
-                </a:extLst>
-              </a:tr>
-              <a:tr h="370840">
-                <a:tc>
-                  <a:txBody>
-                    <a:bodyPr/>
-                    <a:lstStyle/>
-                    <a:p>
-                      <a:r>
-                        <a:rPr lang="en-US" dirty="0" smtClean="0">
-                          <a:solidFill>
-                            <a:schemeClr val="tx1"/>
-                          </a:solidFill>
-                        </a:rPr>
-                        <a:t>Employed</a:t>
-                      </a:r>
-                    </a:p>
-                  </a:txBody>
-                  <a:tcPr/>
-                </a:tc>
-                <a:tc>
-                  <a:txBody>
-                    <a:bodyPr/>
-                    <a:lstStyle/>
-                    <a:p>
-                      <a:r>
-                        <a:rPr lang="en-US" dirty="0" smtClean="0">
-                          <a:solidFill>
-                            <a:schemeClr val="tx1"/>
-                          </a:solidFill>
-                        </a:rPr>
-                        <a:t>79%</a:t>
-                      </a:r>
-                      <a:endParaRPr lang="en-US" dirty="0">
-                        <a:solidFill>
-                          <a:schemeClr val="tx1"/>
-                        </a:solidFill>
-                      </a:endParaRPr>
-                    </a:p>
-                  </a:txBody>
-                  <a:tcPr/>
-                </a:tc>
-                <a:tc>
-                  <a:txBody>
-                    <a:bodyPr/>
-                    <a:lstStyle/>
-                    <a:p>
-                      <a:r>
-                        <a:rPr lang="en-US" dirty="0" smtClean="0">
-                          <a:solidFill>
-                            <a:schemeClr val="tx1"/>
-                          </a:solidFill>
-                        </a:rPr>
-                        <a:t>20%</a:t>
-                      </a:r>
-                      <a:endParaRPr lang="en-US" dirty="0">
-                        <a:solidFill>
-                          <a:schemeClr val="tx1"/>
-                        </a:solidFill>
-                      </a:endParaRPr>
-                    </a:p>
-                  </a:txBody>
-                  <a:tcPr/>
-                </a:tc>
-                <a:extLst>
-                  <a:ext uri="{0D108BD9-81ED-4DB2-BD59-A6C34878D82A}">
-                    <a16:rowId xmlns:a16="http://schemas.microsoft.com/office/drawing/2014/main" val="1101796973"/>
-                  </a:ext>
-                </a:extLst>
-              </a:tr>
-              <a:tr h="370840">
-                <a:tc>
-                  <a:txBody>
-                    <a:bodyPr/>
-                    <a:lstStyle/>
-                    <a:p>
-                      <a:r>
-                        <a:rPr lang="en-US" dirty="0" smtClean="0">
-                          <a:solidFill>
-                            <a:schemeClr val="tx1"/>
-                          </a:solidFill>
-                        </a:rPr>
-                        <a:t>Unemployed</a:t>
-                      </a:r>
-                      <a:endParaRPr lang="en-US" dirty="0">
-                        <a:solidFill>
-                          <a:schemeClr val="tx1"/>
-                        </a:solidFill>
-                      </a:endParaRPr>
-                    </a:p>
-                  </a:txBody>
-                  <a:tcPr/>
-                </a:tc>
-                <a:tc>
-                  <a:txBody>
-                    <a:bodyPr/>
-                    <a:lstStyle/>
-                    <a:p>
-                      <a:r>
-                        <a:rPr lang="en-US" dirty="0" smtClean="0">
-                          <a:solidFill>
-                            <a:schemeClr val="tx1"/>
-                          </a:solidFill>
-                        </a:rPr>
-                        <a:t>66%</a:t>
-                      </a:r>
-                      <a:endParaRPr lang="en-US" dirty="0">
-                        <a:solidFill>
-                          <a:schemeClr val="tx1"/>
-                        </a:solidFill>
-                      </a:endParaRPr>
-                    </a:p>
-                  </a:txBody>
-                  <a:tcPr/>
-                </a:tc>
-                <a:tc>
-                  <a:txBody>
-                    <a:bodyPr/>
-                    <a:lstStyle/>
-                    <a:p>
-                      <a:r>
-                        <a:rPr lang="en-US" dirty="0" smtClean="0">
-                          <a:solidFill>
-                            <a:schemeClr val="tx1"/>
-                          </a:solidFill>
-                        </a:rPr>
-                        <a:t>34%</a:t>
-                      </a:r>
-                      <a:endParaRPr lang="en-US" dirty="0">
-                        <a:solidFill>
-                          <a:schemeClr val="tx1"/>
-                        </a:solidFill>
-                      </a:endParaRPr>
-                    </a:p>
-                  </a:txBody>
-                  <a:tcPr/>
-                </a:tc>
-                <a:extLst>
-                  <a:ext uri="{0D108BD9-81ED-4DB2-BD59-A6C34878D82A}">
-                    <a16:rowId xmlns:a16="http://schemas.microsoft.com/office/drawing/2014/main" val="1143654036"/>
-                  </a:ext>
-                </a:extLst>
-              </a:tr>
-            </a:tbl>
-          </a:graphicData>
-        </a:graphic>
-      </p:graphicFrame>
-      <p:graphicFrame>
-        <p:nvGraphicFramePr>
-          <p:cNvPr id="7" name="Content Placeholder 3"/>
-          <p:cNvGraphicFramePr>
-            <a:graphicFrameLocks/>
-          </p:cNvGraphicFramePr>
-          <p:nvPr>
-            <p:extLst>
-              <p:ext uri="{D42A27DB-BD31-4B8C-83A1-F6EECF244321}">
-                <p14:modId xmlns:p14="http://schemas.microsoft.com/office/powerpoint/2010/main" val="1442734883"/>
-              </p:ext>
-            </p:extLst>
-          </p:nvPr>
-        </p:nvGraphicFramePr>
-        <p:xfrm>
-          <a:off x="6126480" y="3685725"/>
-          <a:ext cx="4504100" cy="1112520"/>
-        </p:xfrm>
-        <a:graphic>
-          <a:graphicData uri="http://schemas.openxmlformats.org/drawingml/2006/table">
-            <a:tbl>
-              <a:tblPr firstRow="1" bandRow="1">
-                <a:tableStyleId>{5C22544A-7EE6-4342-B048-85BDC9FD1C3A}</a:tableStyleId>
-              </a:tblPr>
-              <a:tblGrid>
-                <a:gridCol w="1678305">
-                  <a:extLst>
-                    <a:ext uri="{9D8B030D-6E8A-4147-A177-3AD203B41FA5}">
-                      <a16:colId xmlns:a16="http://schemas.microsoft.com/office/drawing/2014/main" val="4057277645"/>
-                    </a:ext>
-                  </a:extLst>
-                </a:gridCol>
-                <a:gridCol w="895668">
-                  <a:extLst>
-                    <a:ext uri="{9D8B030D-6E8A-4147-A177-3AD203B41FA5}">
-                      <a16:colId xmlns:a16="http://schemas.microsoft.com/office/drawing/2014/main" val="3700732752"/>
-                    </a:ext>
-                  </a:extLst>
-                </a:gridCol>
-                <a:gridCol w="1930127">
-                  <a:extLst>
-                    <a:ext uri="{9D8B030D-6E8A-4147-A177-3AD203B41FA5}">
-                      <a16:colId xmlns:a16="http://schemas.microsoft.com/office/drawing/2014/main" val="3451909123"/>
-                    </a:ext>
-                  </a:extLst>
-                </a:gridCol>
-              </a:tblGrid>
-              <a:tr h="370840">
-                <a:tc>
-                  <a:txBody>
-                    <a:bodyPr/>
-                    <a:lstStyle/>
-                    <a:p>
-                      <a:endParaRPr lang="en-US" dirty="0">
-                        <a:solidFill>
-                          <a:schemeClr val="tx1"/>
-                        </a:solidFill>
-                      </a:endParaRPr>
-                    </a:p>
-                  </a:txBody>
-                  <a:tcPr/>
-                </a:tc>
-                <a:tc>
-                  <a:txBody>
-                    <a:bodyPr/>
-                    <a:lstStyle/>
-                    <a:p>
-                      <a:r>
-                        <a:rPr lang="en-US" dirty="0" smtClean="0">
-                          <a:solidFill>
-                            <a:schemeClr val="tx1"/>
-                          </a:solidFill>
-                        </a:rPr>
-                        <a:t>No MI</a:t>
-                      </a:r>
-                      <a:endParaRPr lang="en-US" dirty="0">
-                        <a:solidFill>
-                          <a:schemeClr val="tx1"/>
-                        </a:solidFill>
-                      </a:endParaRPr>
-                    </a:p>
-                  </a:txBody>
-                  <a:tcPr/>
-                </a:tc>
-                <a:tc>
-                  <a:txBody>
-                    <a:bodyPr/>
-                    <a:lstStyle/>
-                    <a:p>
-                      <a:r>
-                        <a:rPr lang="en-US" dirty="0" smtClean="0">
-                          <a:solidFill>
-                            <a:schemeClr val="tx1"/>
-                          </a:solidFill>
-                        </a:rPr>
-                        <a:t>Diagnosed</a:t>
-                      </a:r>
-                      <a:r>
-                        <a:rPr lang="en-US" baseline="0" dirty="0" smtClean="0">
-                          <a:solidFill>
-                            <a:schemeClr val="tx1"/>
-                          </a:solidFill>
-                        </a:rPr>
-                        <a:t> MI</a:t>
-                      </a:r>
-                      <a:endParaRPr lang="en-US" dirty="0">
-                        <a:solidFill>
-                          <a:schemeClr val="tx1"/>
-                        </a:solidFill>
-                      </a:endParaRPr>
-                    </a:p>
-                  </a:txBody>
-                  <a:tcPr/>
-                </a:tc>
-                <a:extLst>
-                  <a:ext uri="{0D108BD9-81ED-4DB2-BD59-A6C34878D82A}">
-                    <a16:rowId xmlns:a16="http://schemas.microsoft.com/office/drawing/2014/main" val="1263015633"/>
-                  </a:ext>
-                </a:extLst>
-              </a:tr>
-              <a:tr h="370840">
-                <a:tc>
-                  <a:txBody>
-                    <a:bodyPr/>
-                    <a:lstStyle/>
-                    <a:p>
-                      <a:r>
-                        <a:rPr lang="en-US" dirty="0" smtClean="0">
-                          <a:solidFill>
-                            <a:schemeClr val="tx1"/>
-                          </a:solidFill>
-                        </a:rPr>
-                        <a:t>Employed</a:t>
-                      </a:r>
-                    </a:p>
-                  </a:txBody>
-                  <a:tcPr/>
-                </a:tc>
-                <a:tc>
-                  <a:txBody>
-                    <a:bodyPr/>
-                    <a:lstStyle/>
-                    <a:p>
-                      <a:r>
-                        <a:rPr lang="en-US" dirty="0" smtClean="0">
-                          <a:solidFill>
-                            <a:schemeClr val="tx1"/>
-                          </a:solidFill>
-                        </a:rPr>
-                        <a:t>78%</a:t>
-                      </a:r>
-                      <a:endParaRPr lang="en-US" dirty="0">
-                        <a:solidFill>
-                          <a:schemeClr val="tx1"/>
-                        </a:solidFill>
-                      </a:endParaRPr>
-                    </a:p>
-                  </a:txBody>
-                  <a:tcPr/>
-                </a:tc>
-                <a:tc>
-                  <a:txBody>
-                    <a:bodyPr/>
-                    <a:lstStyle/>
-                    <a:p>
-                      <a:r>
-                        <a:rPr lang="en-US" dirty="0" smtClean="0">
-                          <a:solidFill>
-                            <a:schemeClr val="tx1"/>
-                          </a:solidFill>
-                        </a:rPr>
-                        <a:t>64%</a:t>
-                      </a:r>
-                      <a:endParaRPr lang="en-US" dirty="0">
-                        <a:solidFill>
-                          <a:schemeClr val="tx1"/>
-                        </a:solidFill>
-                      </a:endParaRPr>
-                    </a:p>
-                  </a:txBody>
-                  <a:tcPr/>
-                </a:tc>
-                <a:extLst>
-                  <a:ext uri="{0D108BD9-81ED-4DB2-BD59-A6C34878D82A}">
-                    <a16:rowId xmlns:a16="http://schemas.microsoft.com/office/drawing/2014/main" val="1101796973"/>
-                  </a:ext>
-                </a:extLst>
-              </a:tr>
-              <a:tr h="370840">
-                <a:tc>
-                  <a:txBody>
-                    <a:bodyPr/>
-                    <a:lstStyle/>
-                    <a:p>
-                      <a:r>
-                        <a:rPr lang="en-US" dirty="0" smtClean="0">
-                          <a:solidFill>
-                            <a:schemeClr val="tx1"/>
-                          </a:solidFill>
-                        </a:rPr>
-                        <a:t>Unemployed</a:t>
-                      </a:r>
-                      <a:endParaRPr lang="en-US" dirty="0">
-                        <a:solidFill>
-                          <a:schemeClr val="tx1"/>
-                        </a:solidFill>
-                      </a:endParaRPr>
-                    </a:p>
-                  </a:txBody>
-                  <a:tcPr/>
-                </a:tc>
-                <a:tc>
-                  <a:txBody>
-                    <a:bodyPr/>
-                    <a:lstStyle/>
-                    <a:p>
-                      <a:r>
-                        <a:rPr lang="en-US" dirty="0" smtClean="0">
-                          <a:solidFill>
-                            <a:schemeClr val="tx1"/>
-                          </a:solidFill>
-                        </a:rPr>
-                        <a:t>22%</a:t>
-                      </a:r>
-                      <a:endParaRPr lang="en-US" dirty="0">
-                        <a:solidFill>
-                          <a:schemeClr val="tx1"/>
-                        </a:solidFill>
-                      </a:endParaRPr>
-                    </a:p>
-                  </a:txBody>
-                  <a:tcPr/>
-                </a:tc>
-                <a:tc>
-                  <a:txBody>
-                    <a:bodyPr/>
-                    <a:lstStyle/>
-                    <a:p>
-                      <a:r>
-                        <a:rPr lang="en-US" dirty="0" smtClean="0">
-                          <a:solidFill>
-                            <a:schemeClr val="tx1"/>
-                          </a:solidFill>
-                        </a:rPr>
-                        <a:t>36%</a:t>
-                      </a:r>
-                      <a:endParaRPr lang="en-US" dirty="0">
-                        <a:solidFill>
-                          <a:schemeClr val="tx1"/>
-                        </a:solidFill>
-                      </a:endParaRPr>
-                    </a:p>
-                  </a:txBody>
-                  <a:tcPr/>
-                </a:tc>
-                <a:extLst>
-                  <a:ext uri="{0D108BD9-81ED-4DB2-BD59-A6C34878D82A}">
-                    <a16:rowId xmlns:a16="http://schemas.microsoft.com/office/drawing/2014/main" val="1143654036"/>
-                  </a:ext>
-                </a:extLst>
-              </a:tr>
-            </a:tbl>
-          </a:graphicData>
-        </a:graphic>
-      </p:graphicFrame>
+      <p:grpSp>
+        <p:nvGrpSpPr>
+          <p:cNvPr id="9" name="Group 8"/>
+          <p:cNvGrpSpPr/>
+          <p:nvPr/>
+        </p:nvGrpSpPr>
+        <p:grpSpPr>
+          <a:xfrm>
+            <a:off x="6126480" y="2506134"/>
+            <a:ext cx="4792133" cy="2607733"/>
+            <a:chOff x="965200" y="-2760133"/>
+            <a:chExt cx="4792133" cy="2607733"/>
+          </a:xfrm>
+        </p:grpSpPr>
+        <p:sp>
+          <p:nvSpPr>
+            <p:cNvPr id="8" name="Rectangle 7"/>
+            <p:cNvSpPr/>
+            <p:nvPr/>
+          </p:nvSpPr>
+          <p:spPr>
+            <a:xfrm>
+              <a:off x="965200" y="-2760133"/>
+              <a:ext cx="4792133" cy="2607733"/>
+            </a:xfrm>
+            <a:prstGeom prst="rect">
+              <a:avLst/>
+            </a:prstGeom>
+          </p:spPr>
+          <p:style>
+            <a:lnRef idx="2">
+              <a:schemeClr val="accent1">
+                <a:shade val="50000"/>
+              </a:schemeClr>
+            </a:lnRef>
+            <a:fillRef idx="1">
+              <a:schemeClr val="accent1"/>
+            </a:fillRef>
+            <a:effectRef idx="0">
+              <a:schemeClr val="accent1"/>
+            </a:effectRef>
+            <a:fontRef idx="minor">
+              <a:schemeClr val="lt1"/>
+            </a:fontRef>
+          </p:style>
+          <p:txBody>
+            <a:bodyPr rtlCol="0" anchor="ctr"/>
+            <a:lstStyle/>
+            <a:p>
+              <a:pPr algn="ctr"/>
+              <a:endParaRPr lang="en-US"/>
+            </a:p>
+          </p:txBody>
+        </p:sp>
+        <p:pic>
+          <p:nvPicPr>
+            <p:cNvPr id="2" name="Picture 1"/>
+            <p:cNvPicPr>
+              <a:picLocks noChangeAspect="1"/>
+            </p:cNvPicPr>
+            <p:nvPr/>
+          </p:nvPicPr>
+          <p:blipFill rotWithShape="1">
+            <a:blip r:embed="rId2">
+              <a:clrChange>
+                <a:clrFrom>
+                  <a:srgbClr val="FFFFFF"/>
+                </a:clrFrom>
+                <a:clrTo>
+                  <a:srgbClr val="FFFFFF">
+                    <a:alpha val="0"/>
+                  </a:srgbClr>
+                </a:clrTo>
+              </a:clrChange>
+              <a:extLst>
+                <a:ext uri="{28A0092B-C50C-407E-A947-70E740481C1C}">
+                  <a14:useLocalDpi xmlns:a14="http://schemas.microsoft.com/office/drawing/2010/main" val="0"/>
+                </a:ext>
+              </a:extLst>
+            </a:blip>
+            <a:srcRect l="8693" t="17499" r="11359" b="14438"/>
+            <a:stretch/>
+          </p:blipFill>
+          <p:spPr>
+            <a:xfrm>
+              <a:off x="1156463" y="-2658533"/>
+              <a:ext cx="4385734" cy="2489200"/>
+            </a:xfrm>
+            <a:prstGeom prst="rect">
+              <a:avLst/>
+            </a:prstGeom>
+          </p:spPr>
+        </p:pic>
+      </p:grpSp>
     </p:spTree>
     <p:extLst>
       <p:ext uri="{BB962C8B-B14F-4D97-AF65-F5344CB8AC3E}">
@@ -13661,35 +14021,25 @@
           <a:chExt cx="0" cy="0"/>
         </a:xfrm>
       </p:grpSpPr>
-      <p:pic>
-        <p:nvPicPr>
-          <p:cNvPr id="4" name="Content Placeholder 3"/>
-          <p:cNvPicPr>
-            <a:picLocks noGrp="1" noChangeAspect="1"/>
-          </p:cNvPicPr>
+      <p:sp>
+        <p:nvSpPr>
+          <p:cNvPr id="2" name="Content Placeholder 1"/>
+          <p:cNvSpPr>
+            <a:spLocks noGrp="1"/>
+          </p:cNvSpPr>
           <p:nvPr>
             <p:ph idx="1"/>
           </p:nvPr>
-        </p:nvPicPr>
-        <p:blipFill>
-          <a:blip r:embed="rId2">
-            <a:extLst>
-              <a:ext uri="{28A0092B-C50C-407E-A947-70E740481C1C}">
-                <a14:useLocalDpi xmlns:a14="http://schemas.microsoft.com/office/drawing/2010/main" val="0"/>
-              </a:ext>
-            </a:extLst>
-          </a:blip>
-          <a:stretch>
-            <a:fillRect/>
-          </a:stretch>
-        </p:blipFill>
-        <p:spPr>
-          <a:xfrm>
-            <a:off x="3476762" y="2133600"/>
-            <a:ext cx="5299436" cy="3569286"/>
-          </a:xfrm>
-        </p:spPr>
-      </p:pic>
+        </p:nvSpPr>
+        <p:spPr/>
+        <p:txBody>
+          <a:bodyPr/>
+          <a:lstStyle/>
+          <a:p>
+            <a:endParaRPr lang="en-US"/>
+          </a:p>
+        </p:txBody>
+      </p:sp>
       <p:sp>
         <p:nvSpPr>
           <p:cNvPr id="3" name="Title 2"/>
@@ -13700,81 +14050,19 @@
             <p:ph type="title"/>
           </p:nvPr>
         </p:nvSpPr>
-        <p:spPr>
-          <a:xfrm>
-            <a:off x="1097280" y="942871"/>
-            <a:ext cx="10058400" cy="919796"/>
-          </a:xfrm>
-        </p:spPr>
+        <p:spPr/>
         <p:txBody>
-          <a:bodyPr>
-            <a:noAutofit/>
-          </a:bodyPr>
+          <a:bodyPr/>
           <a:lstStyle/>
           <a:p>
-            <a:r>
-              <a:rPr lang="en-US" dirty="0" smtClean="0"/>
-              <a:t>States: discrepancy between percent reporting poor mental health and those with a diagnosis of depression</a:t>
-            </a:r>
-            <a:endParaRPr lang="en-US" dirty="0"/>
-          </a:p>
-        </p:txBody>
-      </p:sp>
-      <p:sp>
-        <p:nvSpPr>
-          <p:cNvPr id="5" name="TextBox 4"/>
-          <p:cNvSpPr txBox="1"/>
-          <p:nvPr/>
-        </p:nvSpPr>
-        <p:spPr>
-          <a:xfrm>
-            <a:off x="5638801" y="5702886"/>
-            <a:ext cx="1233030" cy="369332"/>
-          </a:xfrm>
-          <a:prstGeom prst="rect">
-            <a:avLst/>
-          </a:prstGeom>
-        </p:spPr>
-        <p:style>
-          <a:lnRef idx="2">
-            <a:schemeClr val="dk1"/>
-          </a:lnRef>
-          <a:fillRef idx="1">
-            <a:schemeClr val="lt1"/>
-          </a:fillRef>
-          <a:effectRef idx="0">
-            <a:schemeClr val="dk1"/>
-          </a:effectRef>
-          <a:fontRef idx="minor">
-            <a:schemeClr val="dk1"/>
-          </a:fontRef>
-        </p:style>
-        <p:txBody>
-          <a:bodyPr wrap="none" rtlCol="0">
-            <a:spAutoFit/>
-          </a:bodyPr>
-          <a:lstStyle/>
-          <a:p>
-            <a:r>
-              <a:rPr lang="en-US" dirty="0" smtClean="0"/>
-              <a:t>R</a:t>
-            </a:r>
-            <a:r>
-              <a:rPr lang="en-US" baseline="30000" dirty="0" smtClean="0"/>
-              <a:t>2</a:t>
-            </a:r>
-            <a:r>
-              <a:rPr lang="en-US" dirty="0" smtClean="0"/>
-              <a:t>= 0.088</a:t>
-            </a:r>
-            <a:endParaRPr lang="en-US" dirty="0"/>
+            <a:endParaRPr lang="en-US"/>
           </a:p>
         </p:txBody>
       </p:sp>
     </p:spTree>
     <p:extLst>
       <p:ext uri="{BB962C8B-B14F-4D97-AF65-F5344CB8AC3E}">
-        <p14:creationId xmlns:p14="http://schemas.microsoft.com/office/powerpoint/2010/main" val="1572569241"/>
+        <p14:creationId xmlns:p14="http://schemas.microsoft.com/office/powerpoint/2010/main" val="414236368"/>
       </p:ext>
     </p:extLst>
   </p:cSld>
@@ -13801,6 +14089,35 @@
           <a:chExt cx="0" cy="0"/>
         </a:xfrm>
       </p:grpSpPr>
+      <p:pic>
+        <p:nvPicPr>
+          <p:cNvPr id="4" name="Content Placeholder 3"/>
+          <p:cNvPicPr>
+            <a:picLocks noGrp="1" noChangeAspect="1"/>
+          </p:cNvPicPr>
+          <p:nvPr>
+            <p:ph idx="1"/>
+          </p:nvPr>
+        </p:nvPicPr>
+        <p:blipFill>
+          <a:blip r:embed="rId2">
+            <a:extLst>
+              <a:ext uri="{28A0092B-C50C-407E-A947-70E740481C1C}">
+                <a14:useLocalDpi xmlns:a14="http://schemas.microsoft.com/office/drawing/2010/main" val="0"/>
+              </a:ext>
+            </a:extLst>
+          </a:blip>
+          <a:stretch>
+            <a:fillRect/>
+          </a:stretch>
+        </p:blipFill>
+        <p:spPr>
+          <a:xfrm>
+            <a:off x="864855" y="3825973"/>
+            <a:ext cx="3090041" cy="2286000"/>
+          </a:xfrm>
+        </p:spPr>
+      </p:pic>
       <p:sp>
         <p:nvSpPr>
           <p:cNvPr id="3" name="Title 2"/>
@@ -13811,72 +14128,17 @@
             <p:ph type="title"/>
           </p:nvPr>
         </p:nvSpPr>
-        <p:spPr>
-          <a:xfrm>
-            <a:off x="1097280" y="942871"/>
-            <a:ext cx="10058400" cy="919796"/>
-          </a:xfrm>
-        </p:spPr>
+        <p:spPr/>
         <p:txBody>
           <a:bodyPr>
-            <a:noAutofit/>
+            <a:normAutofit fontScale="90000"/>
           </a:bodyPr>
           <a:lstStyle/>
           <a:p>
+            <a:pPr algn="ctr"/>
             <a:r>
               <a:rPr lang="en-US" dirty="0" smtClean="0"/>
-              <a:t>No correlation between Mental Illness and Unemployment at the state level</a:t>
-            </a:r>
-            <a:endParaRPr lang="en-US" dirty="0"/>
-          </a:p>
-        </p:txBody>
-      </p:sp>
-      <p:sp>
-        <p:nvSpPr>
-          <p:cNvPr id="5" name="TextBox 4"/>
-          <p:cNvSpPr txBox="1"/>
-          <p:nvPr/>
-        </p:nvSpPr>
-        <p:spPr>
-          <a:xfrm>
-            <a:off x="3183468" y="5518659"/>
-            <a:ext cx="1189749" cy="369332"/>
-          </a:xfrm>
-          <a:prstGeom prst="rect">
-            <a:avLst/>
-          </a:prstGeom>
-        </p:spPr>
-        <p:style>
-          <a:lnRef idx="2">
-            <a:schemeClr val="dk1"/>
-          </a:lnRef>
-          <a:fillRef idx="1">
-            <a:schemeClr val="lt1"/>
-          </a:fillRef>
-          <a:effectRef idx="0">
-            <a:schemeClr val="dk1"/>
-          </a:effectRef>
-          <a:fontRef idx="minor">
-            <a:schemeClr val="dk1"/>
-          </a:fontRef>
-        </p:style>
-        <p:txBody>
-          <a:bodyPr wrap="none" rtlCol="0">
-            <a:spAutoFit/>
-          </a:bodyPr>
-          <a:lstStyle/>
-          <a:p>
-            <a:r>
-              <a:rPr lang="en-US" dirty="0" smtClean="0"/>
-              <a:t>R</a:t>
-            </a:r>
-            <a:r>
-              <a:rPr lang="en-US" baseline="30000" dirty="0" smtClean="0"/>
-              <a:t>2</a:t>
-            </a:r>
-            <a:r>
-              <a:rPr lang="en-US" dirty="0" smtClean="0"/>
-              <a:t>= 0.061</a:t>
+              <a:t>Individual Education level is Highly correlated with unemployment risk</a:t>
             </a:r>
             <a:endParaRPr lang="en-US" dirty="0"/>
           </a:p>
@@ -13884,13 +14146,11 @@
       </p:sp>
       <p:pic>
         <p:nvPicPr>
-          <p:cNvPr id="6" name="Content Placeholder 5"/>
+          <p:cNvPr id="5" name="Picture 4"/>
           <p:cNvPicPr>
-            <a:picLocks noGrp="1" noChangeAspect="1"/>
+            <a:picLocks noChangeAspect="1"/>
           </p:cNvPicPr>
-          <p:nvPr>
-            <p:ph idx="1"/>
-          </p:nvPr>
+          <p:nvPr/>
         </p:nvPicPr>
         <p:blipFill>
           <a:blip r:embed="rId3">
@@ -13906,14 +14166,17 @@
         </p:blipFill>
         <p:spPr>
           <a:xfrm>
-            <a:off x="1097280" y="2094107"/>
-            <a:ext cx="4850793" cy="3377778"/>
+            <a:off x="4087886" y="2444290"/>
+            <a:ext cx="3397461" cy="3291840"/>
           </a:xfrm>
+          <a:prstGeom prst="rect">
+            <a:avLst/>
+          </a:prstGeom>
         </p:spPr>
       </p:pic>
       <p:pic>
         <p:nvPicPr>
-          <p:cNvPr id="7" name="Picture 6"/>
+          <p:cNvPr id="6" name="Picture 5"/>
           <p:cNvPicPr>
             <a:picLocks noChangeAspect="1"/>
           </p:cNvPicPr>
@@ -13933,8 +14196,38 @@
         </p:blipFill>
         <p:spPr>
           <a:xfrm>
-            <a:off x="6255316" y="2144901"/>
-            <a:ext cx="4850793" cy="3326984"/>
+            <a:off x="896173" y="1611936"/>
+            <a:ext cx="3027406" cy="2286000"/>
+          </a:xfrm>
+          <a:prstGeom prst="rect">
+            <a:avLst/>
+          </a:prstGeom>
+        </p:spPr>
+      </p:pic>
+      <p:pic>
+        <p:nvPicPr>
+          <p:cNvPr id="7" name="Picture 6"/>
+          <p:cNvPicPr>
+            <a:picLocks noChangeAspect="1"/>
+          </p:cNvPicPr>
+          <p:nvPr/>
+        </p:nvPicPr>
+        <p:blipFill>
+          <a:blip r:embed="rId5">
+            <a:extLst>
+              <a:ext uri="{28A0092B-C50C-407E-A947-70E740481C1C}">
+                <a14:useLocalDpi xmlns:a14="http://schemas.microsoft.com/office/drawing/2010/main" val="0"/>
+              </a:ext>
+            </a:extLst>
+          </a:blip>
+          <a:stretch>
+            <a:fillRect/>
+          </a:stretch>
+        </p:blipFill>
+        <p:spPr>
+          <a:xfrm>
+            <a:off x="7649654" y="2444290"/>
+            <a:ext cx="3549870" cy="3200400"/>
           </a:xfrm>
           <a:prstGeom prst="rect">
             <a:avLst/>
@@ -13949,53 +14242,69 @@
         </p:nvSpPr>
         <p:spPr>
           <a:xfrm>
-            <a:off x="8297334" y="5518659"/>
-            <a:ext cx="1189749" cy="369332"/>
+            <a:off x="10192686" y="1552291"/>
+            <a:ext cx="1429525" cy="646331"/>
           </a:xfrm>
           <a:prstGeom prst="rect">
             <a:avLst/>
           </a:prstGeom>
+          <a:noFill/>
         </p:spPr>
-        <p:style>
-          <a:lnRef idx="2">
-            <a:schemeClr val="dk1"/>
-          </a:lnRef>
-          <a:fillRef idx="1">
-            <a:schemeClr val="lt1"/>
-          </a:fillRef>
-          <a:effectRef idx="0">
-            <a:schemeClr val="dk1"/>
-          </a:effectRef>
-          <a:fontRef idx="minor">
-            <a:schemeClr val="dk1"/>
-          </a:fontRef>
-        </p:style>
         <p:txBody>
-          <a:bodyPr wrap="none" rtlCol="0">
+          <a:bodyPr wrap="square" rtlCol="0">
             <a:spAutoFit/>
           </a:bodyPr>
           <a:lstStyle/>
           <a:p>
+            <a:pPr algn="ctr"/>
             <a:r>
-              <a:rPr lang="en-US" dirty="0" smtClean="0"/>
-              <a:t>R</a:t>
+              <a:rPr lang="en-US" sz="1200" dirty="0" smtClean="0"/>
+              <a:t>only 2 people are in this category</a:t>
             </a:r>
-            <a:r>
-              <a:rPr lang="en-US" baseline="30000" dirty="0" smtClean="0"/>
-              <a:t>2</a:t>
-            </a:r>
-            <a:r>
-              <a:rPr lang="en-US" dirty="0" smtClean="0"/>
-              <a:t>= 0.002</a:t>
-            </a:r>
-            <a:endParaRPr lang="en-US" dirty="0"/>
+            <a:endParaRPr lang="en-US" sz="1200" dirty="0"/>
           </a:p>
         </p:txBody>
       </p:sp>
+      <p:cxnSp>
+        <p:nvCxnSpPr>
+          <p:cNvPr id="10" name="Straight Arrow Connector 9"/>
+          <p:cNvCxnSpPr/>
+          <p:nvPr/>
+        </p:nvCxnSpPr>
+        <p:spPr>
+          <a:xfrm flipH="1">
+            <a:off x="10433579" y="2198622"/>
+            <a:ext cx="363894" cy="768513"/>
+          </a:xfrm>
+          <a:prstGeom prst="straightConnector1">
+            <a:avLst/>
+          </a:prstGeom>
+          <a:ln>
+            <a:solidFill>
+              <a:srgbClr val="FF0000"/>
+            </a:solidFill>
+            <a:tailEnd type="triangle"/>
+          </a:ln>
+        </p:spPr>
+        <p:style>
+          <a:lnRef idx="1">
+            <a:schemeClr val="accent1"/>
+          </a:lnRef>
+          <a:fillRef idx="0">
+            <a:schemeClr val="accent1"/>
+          </a:fillRef>
+          <a:effectRef idx="0">
+            <a:schemeClr val="accent1"/>
+          </a:effectRef>
+          <a:fontRef idx="minor">
+            <a:schemeClr val="tx1"/>
+          </a:fontRef>
+        </p:style>
+      </p:cxnSp>
     </p:spTree>
     <p:extLst>
       <p:ext uri="{BB962C8B-B14F-4D97-AF65-F5344CB8AC3E}">
-        <p14:creationId xmlns:p14="http://schemas.microsoft.com/office/powerpoint/2010/main" val="3235081919"/>
+        <p14:creationId xmlns:p14="http://schemas.microsoft.com/office/powerpoint/2010/main" val="3409467733"/>
       </p:ext>
     </p:extLst>
   </p:cSld>
@@ -14771,21 +15080,21 @@
 </file>
 
 <file path=customXml/item2.xml><?xml version="1.0" encoding="utf-8"?>
+<p:properties xmlns:p="http://schemas.microsoft.com/office/2006/metadata/properties" xmlns:xsi="http://www.w3.org/2001/XMLSchema-instance" xmlns:pc="http://schemas.microsoft.com/office/infopath/2007/PartnerControls">
+  <documentManagement>
+    <Status xmlns="71af3243-3dd4-4a8d-8c0d-dd76da1f02a5">Not started</Status>
+    <MediaServiceKeyPoints xmlns="71af3243-3dd4-4a8d-8c0d-dd76da1f02a5" xsi:nil="true"/>
+  </documentManagement>
+</p:properties>
+</file>
+
+<file path=customXml/item3.xml><?xml version="1.0" encoding="utf-8"?>
 <?mso-contentType ?>
 <FormTemplates xmlns="http://schemas.microsoft.com/sharepoint/v3/contenttype/forms">
   <Display>DocumentLibraryForm</Display>
   <Edit>DocumentLibraryForm</Edit>
   <New>DocumentLibraryForm</New>
 </FormTemplates>
-</file>
-
-<file path=customXml/item3.xml><?xml version="1.0" encoding="utf-8"?>
-<p:properties xmlns:p="http://schemas.microsoft.com/office/2006/metadata/properties" xmlns:xsi="http://www.w3.org/2001/XMLSchema-instance" xmlns:pc="http://schemas.microsoft.com/office/infopath/2007/PartnerControls">
-  <documentManagement>
-    <Status xmlns="71af3243-3dd4-4a8d-8c0d-dd76da1f02a5">Not started</Status>
-    <MediaServiceKeyPoints xmlns="71af3243-3dd4-4a8d-8c0d-dd76da1f02a5" xsi:nil="true"/>
-  </documentManagement>
-</p:properties>
 </file>
 
 <file path=customXml/itemProps1.xml><?xml version="1.0" encoding="utf-8"?>
@@ -14808,26 +15117,26 @@
 </file>
 
 <file path=customXml/itemProps2.xml><?xml version="1.0" encoding="utf-8"?>
+<ds:datastoreItem xmlns:ds="http://schemas.openxmlformats.org/officeDocument/2006/customXml" ds:itemID="{44FAF7B5-E40C-46BE-9C83-DA251FCAE61E}">
+  <ds:schemaRefs>
+    <ds:schemaRef ds:uri="http://schemas.openxmlformats.org/package/2006/metadata/core-properties"/>
+    <ds:schemaRef ds:uri="http://purl.org/dc/terms/"/>
+    <ds:schemaRef ds:uri="http://purl.org/dc/elements/1.1/"/>
+    <ds:schemaRef ds:uri="http://schemas.microsoft.com/office/2006/metadata/properties"/>
+    <ds:schemaRef ds:uri="16c05727-aa75-4e4a-9b5f-8a80a1165891"/>
+    <ds:schemaRef ds:uri="71af3243-3dd4-4a8d-8c0d-dd76da1f02a5"/>
+    <ds:schemaRef ds:uri="http://schemas.microsoft.com/office/2006/documentManagement/types"/>
+    <ds:schemaRef ds:uri="http://purl.org/dc/dcmitype/"/>
+    <ds:schemaRef ds:uri="http://schemas.microsoft.com/office/infopath/2007/PartnerControls"/>
+    <ds:schemaRef ds:uri="http://www.w3.org/XML/1998/namespace"/>
+  </ds:schemaRefs>
+</ds:datastoreItem>
+</file>
+
+<file path=customXml/itemProps3.xml><?xml version="1.0" encoding="utf-8"?>
 <ds:datastoreItem xmlns:ds="http://schemas.openxmlformats.org/officeDocument/2006/customXml" ds:itemID="{5029FA76-0C86-4BF1-99F1-A3115FBFFAB0}">
   <ds:schemaRefs>
     <ds:schemaRef ds:uri="http://schemas.microsoft.com/sharepoint/v3/contenttype/forms"/>
   </ds:schemaRefs>
 </ds:datastoreItem>
-</file>
-
-<file path=customXml/itemProps3.xml><?xml version="1.0" encoding="utf-8"?>
-<ds:datastoreItem xmlns:ds="http://schemas.openxmlformats.org/officeDocument/2006/customXml" ds:itemID="{44FAF7B5-E40C-46BE-9C83-DA251FCAE61E}">
-  <ds:schemaRefs>
-    <ds:schemaRef ds:uri="http://purl.org/dc/terms/"/>
-    <ds:schemaRef ds:uri="16c05727-aa75-4e4a-9b5f-8a80a1165891"/>
-    <ds:schemaRef ds:uri="71af3243-3dd4-4a8d-8c0d-dd76da1f02a5"/>
-    <ds:schemaRef ds:uri="http://purl.org/dc/elements/1.1/"/>
-    <ds:schemaRef ds:uri="http://schemas.microsoft.com/office/infopath/2007/PartnerControls"/>
-    <ds:schemaRef ds:uri="http://www.w3.org/XML/1998/namespace"/>
-    <ds:schemaRef ds:uri="http://schemas.microsoft.com/office/2006/documentManagement/types"/>
-    <ds:schemaRef ds:uri="http://schemas.openxmlformats.org/package/2006/metadata/core-properties"/>
-    <ds:schemaRef ds:uri="http://schemas.microsoft.com/office/2006/metadata/properties"/>
-    <ds:schemaRef ds:uri="http://purl.org/dc/dcmitype/"/>
-  </ds:schemaRefs>
-</ds:datastoreItem>
 </file>
</xml_diff>

<commit_message>
Updated presentation with demo v MI barcharts
</commit_message>
<xml_diff>
--- a/Presentation/Presentation_draft.pptx
+++ b/Presentation/Presentation_draft.pptx
@@ -15,8 +15,8 @@
     <p:sldId id="261" r:id="rId9"/>
     <p:sldId id="264" r:id="rId10"/>
     <p:sldId id="262" r:id="rId11"/>
-    <p:sldId id="272" r:id="rId12"/>
-    <p:sldId id="273" r:id="rId13"/>
+    <p:sldId id="273" r:id="rId12"/>
+    <p:sldId id="272" r:id="rId13"/>
     <p:sldId id="263" r:id="rId14"/>
     <p:sldId id="265" r:id="rId15"/>
     <p:sldId id="266" r:id="rId16"/>
@@ -12732,9 +12732,123 @@
         </p:nvSpPr>
         <p:spPr/>
         <p:txBody>
-          <a:bodyPr/>
+          <a:bodyPr>
+            <a:normAutofit fontScale="92500" lnSpcReduction="20000"/>
+          </a:bodyPr>
           <a:lstStyle/>
           <a:p>
+            <a:pPr>
+              <a:buFont typeface="Arial" panose="020B0604020202020204" pitchFamily="34" charset="0"/>
+              <a:buChar char="•"/>
+            </a:pPr>
+            <a:r>
+              <a:rPr lang="en-US" dirty="0"/>
+              <a:t>Individuals with diagnosed mental illness (</a:t>
+            </a:r>
+            <a:r>
+              <a:rPr lang="en-US" dirty="0" smtClean="0"/>
+              <a:t>MI) more </a:t>
+            </a:r>
+            <a:r>
+              <a:rPr lang="en-US" dirty="0"/>
+              <a:t>likely to be </a:t>
+            </a:r>
+            <a:r>
+              <a:rPr lang="en-US" dirty="0" smtClean="0"/>
+              <a:t>unemployed</a:t>
+            </a:r>
+          </a:p>
+          <a:p>
+            <a:pPr>
+              <a:buFont typeface="Arial" panose="020B0604020202020204" pitchFamily="34" charset="0"/>
+              <a:buChar char="•"/>
+            </a:pPr>
+            <a:r>
+              <a:rPr lang="en-US" dirty="0"/>
+              <a:t>Unemployed individuals more likely to suffer from one or more mental health </a:t>
+            </a:r>
+            <a:r>
+              <a:rPr lang="en-US" dirty="0" smtClean="0"/>
+              <a:t>conditions</a:t>
+            </a:r>
+          </a:p>
+          <a:p>
+            <a:pPr>
+              <a:buFont typeface="Arial" panose="020B0604020202020204" pitchFamily="34" charset="0"/>
+              <a:buChar char="•"/>
+            </a:pPr>
+            <a:r>
+              <a:rPr lang="en-US" dirty="0"/>
+              <a:t>More young individuals </a:t>
+            </a:r>
+            <a:r>
+              <a:rPr lang="en-US" dirty="0" smtClean="0"/>
+              <a:t>(18-29) identify </a:t>
+            </a:r>
+            <a:r>
+              <a:rPr lang="en-US" dirty="0"/>
+              <a:t>as having a mental </a:t>
+            </a:r>
+            <a:r>
+              <a:rPr lang="en-US" dirty="0" smtClean="0"/>
+              <a:t>illness than older individuals (60+).</a:t>
+            </a:r>
+          </a:p>
+          <a:p>
+            <a:pPr lvl="1">
+              <a:buFont typeface="Arial" panose="020B0604020202020204" pitchFamily="34" charset="0"/>
+              <a:buChar char="•"/>
+            </a:pPr>
+            <a:r>
+              <a:rPr lang="en-US" dirty="0" smtClean="0"/>
+              <a:t>However, these groups have similar rates of unemployment</a:t>
+            </a:r>
+          </a:p>
+          <a:p>
+            <a:pPr>
+              <a:buFont typeface="Arial" panose="020B0604020202020204" pitchFamily="34" charset="0"/>
+              <a:buChar char="•"/>
+            </a:pPr>
+            <a:r>
+              <a:rPr lang="en-US" dirty="0" smtClean="0"/>
+              <a:t>Appears to be </a:t>
+            </a:r>
+            <a:r>
+              <a:rPr lang="en-US" dirty="0"/>
+              <a:t>correlation between Mental Illness and Unemployment at the state </a:t>
+            </a:r>
+            <a:r>
+              <a:rPr lang="en-US" dirty="0" smtClean="0"/>
+              <a:t>level.</a:t>
+            </a:r>
+          </a:p>
+          <a:p>
+            <a:pPr lvl="1">
+              <a:buFont typeface="Arial" panose="020B0604020202020204" pitchFamily="34" charset="0"/>
+              <a:buChar char="•"/>
+            </a:pPr>
+            <a:r>
+              <a:rPr lang="en-US" dirty="0" smtClean="0"/>
+              <a:t>However, geographically</a:t>
+            </a:r>
+            <a:r>
+              <a:rPr lang="en-US" dirty="0"/>
+              <a:t>, high rates of unemployment correlate with clustered areas of poor mental </a:t>
+            </a:r>
+            <a:r>
+              <a:rPr lang="en-US" dirty="0" smtClean="0"/>
+              <a:t>health</a:t>
+            </a:r>
+          </a:p>
+          <a:p>
+            <a:pPr>
+              <a:buFont typeface="Arial" panose="020B0604020202020204" pitchFamily="34" charset="0"/>
+              <a:buChar char="•"/>
+            </a:pPr>
+            <a:r>
+              <a:rPr lang="en-US" dirty="0"/>
+              <a:t>At the state level, not a strong correlation between poor mental health and access to mental health care</a:t>
+            </a:r>
             <a:endParaRPr lang="en-US" dirty="0"/>
           </a:p>
         </p:txBody>
@@ -12804,39 +12918,114 @@
         </p:nvSpPr>
         <p:spPr/>
         <p:txBody>
-          <a:bodyPr/>
+          <a:bodyPr>
+            <a:normAutofit fontScale="92500" lnSpcReduction="20000"/>
+          </a:bodyPr>
           <a:lstStyle/>
           <a:p>
             <a:r>
               <a:rPr lang="en-US" dirty="0" smtClean="0"/>
-              <a:t>1. Intro and Research Questions</a:t>
-            </a:r>
-          </a:p>
-          <a:p>
+              <a:t>1. </a:t>
+            </a:r>
             <a:r>
               <a:rPr lang="en-US" dirty="0" smtClean="0"/>
-              <a:t>2. Individual data using </a:t>
-            </a:r>
-            <a:r>
-              <a:rPr lang="en-US" dirty="0" err="1" smtClean="0"/>
-              <a:t>Kaggle</a:t>
+              <a:t>Background and Research Questions</a:t>
             </a:r>
             <a:endParaRPr lang="en-US" dirty="0" smtClean="0"/>
           </a:p>
           <a:p>
             <a:r>
               <a:rPr lang="en-US" dirty="0" smtClean="0"/>
-              <a:t>3. State-wide data using BRFSS</a:t>
-            </a:r>
-          </a:p>
-          <a:p>
+              <a:t>2. Individual </a:t>
+            </a:r>
             <a:r>
               <a:rPr lang="en-US" dirty="0" smtClean="0"/>
-              <a:t>4. Geographic analysis using MHA data and </a:t>
-            </a:r>
-            <a:r>
-              <a:rPr lang="en-US" dirty="0" err="1" smtClean="0"/>
-              <a:t>gmaps</a:t>
+              <a:t>data analysis</a:t>
+            </a:r>
+          </a:p>
+          <a:p>
+            <a:pPr lvl="1"/>
+            <a:r>
+              <a:rPr lang="en-US" dirty="0" smtClean="0"/>
+              <a:t>Mental illness and unemployment</a:t>
+            </a:r>
+          </a:p>
+          <a:p>
+            <a:pPr lvl="1"/>
+            <a:r>
+              <a:rPr lang="en-US" dirty="0"/>
+              <a:t>C</a:t>
+            </a:r>
+            <a:r>
+              <a:rPr lang="en-US" dirty="0" smtClean="0"/>
+              <a:t>ovariates (education, income, age, gender)</a:t>
+            </a:r>
+          </a:p>
+          <a:p>
+            <a:r>
+              <a:rPr lang="en-US" dirty="0" smtClean="0"/>
+              <a:t>3</a:t>
+            </a:r>
+            <a:r>
+              <a:rPr lang="en-US" dirty="0" smtClean="0"/>
+              <a:t>. State-wide </a:t>
+            </a:r>
+            <a:r>
+              <a:rPr lang="en-US" dirty="0" smtClean="0"/>
+              <a:t>data analysis</a:t>
+            </a:r>
+          </a:p>
+          <a:p>
+            <a:pPr lvl="1"/>
+            <a:r>
+              <a:rPr lang="en-US" dirty="0"/>
+              <a:t>S</a:t>
+            </a:r>
+            <a:r>
+              <a:rPr lang="en-US" dirty="0" smtClean="0"/>
+              <a:t>elf-reported poor mental health and unemployment</a:t>
+            </a:r>
+            <a:endParaRPr lang="en-US" dirty="0" smtClean="0"/>
+          </a:p>
+          <a:p>
+            <a:r>
+              <a:rPr lang="en-US" dirty="0" smtClean="0"/>
+              <a:t>4</a:t>
+            </a:r>
+            <a:r>
+              <a:rPr lang="en-US" dirty="0" smtClean="0"/>
+              <a:t>. Geographic </a:t>
+            </a:r>
+            <a:r>
+              <a:rPr lang="en-US" dirty="0" smtClean="0"/>
+              <a:t>analysis</a:t>
+            </a:r>
+          </a:p>
+          <a:p>
+            <a:pPr lvl="1"/>
+            <a:r>
+              <a:rPr lang="en-US" dirty="0" smtClean="0"/>
+              <a:t>Poor mental health</a:t>
+            </a:r>
+          </a:p>
+          <a:p>
+            <a:pPr lvl="1"/>
+            <a:r>
+              <a:rPr lang="en-US" dirty="0" smtClean="0"/>
+              <a:t>Unemployment</a:t>
+            </a:r>
+          </a:p>
+          <a:p>
+            <a:pPr lvl="1"/>
+            <a:r>
+              <a:rPr lang="en-US" dirty="0" smtClean="0"/>
+              <a:t>Access to mental health care</a:t>
+            </a:r>
+          </a:p>
+          <a:p>
+            <a:r>
+              <a:rPr lang="en-US" dirty="0" smtClean="0"/>
+              <a:t>5. Findings Summary</a:t>
             </a:r>
             <a:endParaRPr lang="en-US" dirty="0"/>
           </a:p>
@@ -13277,11 +13466,7 @@
             <a:pPr lvl="1"/>
             <a:r>
               <a:rPr lang="en-US" dirty="0" smtClean="0"/>
-              <a:t>aggregated state-level data on various behavioral and demographic </a:t>
-            </a:r>
-            <a:r>
-              <a:rPr lang="en-US" dirty="0" smtClean="0"/>
-              <a:t>factors</a:t>
+              <a:t>aggregated state-level data on various behavioral and demographic factors</a:t>
             </a:r>
           </a:p>
           <a:p>
@@ -14021,74 +14206,6 @@
           <a:chExt cx="0" cy="0"/>
         </a:xfrm>
       </p:grpSpPr>
-      <p:sp>
-        <p:nvSpPr>
-          <p:cNvPr id="2" name="Content Placeholder 1"/>
-          <p:cNvSpPr>
-            <a:spLocks noGrp="1"/>
-          </p:cNvSpPr>
-          <p:nvPr>
-            <p:ph idx="1"/>
-          </p:nvPr>
-        </p:nvSpPr>
-        <p:spPr/>
-        <p:txBody>
-          <a:bodyPr/>
-          <a:lstStyle/>
-          <a:p>
-            <a:endParaRPr lang="en-US"/>
-          </a:p>
-        </p:txBody>
-      </p:sp>
-      <p:sp>
-        <p:nvSpPr>
-          <p:cNvPr id="3" name="Title 2"/>
-          <p:cNvSpPr>
-            <a:spLocks noGrp="1"/>
-          </p:cNvSpPr>
-          <p:nvPr>
-            <p:ph type="title"/>
-          </p:nvPr>
-        </p:nvSpPr>
-        <p:spPr/>
-        <p:txBody>
-          <a:bodyPr/>
-          <a:lstStyle/>
-          <a:p>
-            <a:endParaRPr lang="en-US"/>
-          </a:p>
-        </p:txBody>
-      </p:sp>
-    </p:spTree>
-    <p:extLst>
-      <p:ext uri="{BB962C8B-B14F-4D97-AF65-F5344CB8AC3E}">
-        <p14:creationId xmlns:p14="http://schemas.microsoft.com/office/powerpoint/2010/main" val="414236368"/>
-      </p:ext>
-    </p:extLst>
-  </p:cSld>
-  <p:clrMapOvr>
-    <a:masterClrMapping/>
-  </p:clrMapOvr>
-</p:sld>
-</file>
-
-<file path=ppt/slides/slide9.xml><?xml version="1.0" encoding="utf-8"?>
-<p:sld xmlns:a="http://schemas.openxmlformats.org/drawingml/2006/main" xmlns:r="http://schemas.openxmlformats.org/officeDocument/2006/relationships" xmlns:p="http://schemas.openxmlformats.org/presentationml/2006/main">
-  <p:cSld>
-    <p:spTree>
-      <p:nvGrpSpPr>
-        <p:cNvPr id="1" name=""/>
-        <p:cNvGrpSpPr/>
-        <p:nvPr/>
-      </p:nvGrpSpPr>
-      <p:grpSpPr>
-        <a:xfrm>
-          <a:off x="0" y="0"/>
-          <a:ext cx="0" cy="0"/>
-          <a:chOff x="0" y="0"/>
-          <a:chExt cx="0" cy="0"/>
-        </a:xfrm>
-      </p:grpSpPr>
       <p:pic>
         <p:nvPicPr>
           <p:cNvPr id="4" name="Content Placeholder 3"/>
@@ -14138,7 +14255,15 @@
             <a:pPr algn="ctr"/>
             <a:r>
               <a:rPr lang="en-US" dirty="0" smtClean="0"/>
-              <a:t>Individual Education level is Highly correlated with unemployment risk</a:t>
+              <a:t>Individual Education level is </a:t>
+            </a:r>
+            <a:r>
+              <a:rPr lang="en-US" dirty="0" smtClean="0"/>
+              <a:t>correlated </a:t>
+            </a:r>
+            <a:r>
+              <a:rPr lang="en-US" dirty="0" smtClean="0"/>
+              <a:t>with unemployment risk</a:t>
             </a:r>
             <a:endParaRPr lang="en-US" dirty="0"/>
           </a:p>
@@ -14305,6 +14430,180 @@
     <p:extLst>
       <p:ext uri="{BB962C8B-B14F-4D97-AF65-F5344CB8AC3E}">
         <p14:creationId xmlns:p14="http://schemas.microsoft.com/office/powerpoint/2010/main" val="3409467733"/>
+      </p:ext>
+    </p:extLst>
+  </p:cSld>
+  <p:clrMapOvr>
+    <a:masterClrMapping/>
+  </p:clrMapOvr>
+</p:sld>
+</file>
+
+<file path=ppt/slides/slide9.xml><?xml version="1.0" encoding="utf-8"?>
+<p:sld xmlns:a="http://schemas.openxmlformats.org/drawingml/2006/main" xmlns:r="http://schemas.openxmlformats.org/officeDocument/2006/relationships" xmlns:p="http://schemas.openxmlformats.org/presentationml/2006/main">
+  <p:cSld>
+    <p:spTree>
+      <p:nvGrpSpPr>
+        <p:cNvPr id="1" name=""/>
+        <p:cNvGrpSpPr/>
+        <p:nvPr/>
+      </p:nvGrpSpPr>
+      <p:grpSpPr>
+        <a:xfrm>
+          <a:off x="0" y="0"/>
+          <a:ext cx="0" cy="0"/>
+          <a:chOff x="0" y="0"/>
+          <a:chExt cx="0" cy="0"/>
+        </a:xfrm>
+      </p:grpSpPr>
+      <p:pic>
+        <p:nvPicPr>
+          <p:cNvPr id="4" name="Content Placeholder 3"/>
+          <p:cNvPicPr>
+            <a:picLocks noGrp="1" noChangeAspect="1"/>
+          </p:cNvPicPr>
+          <p:nvPr>
+            <p:ph idx="1"/>
+          </p:nvPr>
+        </p:nvPicPr>
+        <p:blipFill>
+          <a:blip r:embed="rId2">
+            <a:extLst>
+              <a:ext uri="{28A0092B-C50C-407E-A947-70E740481C1C}">
+                <a14:useLocalDpi xmlns:a14="http://schemas.microsoft.com/office/drawing/2010/main" val="0"/>
+              </a:ext>
+            </a:extLst>
+          </a:blip>
+          <a:stretch>
+            <a:fillRect/>
+          </a:stretch>
+        </p:blipFill>
+        <p:spPr>
+          <a:xfrm>
+            <a:off x="1081942" y="3935558"/>
+            <a:ext cx="3042744" cy="2286000"/>
+          </a:xfrm>
+        </p:spPr>
+      </p:pic>
+      <p:sp>
+        <p:nvSpPr>
+          <p:cNvPr id="3" name="Title 2"/>
+          <p:cNvSpPr>
+            <a:spLocks noGrp="1"/>
+          </p:cNvSpPr>
+          <p:nvPr>
+            <p:ph type="title"/>
+          </p:nvPr>
+        </p:nvSpPr>
+        <p:spPr/>
+        <p:txBody>
+          <a:bodyPr>
+            <a:normAutofit fontScale="90000"/>
+          </a:bodyPr>
+          <a:lstStyle/>
+          <a:p>
+            <a:r>
+              <a:rPr lang="en-US" dirty="0" smtClean="0"/>
+              <a:t>More young individuals identify as having a mental illness</a:t>
+            </a:r>
+            <a:endParaRPr lang="en-US" dirty="0"/>
+          </a:p>
+        </p:txBody>
+      </p:sp>
+      <p:pic>
+        <p:nvPicPr>
+          <p:cNvPr id="5" name="Picture 4"/>
+          <p:cNvPicPr>
+            <a:picLocks noChangeAspect="1"/>
+          </p:cNvPicPr>
+          <p:nvPr/>
+        </p:nvPicPr>
+        <p:blipFill>
+          <a:blip r:embed="rId3">
+            <a:extLst>
+              <a:ext uri="{28A0092B-C50C-407E-A947-70E740481C1C}">
+                <a14:useLocalDpi xmlns:a14="http://schemas.microsoft.com/office/drawing/2010/main" val="0"/>
+              </a:ext>
+            </a:extLst>
+          </a:blip>
+          <a:stretch>
+            <a:fillRect/>
+          </a:stretch>
+        </p:blipFill>
+        <p:spPr>
+          <a:xfrm>
+            <a:off x="4287310" y="2510683"/>
+            <a:ext cx="3450271" cy="3291840"/>
+          </a:xfrm>
+          <a:prstGeom prst="rect">
+            <a:avLst/>
+          </a:prstGeom>
+        </p:spPr>
+      </p:pic>
+      <p:pic>
+        <p:nvPicPr>
+          <p:cNvPr id="6" name="Picture 5"/>
+          <p:cNvPicPr>
+            <a:picLocks noChangeAspect="1"/>
+          </p:cNvPicPr>
+          <p:nvPr/>
+        </p:nvPicPr>
+        <p:blipFill>
+          <a:blip r:embed="rId4">
+            <a:extLst>
+              <a:ext uri="{28A0092B-C50C-407E-A947-70E740481C1C}">
+                <a14:useLocalDpi xmlns:a14="http://schemas.microsoft.com/office/drawing/2010/main" val="0"/>
+              </a:ext>
+            </a:extLst>
+          </a:blip>
+          <a:stretch>
+            <a:fillRect/>
+          </a:stretch>
+        </p:blipFill>
+        <p:spPr>
+          <a:xfrm>
+            <a:off x="1097280" y="1649558"/>
+            <a:ext cx="3027406" cy="2286000"/>
+          </a:xfrm>
+          <a:prstGeom prst="rect">
+            <a:avLst/>
+          </a:prstGeom>
+        </p:spPr>
+      </p:pic>
+      <p:pic>
+        <p:nvPicPr>
+          <p:cNvPr id="7" name="Picture 6"/>
+          <p:cNvPicPr>
+            <a:picLocks noChangeAspect="1"/>
+          </p:cNvPicPr>
+          <p:nvPr/>
+        </p:nvPicPr>
+        <p:blipFill>
+          <a:blip r:embed="rId5">
+            <a:extLst>
+              <a:ext uri="{28A0092B-C50C-407E-A947-70E740481C1C}">
+                <a14:useLocalDpi xmlns:a14="http://schemas.microsoft.com/office/drawing/2010/main" val="0"/>
+              </a:ext>
+            </a:extLst>
+          </a:blip>
+          <a:stretch>
+            <a:fillRect/>
+          </a:stretch>
+        </p:blipFill>
+        <p:spPr>
+          <a:xfrm>
+            <a:off x="7900205" y="2510683"/>
+            <a:ext cx="3549869" cy="3200400"/>
+          </a:xfrm>
+          <a:prstGeom prst="rect">
+            <a:avLst/>
+          </a:prstGeom>
+        </p:spPr>
+      </p:pic>
+    </p:spTree>
+    <p:extLst>
+      <p:ext uri="{BB962C8B-B14F-4D97-AF65-F5344CB8AC3E}">
+        <p14:creationId xmlns:p14="http://schemas.microsoft.com/office/powerpoint/2010/main" val="414236368"/>
       </p:ext>
     </p:extLst>
   </p:cSld>
@@ -14859,6 +15158,15 @@
 </file>
 
 <file path=customXml/item1.xml><?xml version="1.0" encoding="utf-8"?>
+<p:properties xmlns:p="http://schemas.microsoft.com/office/2006/metadata/properties" xmlns:xsi="http://www.w3.org/2001/XMLSchema-instance" xmlns:pc="http://schemas.microsoft.com/office/infopath/2007/PartnerControls">
+  <documentManagement>
+    <Status xmlns="71af3243-3dd4-4a8d-8c0d-dd76da1f02a5">Not started</Status>
+    <MediaServiceKeyPoints xmlns="71af3243-3dd4-4a8d-8c0d-dd76da1f02a5" xsi:nil="true"/>
+  </documentManagement>
+</p:properties>
+</file>
+
+<file path=customXml/item2.xml><?xml version="1.0" encoding="utf-8"?>
 <ct:contentTypeSchema xmlns:ct="http://schemas.microsoft.com/office/2006/metadata/contentType" xmlns:ma="http://schemas.microsoft.com/office/2006/metadata/properties/metaAttributes" ct:_="" ma:_="" ma:contentTypeName="Document" ma:contentTypeID="0x01010079F111ED35F8CC479449609E8A0923A6" ma:contentTypeVersion="12" ma:contentTypeDescription="Create a new document." ma:contentTypeScope="" ma:versionID="fa6e671f1cd7e4d96ff9652be322dd5e">
   <xsd:schema xmlns:xsd="http://www.w3.org/2001/XMLSchema" xmlns:xs="http://www.w3.org/2001/XMLSchema" xmlns:p="http://schemas.microsoft.com/office/2006/metadata/properties" xmlns:ns2="71af3243-3dd4-4a8d-8c0d-dd76da1f02a5" xmlns:ns3="16c05727-aa75-4e4a-9b5f-8a80a1165891" targetNamespace="http://schemas.microsoft.com/office/2006/metadata/properties" ma:root="true" ma:fieldsID="4e2496f70b101db0b8013f30a071bbf7" ns2:_="" ns3:_="">
     <xsd:import namespace="71af3243-3dd4-4a8d-8c0d-dd76da1f02a5"/>
@@ -15079,15 +15387,6 @@
 </ct:contentTypeSchema>
 </file>
 
-<file path=customXml/item2.xml><?xml version="1.0" encoding="utf-8"?>
-<p:properties xmlns:p="http://schemas.microsoft.com/office/2006/metadata/properties" xmlns:xsi="http://www.w3.org/2001/XMLSchema-instance" xmlns:pc="http://schemas.microsoft.com/office/infopath/2007/PartnerControls">
-  <documentManagement>
-    <Status xmlns="71af3243-3dd4-4a8d-8c0d-dd76da1f02a5">Not started</Status>
-    <MediaServiceKeyPoints xmlns="71af3243-3dd4-4a8d-8c0d-dd76da1f02a5" xsi:nil="true"/>
-  </documentManagement>
-</p:properties>
-</file>
-
 <file path=customXml/item3.xml><?xml version="1.0" encoding="utf-8"?>
 <?mso-contentType ?>
 <FormTemplates xmlns="http://schemas.microsoft.com/sharepoint/v3/contenttype/forms">
@@ -15098,6 +15397,23 @@
 </file>
 
 <file path=customXml/itemProps1.xml><?xml version="1.0" encoding="utf-8"?>
+<ds:datastoreItem xmlns:ds="http://schemas.openxmlformats.org/officeDocument/2006/customXml" ds:itemID="{44FAF7B5-E40C-46BE-9C83-DA251FCAE61E}">
+  <ds:schemaRefs>
+    <ds:schemaRef ds:uri="http://schemas.openxmlformats.org/package/2006/metadata/core-properties"/>
+    <ds:schemaRef ds:uri="http://purl.org/dc/terms/"/>
+    <ds:schemaRef ds:uri="http://purl.org/dc/elements/1.1/"/>
+    <ds:schemaRef ds:uri="http://schemas.microsoft.com/office/2006/metadata/properties"/>
+    <ds:schemaRef ds:uri="16c05727-aa75-4e4a-9b5f-8a80a1165891"/>
+    <ds:schemaRef ds:uri="71af3243-3dd4-4a8d-8c0d-dd76da1f02a5"/>
+    <ds:schemaRef ds:uri="http://schemas.microsoft.com/office/2006/documentManagement/types"/>
+    <ds:schemaRef ds:uri="http://purl.org/dc/dcmitype/"/>
+    <ds:schemaRef ds:uri="http://schemas.microsoft.com/office/infopath/2007/PartnerControls"/>
+    <ds:schemaRef ds:uri="http://www.w3.org/XML/1998/namespace"/>
+  </ds:schemaRefs>
+</ds:datastoreItem>
+</file>
+
+<file path=customXml/itemProps2.xml><?xml version="1.0" encoding="utf-8"?>
 <ds:datastoreItem xmlns:ds="http://schemas.openxmlformats.org/officeDocument/2006/customXml" ds:itemID="{E0A43D08-F4F9-4D95-9CB2-7DE374416074}">
   <ds:schemaRefs>
     <ds:schemaRef ds:uri="http://schemas.microsoft.com/office/2006/metadata/contentType"/>
@@ -15116,23 +15432,6 @@
 </ds:datastoreItem>
 </file>
 
-<file path=customXml/itemProps2.xml><?xml version="1.0" encoding="utf-8"?>
-<ds:datastoreItem xmlns:ds="http://schemas.openxmlformats.org/officeDocument/2006/customXml" ds:itemID="{44FAF7B5-E40C-46BE-9C83-DA251FCAE61E}">
-  <ds:schemaRefs>
-    <ds:schemaRef ds:uri="http://schemas.openxmlformats.org/package/2006/metadata/core-properties"/>
-    <ds:schemaRef ds:uri="http://purl.org/dc/terms/"/>
-    <ds:schemaRef ds:uri="http://purl.org/dc/elements/1.1/"/>
-    <ds:schemaRef ds:uri="http://schemas.microsoft.com/office/2006/metadata/properties"/>
-    <ds:schemaRef ds:uri="16c05727-aa75-4e4a-9b5f-8a80a1165891"/>
-    <ds:schemaRef ds:uri="71af3243-3dd4-4a8d-8c0d-dd76da1f02a5"/>
-    <ds:schemaRef ds:uri="http://schemas.microsoft.com/office/2006/documentManagement/types"/>
-    <ds:schemaRef ds:uri="http://purl.org/dc/dcmitype/"/>
-    <ds:schemaRef ds:uri="http://schemas.microsoft.com/office/infopath/2007/PartnerControls"/>
-    <ds:schemaRef ds:uri="http://www.w3.org/XML/1998/namespace"/>
-  </ds:schemaRefs>
-</ds:datastoreItem>
-</file>
-
 <file path=customXml/itemProps3.xml><?xml version="1.0" encoding="utf-8"?>
 <ds:datastoreItem xmlns:ds="http://schemas.openxmlformats.org/officeDocument/2006/customXml" ds:itemID="{5029FA76-0C86-4BF1-99F1-A3115FBFFAB0}">
   <ds:schemaRefs>

</xml_diff>

<commit_message>
updated presentation and sorted education levels
</commit_message>
<xml_diff>
--- a/Presentation/Presentation_draft.pptx
+++ b/Presentation/Presentation_draft.pptx
@@ -3953,6 +3953,90 @@
           <a:bodyPr/>
           <a:lstStyle/>
           <a:p>
+            <a:endParaRPr lang="en-US" dirty="0"/>
+          </a:p>
+        </p:txBody>
+      </p:sp>
+      <p:sp>
+        <p:nvSpPr>
+          <p:cNvPr id="4" name="Slide Number Placeholder 3"/>
+          <p:cNvSpPr>
+            <a:spLocks noGrp="1"/>
+          </p:cNvSpPr>
+          <p:nvPr>
+            <p:ph type="sldNum" sz="quarter" idx="10"/>
+          </p:nvPr>
+        </p:nvSpPr>
+        <p:spPr/>
+        <p:txBody>
+          <a:bodyPr/>
+          <a:lstStyle/>
+          <a:p>
+            <a:fld id="{C4FB36FD-63E9-4B21-B460-CBDD71FD9678}" type="slidenum">
+              <a:rPr lang="en-US" smtClean="0"/>
+              <a:t>1</a:t>
+            </a:fld>
+            <a:endParaRPr lang="en-US"/>
+          </a:p>
+        </p:txBody>
+      </p:sp>
+    </p:spTree>
+    <p:extLst>
+      <p:ext uri="{BB962C8B-B14F-4D97-AF65-F5344CB8AC3E}">
+        <p14:creationId xmlns:p14="http://schemas.microsoft.com/office/powerpoint/2010/main" val="994204263"/>
+      </p:ext>
+    </p:extLst>
+  </p:cSld>
+  <p:clrMapOvr>
+    <a:masterClrMapping/>
+  </p:clrMapOvr>
+</p:notes>
+</file>
+
+<file path=ppt/notesSlides/notesSlide2.xml><?xml version="1.0" encoding="utf-8"?>
+<p:notes xmlns:a="http://schemas.openxmlformats.org/drawingml/2006/main" xmlns:r="http://schemas.openxmlformats.org/officeDocument/2006/relationships" xmlns:p="http://schemas.openxmlformats.org/presentationml/2006/main">
+  <p:cSld>
+    <p:spTree>
+      <p:nvGrpSpPr>
+        <p:cNvPr id="1" name=""/>
+        <p:cNvGrpSpPr/>
+        <p:nvPr/>
+      </p:nvGrpSpPr>
+      <p:grpSpPr>
+        <a:xfrm>
+          <a:off x="0" y="0"/>
+          <a:ext cx="0" cy="0"/>
+          <a:chOff x="0" y="0"/>
+          <a:chExt cx="0" cy="0"/>
+        </a:xfrm>
+      </p:grpSpPr>
+      <p:sp>
+        <p:nvSpPr>
+          <p:cNvPr id="2" name="Slide Image Placeholder 1"/>
+          <p:cNvSpPr>
+            <a:spLocks noGrp="1" noRot="1" noChangeAspect="1"/>
+          </p:cNvSpPr>
+          <p:nvPr>
+            <p:ph type="sldImg"/>
+          </p:nvPr>
+        </p:nvSpPr>
+        <p:spPr/>
+      </p:sp>
+      <p:sp>
+        <p:nvSpPr>
+          <p:cNvPr id="3" name="Notes Placeholder 2"/>
+          <p:cNvSpPr>
+            <a:spLocks noGrp="1"/>
+          </p:cNvSpPr>
+          <p:nvPr>
+            <p:ph type="body" idx="1"/>
+          </p:nvPr>
+        </p:nvSpPr>
+        <p:spPr/>
+        <p:txBody>
+          <a:bodyPr/>
+          <a:lstStyle/>
+          <a:p>
             <a:pPr marL="0" marR="0" indent="0" algn="l" defTabSz="914400" rtl="0" eaLnBrk="1" fontAlgn="auto" latinLnBrk="0" hangingPunct="1">
               <a:lnSpc>
                 <a:spcPct val="100000"/>
@@ -3972,7 +4056,82 @@
             </a:pPr>
             <a:r>
               <a:rPr lang="en-US" dirty="0" smtClean="0"/>
-              <a:t>Mental Health America compiled state-level data about mental illness and access to care at from multiple nationwide surveys (including NSDUH and BRFSS</a:t>
+              <a:t>NAMI = National Alliance on</a:t>
+            </a:r>
+            <a:r>
+              <a:rPr lang="en-US" baseline="0" dirty="0" smtClean="0"/>
+              <a:t> Mental Illness</a:t>
+            </a:r>
+          </a:p>
+          <a:p>
+            <a:pPr marL="0" marR="0" indent="0" algn="l" defTabSz="914400" rtl="0" eaLnBrk="1" fontAlgn="auto" latinLnBrk="0" hangingPunct="1">
+              <a:lnSpc>
+                <a:spcPct val="100000"/>
+              </a:lnSpc>
+              <a:spcBef>
+                <a:spcPts val="0"/>
+              </a:spcBef>
+              <a:spcAft>
+                <a:spcPts val="0"/>
+              </a:spcAft>
+              <a:buClrTx/>
+              <a:buSzTx/>
+              <a:buFontTx/>
+              <a:buNone/>
+              <a:tabLst/>
+              <a:defRPr/>
+            </a:pPr>
+            <a:r>
+              <a:rPr lang="en-US" baseline="0" dirty="0" smtClean="0"/>
+              <a:t>BRFSS = Behavior Risk Factor Surveillance System</a:t>
+            </a:r>
+            <a:endParaRPr lang="en-US" dirty="0" smtClean="0"/>
+          </a:p>
+          <a:p>
+            <a:pPr marL="0" marR="0" indent="0" algn="l" defTabSz="914400" rtl="0" eaLnBrk="1" fontAlgn="auto" latinLnBrk="0" hangingPunct="1">
+              <a:lnSpc>
+                <a:spcPct val="100000"/>
+              </a:lnSpc>
+              <a:spcBef>
+                <a:spcPts val="0"/>
+              </a:spcBef>
+              <a:spcAft>
+                <a:spcPts val="0"/>
+              </a:spcAft>
+              <a:buClrTx/>
+              <a:buSzTx/>
+              <a:buFontTx/>
+              <a:buNone/>
+              <a:tabLst/>
+              <a:defRPr/>
+            </a:pPr>
+            <a:endParaRPr lang="en-US" dirty="0" smtClean="0"/>
+          </a:p>
+          <a:p>
+            <a:pPr marL="0" marR="0" indent="0" algn="l" defTabSz="914400" rtl="0" eaLnBrk="1" fontAlgn="auto" latinLnBrk="0" hangingPunct="1">
+              <a:lnSpc>
+                <a:spcPct val="100000"/>
+              </a:lnSpc>
+              <a:spcBef>
+                <a:spcPts val="0"/>
+              </a:spcBef>
+              <a:spcAft>
+                <a:spcPts val="0"/>
+              </a:spcAft>
+              <a:buClrTx/>
+              <a:buSzTx/>
+              <a:buFontTx/>
+              <a:buNone/>
+              <a:tabLst/>
+              <a:defRPr/>
+            </a:pPr>
+            <a:r>
+              <a:rPr lang="en-US" dirty="0" smtClean="0"/>
+              <a:t>Mental </a:t>
+            </a:r>
+            <a:r>
+              <a:rPr lang="en-US" dirty="0" smtClean="0"/>
+              <a:t>Health America compiled state-level data about mental illness and access to care at from multiple nationwide surveys (including NSDUH and BRFSS</a:t>
             </a:r>
           </a:p>
           <a:p>
@@ -4016,7 +4175,7 @@
 </p:notes>
 </file>
 
-<file path=ppt/notesSlides/notesSlide2.xml><?xml version="1.0" encoding="utf-8"?>
+<file path=ppt/notesSlides/notesSlide3.xml><?xml version="1.0" encoding="utf-8"?>
 <p:notes xmlns:a="http://schemas.openxmlformats.org/drawingml/2006/main" xmlns:r="http://schemas.openxmlformats.org/officeDocument/2006/relationships" xmlns:p="http://schemas.openxmlformats.org/presentationml/2006/main">
   <p:cSld>
     <p:spTree>
@@ -9608,10 +9767,10 @@
           <a:lstStyle/>
           <a:p>
             <a:r>
-              <a:rPr lang="en-US" sz="5400" cap="none" dirty="0" smtClean="0"/>
+              <a:rPr lang="en-US" sz="4800" cap="none" dirty="0" smtClean="0"/>
               <a:t>Mental Illness And Unemployment In The United States</a:t>
             </a:r>
-            <a:endParaRPr lang="en-US" sz="5400" cap="none" dirty="0"/>
+            <a:endParaRPr lang="en-US" sz="4800" cap="none" dirty="0"/>
           </a:p>
         </p:txBody>
       </p:sp>
@@ -9627,12 +9786,43 @@
         </p:nvSpPr>
         <p:spPr/>
         <p:txBody>
-          <a:bodyPr/>
+          <a:bodyPr>
+            <a:normAutofit fontScale="77500" lnSpcReduction="20000"/>
+          </a:bodyPr>
           <a:lstStyle/>
           <a:p>
+            <a:pPr algn="just"/>
             <a:r>
               <a:rPr lang="en-US" dirty="0" smtClean="0"/>
-              <a:t>Hannah Hill, Nicholas </a:t>
+              <a:t>Hannah </a:t>
+            </a:r>
+            <a:r>
+              <a:rPr lang="en-US" dirty="0" smtClean="0"/>
+              <a:t>Hill </a:t>
+            </a:r>
+            <a:r>
+              <a:rPr lang="en-US" dirty="0"/>
+              <a:t>- </a:t>
+            </a:r>
+            <a:r>
+              <a:rPr lang="en-US" dirty="0" smtClean="0"/>
+              <a:t>Retrieved </a:t>
+            </a:r>
+            <a:r>
+              <a:rPr lang="en-US" dirty="0"/>
+              <a:t>Data, </a:t>
+            </a:r>
+            <a:r>
+              <a:rPr lang="en-US" dirty="0" smtClean="0"/>
+              <a:t>Summarized Findings</a:t>
+            </a:r>
+            <a:endParaRPr lang="en-US" dirty="0" smtClean="0"/>
+          </a:p>
+          <a:p>
+            <a:pPr algn="just"/>
+            <a:r>
+              <a:rPr lang="en-US" dirty="0" smtClean="0"/>
+              <a:t>Nicholas </a:t>
             </a:r>
             <a:r>
               <a:rPr lang="en-US" dirty="0" err="1" smtClean="0"/>
@@ -9640,7 +9830,19 @@
             </a:r>
             <a:r>
               <a:rPr lang="en-US" dirty="0" smtClean="0"/>
-              <a:t>, Cecilia Zhang</a:t>
+              <a:t> – Cleaned data, Made </a:t>
+            </a:r>
+            <a:r>
+              <a:rPr lang="en-US" dirty="0" err="1" smtClean="0"/>
+              <a:t>Heatmaps</a:t>
+            </a:r>
+            <a:endParaRPr lang="en-US" dirty="0" smtClean="0"/>
+          </a:p>
+          <a:p>
+            <a:pPr algn="just"/>
+            <a:r>
+              <a:rPr lang="en-US" dirty="0" smtClean="0"/>
+              <a:t>Cecilia Zhang – Visualized Data, performed regressions</a:t>
             </a:r>
             <a:endParaRPr lang="en-US" dirty="0"/>
           </a:p>
@@ -9656,6 +9858,13 @@
   <p:clrMapOvr>
     <a:masterClrMapping/>
   </p:clrMapOvr>
+  <p:timing>
+    <p:tnLst>
+      <p:par>
+        <p:cTn id="1" dur="indefinite" restart="never" nodeType="tmRoot"/>
+      </p:par>
+    </p:tnLst>
+  </p:timing>
 </p:sld>
 </file>
 
@@ -9796,6 +10005,13 @@
   <p:clrMapOvr>
     <a:masterClrMapping/>
   </p:clrMapOvr>
+  <p:timing>
+    <p:tnLst>
+      <p:par>
+        <p:cTn id="1" dur="indefinite" restart="never" nodeType="tmRoot"/>
+      </p:par>
+    </p:tnLst>
+  </p:timing>
 </p:sld>
 </file>
 
@@ -10018,6 +10234,13 @@
   <p:clrMapOvr>
     <a:masterClrMapping/>
   </p:clrMapOvr>
+  <p:timing>
+    <p:tnLst>
+      <p:par>
+        <p:cTn id="1" dur="indefinite" restart="never" nodeType="tmRoot"/>
+      </p:par>
+    </p:tnLst>
+  </p:timing>
 </p:sld>
 </file>
 
@@ -11177,6 +11400,13 @@
   <p:clrMapOvr>
     <a:masterClrMapping/>
   </p:clrMapOvr>
+  <p:timing>
+    <p:tnLst>
+      <p:par>
+        <p:cTn id="1" dur="indefinite" restart="never" nodeType="tmRoot"/>
+      </p:par>
+    </p:tnLst>
+  </p:timing>
 </p:sld>
 </file>
 
@@ -12336,6 +12566,13 @@
   <p:clrMapOvr>
     <a:masterClrMapping/>
   </p:clrMapOvr>
+  <p:timing>
+    <p:tnLst>
+      <p:par>
+        <p:cTn id="1" dur="indefinite" restart="never" nodeType="tmRoot"/>
+      </p:par>
+    </p:tnLst>
+  </p:timing>
 </p:sld>
 </file>
 
@@ -12517,6 +12754,13 @@
   <p:clrMapOvr>
     <a:masterClrMapping/>
   </p:clrMapOvr>
+  <p:timing>
+    <p:tnLst>
+      <p:par>
+        <p:cTn id="1" dur="indefinite" restart="never" nodeType="tmRoot"/>
+      </p:par>
+    </p:tnLst>
+  </p:timing>
 </p:sld>
 </file>
 
@@ -12690,6 +12934,61 @@
           </a:p>
         </p:txBody>
       </p:sp>
+      <p:sp>
+        <p:nvSpPr>
+          <p:cNvPr id="8" name="TextBox 7"/>
+          <p:cNvSpPr txBox="1"/>
+          <p:nvPr/>
+        </p:nvSpPr>
+        <p:spPr>
+          <a:xfrm>
+            <a:off x="3183468" y="5518659"/>
+            <a:ext cx="1189749" cy="369332"/>
+          </a:xfrm>
+          <a:prstGeom prst="rect">
+            <a:avLst/>
+          </a:prstGeom>
+        </p:spPr>
+        <p:style>
+          <a:lnRef idx="2">
+            <a:schemeClr val="dk1"/>
+          </a:lnRef>
+          <a:fillRef idx="1">
+            <a:schemeClr val="lt1"/>
+          </a:fillRef>
+          <a:effectRef idx="0">
+            <a:schemeClr val="dk1"/>
+          </a:effectRef>
+          <a:fontRef idx="minor">
+            <a:schemeClr val="dk1"/>
+          </a:fontRef>
+        </p:style>
+        <p:txBody>
+          <a:bodyPr wrap="none" rtlCol="0">
+            <a:spAutoFit/>
+          </a:bodyPr>
+          <a:lstStyle/>
+          <a:p>
+            <a:r>
+              <a:rPr lang="en-US" dirty="0" smtClean="0"/>
+              <a:t>R</a:t>
+            </a:r>
+            <a:r>
+              <a:rPr lang="en-US" baseline="30000" dirty="0" smtClean="0"/>
+              <a:t>2</a:t>
+            </a:r>
+            <a:r>
+              <a:rPr lang="en-US" dirty="0" smtClean="0"/>
+              <a:t>= </a:t>
+            </a:r>
+            <a:r>
+              <a:rPr lang="en-US" dirty="0" smtClean="0"/>
+              <a:t>0.042</a:t>
+            </a:r>
+            <a:endParaRPr lang="en-US" dirty="0"/>
+          </a:p>
+        </p:txBody>
+      </p:sp>
     </p:spTree>
     <p:extLst>
       <p:ext uri="{BB962C8B-B14F-4D97-AF65-F5344CB8AC3E}">
@@ -12700,6 +12999,127 @@
   <p:clrMapOvr>
     <a:masterClrMapping/>
   </p:clrMapOvr>
+  <p:timing>
+    <p:tnLst>
+      <p:par>
+        <p:cTn id="1" dur="indefinite" restart="never" nodeType="tmRoot">
+          <p:childTnLst>
+            <p:seq concurrent="1" nextAc="seek">
+              <p:cTn id="2" dur="indefinite" nodeType="mainSeq">
+                <p:childTnLst>
+                  <p:par>
+                    <p:cTn id="3" fill="hold">
+                      <p:stCondLst>
+                        <p:cond delay="indefinite"/>
+                      </p:stCondLst>
+                      <p:childTnLst>
+                        <p:par>
+                          <p:cTn id="4" fill="hold">
+                            <p:stCondLst>
+                              <p:cond delay="0"/>
+                            </p:stCondLst>
+                            <p:childTnLst>
+                              <p:par>
+                                <p:cTn id="5" presetID="10" presetClass="entr" presetSubtype="0" fill="hold" nodeType="clickEffect">
+                                  <p:stCondLst>
+                                    <p:cond delay="0"/>
+                                  </p:stCondLst>
+                                  <p:childTnLst>
+                                    <p:set>
+                                      <p:cBhvr>
+                                        <p:cTn id="6" dur="1" fill="hold">
+                                          <p:stCondLst>
+                                            <p:cond delay="0"/>
+                                          </p:stCondLst>
+                                        </p:cTn>
+                                        <p:tgtEl>
+                                          <p:spTgt spid="4"/>
+                                        </p:tgtEl>
+                                        <p:attrNameLst>
+                                          <p:attrName>style.visibility</p:attrName>
+                                        </p:attrNameLst>
+                                      </p:cBhvr>
+                                      <p:to>
+                                        <p:strVal val="visible"/>
+                                      </p:to>
+                                    </p:set>
+                                    <p:animEffect transition="in" filter="fade">
+                                      <p:cBhvr>
+                                        <p:cTn id="7" dur="500"/>
+                                        <p:tgtEl>
+                                          <p:spTgt spid="4"/>
+                                        </p:tgtEl>
+                                      </p:cBhvr>
+                                    </p:animEffect>
+                                  </p:childTnLst>
+                                </p:cTn>
+                              </p:par>
+                              <p:par>
+                                <p:cTn id="8" presetID="10" presetClass="entr" presetSubtype="0" fill="hold" grpId="0" nodeType="withEffect">
+                                  <p:stCondLst>
+                                    <p:cond delay="0"/>
+                                  </p:stCondLst>
+                                  <p:childTnLst>
+                                    <p:set>
+                                      <p:cBhvr>
+                                        <p:cTn id="9" dur="1" fill="hold">
+                                          <p:stCondLst>
+                                            <p:cond delay="0"/>
+                                          </p:stCondLst>
+                                        </p:cTn>
+                                        <p:tgtEl>
+                                          <p:spTgt spid="8"/>
+                                        </p:tgtEl>
+                                        <p:attrNameLst>
+                                          <p:attrName>style.visibility</p:attrName>
+                                        </p:attrNameLst>
+                                      </p:cBhvr>
+                                      <p:to>
+                                        <p:strVal val="visible"/>
+                                      </p:to>
+                                    </p:set>
+                                    <p:animEffect transition="in" filter="fade">
+                                      <p:cBhvr>
+                                        <p:cTn id="10" dur="500"/>
+                                        <p:tgtEl>
+                                          <p:spTgt spid="8"/>
+                                        </p:tgtEl>
+                                      </p:cBhvr>
+                                    </p:animEffect>
+                                  </p:childTnLst>
+                                </p:cTn>
+                              </p:par>
+                            </p:childTnLst>
+                          </p:cTn>
+                        </p:par>
+                      </p:childTnLst>
+                    </p:cTn>
+                  </p:par>
+                </p:childTnLst>
+              </p:cTn>
+              <p:prevCondLst>
+                <p:cond evt="onPrev" delay="0">
+                  <p:tgtEl>
+                    <p:sldTgt/>
+                  </p:tgtEl>
+                </p:cond>
+              </p:prevCondLst>
+              <p:nextCondLst>
+                <p:cond evt="onNext" delay="0">
+                  <p:tgtEl>
+                    <p:sldTgt/>
+                  </p:tgtEl>
+                </p:cond>
+              </p:nextCondLst>
+            </p:seq>
+          </p:childTnLst>
+        </p:cTn>
+      </p:par>
+    </p:tnLst>
+    <p:bldLst>
+      <p:bldP spid="8" grpId="0" animBg="1"/>
+    </p:bldLst>
+  </p:timing>
 </p:sld>
 </file>
 
@@ -12730,10 +13150,15 @@
             <p:ph idx="1"/>
           </p:nvPr>
         </p:nvSpPr>
-        <p:spPr/>
+        <p:spPr>
+          <a:xfrm>
+            <a:off x="1097280" y="1945239"/>
+            <a:ext cx="10058400" cy="3760891"/>
+          </a:xfrm>
+        </p:spPr>
         <p:txBody>
           <a:bodyPr>
-            <a:normAutofit fontScale="92500" lnSpcReduction="20000"/>
+            <a:noAutofit/>
           </a:bodyPr>
           <a:lstStyle/>
           <a:p>
@@ -12742,19 +13167,19 @@
               <a:buChar char="•"/>
             </a:pPr>
             <a:r>
-              <a:rPr lang="en-US" dirty="0"/>
+              <a:rPr lang="en-US" sz="1800" dirty="0"/>
               <a:t>Individuals with diagnosed mental illness (</a:t>
             </a:r>
             <a:r>
-              <a:rPr lang="en-US" dirty="0" smtClean="0"/>
+              <a:rPr lang="en-US" sz="1800" dirty="0" smtClean="0"/>
               <a:t>MI) more </a:t>
             </a:r>
             <a:r>
-              <a:rPr lang="en-US" dirty="0"/>
+              <a:rPr lang="en-US" sz="1800" dirty="0"/>
               <a:t>likely to be </a:t>
             </a:r>
             <a:r>
-              <a:rPr lang="en-US" dirty="0" smtClean="0"/>
+              <a:rPr lang="en-US" sz="1800" dirty="0" smtClean="0"/>
               <a:t>unemployed</a:t>
             </a:r>
           </a:p>
@@ -12764,13 +13189,14 @@
               <a:buChar char="•"/>
             </a:pPr>
             <a:r>
-              <a:rPr lang="en-US" dirty="0"/>
+              <a:rPr lang="en-US" sz="1800" dirty="0"/>
               <a:t>Unemployed individuals more likely to suffer from one or more mental health </a:t>
             </a:r>
             <a:r>
-              <a:rPr lang="en-US" dirty="0" smtClean="0"/>
-              <a:t>conditions</a:t>
-            </a:r>
+              <a:rPr lang="en-US" sz="1800" dirty="0" smtClean="0"/>
+              <a:t>symptoms</a:t>
+            </a:r>
+            <a:endParaRPr lang="en-US" sz="1800" dirty="0" smtClean="0"/>
           </a:p>
           <a:p>
             <a:pPr>
@@ -12778,19 +13204,19 @@
               <a:buChar char="•"/>
             </a:pPr>
             <a:r>
-              <a:rPr lang="en-US" dirty="0"/>
+              <a:rPr lang="en-US" sz="1800" dirty="0"/>
               <a:t>More young individuals </a:t>
             </a:r>
             <a:r>
-              <a:rPr lang="en-US" dirty="0" smtClean="0"/>
+              <a:rPr lang="en-US" sz="1800" dirty="0" smtClean="0"/>
               <a:t>(18-29) identify </a:t>
             </a:r>
             <a:r>
-              <a:rPr lang="en-US" dirty="0"/>
+              <a:rPr lang="en-US" sz="1800" dirty="0"/>
               <a:t>as having a mental </a:t>
             </a:r>
             <a:r>
-              <a:rPr lang="en-US" dirty="0" smtClean="0"/>
+              <a:rPr lang="en-US" sz="1800" dirty="0" smtClean="0"/>
               <a:t>illness than older individuals (60+).</a:t>
             </a:r>
           </a:p>
@@ -12800,7 +13226,7 @@
               <a:buChar char="•"/>
             </a:pPr>
             <a:r>
-              <a:rPr lang="en-US" dirty="0" smtClean="0"/>
+              <a:rPr lang="en-US" sz="1600" dirty="0" smtClean="0"/>
               <a:t>However, these groups have similar rates of unemployment</a:t>
             </a:r>
           </a:p>
@@ -12810,15 +13236,19 @@
               <a:buChar char="•"/>
             </a:pPr>
             <a:r>
-              <a:rPr lang="en-US" dirty="0" smtClean="0"/>
+              <a:rPr lang="en-US" sz="1800" dirty="0" smtClean="0"/>
               <a:t>Appears to be </a:t>
             </a:r>
             <a:r>
-              <a:rPr lang="en-US" dirty="0"/>
-              <a:t>correlation between Mental Illness and Unemployment at the state </a:t>
-            </a:r>
-            <a:r>
-              <a:rPr lang="en-US" dirty="0" smtClean="0"/>
+              <a:rPr lang="en-US" sz="1800" dirty="0" smtClean="0"/>
+              <a:t>no correlation </a:t>
+            </a:r>
+            <a:r>
+              <a:rPr lang="en-US" sz="1800" dirty="0"/>
+              <a:t>between Mental Illness and Unemployment at the state </a:t>
+            </a:r>
+            <a:r>
+              <a:rPr lang="en-US" sz="1800" dirty="0" smtClean="0"/>
               <a:t>level.</a:t>
             </a:r>
           </a:p>
@@ -12828,15 +13258,15 @@
               <a:buChar char="•"/>
             </a:pPr>
             <a:r>
-              <a:rPr lang="en-US" dirty="0" smtClean="0"/>
+              <a:rPr lang="en-US" sz="1600" dirty="0" smtClean="0"/>
               <a:t>However, geographically</a:t>
             </a:r>
             <a:r>
-              <a:rPr lang="en-US" dirty="0"/>
+              <a:rPr lang="en-US" sz="1600" dirty="0"/>
               <a:t>, high rates of unemployment correlate with clustered areas of poor mental </a:t>
             </a:r>
             <a:r>
-              <a:rPr lang="en-US" dirty="0" smtClean="0"/>
+              <a:rPr lang="en-US" sz="1600" dirty="0" smtClean="0"/>
               <a:t>health</a:t>
             </a:r>
           </a:p>
@@ -12846,10 +13276,9 @@
               <a:buChar char="•"/>
             </a:pPr>
             <a:r>
-              <a:rPr lang="en-US" dirty="0"/>
+              <a:rPr lang="en-US" sz="1800" dirty="0"/>
               <a:t>At the state level, not a strong correlation between poor mental health and access to mental health care</a:t>
             </a:r>
-            <a:endParaRPr lang="en-US" dirty="0"/>
           </a:p>
         </p:txBody>
       </p:sp>
@@ -12886,6 +13315,305 @@
   <p:clrMapOvr>
     <a:masterClrMapping/>
   </p:clrMapOvr>
+  <p:timing>
+    <p:tnLst>
+      <p:par>
+        <p:cTn id="1" dur="indefinite" restart="never" nodeType="tmRoot">
+          <p:childTnLst>
+            <p:seq concurrent="1" nextAc="seek">
+              <p:cTn id="2" dur="indefinite" nodeType="mainSeq">
+                <p:childTnLst>
+                  <p:par>
+                    <p:cTn id="3" fill="hold">
+                      <p:stCondLst>
+                        <p:cond delay="indefinite"/>
+                      </p:stCondLst>
+                      <p:childTnLst>
+                        <p:par>
+                          <p:cTn id="4" fill="hold">
+                            <p:stCondLst>
+                              <p:cond delay="0"/>
+                            </p:stCondLst>
+                            <p:childTnLst>
+                              <p:par>
+                                <p:cTn id="5" presetID="10" presetClass="entr" presetSubtype="0" fill="hold" nodeType="clickEffect">
+                                  <p:stCondLst>
+                                    <p:cond delay="0"/>
+                                  </p:stCondLst>
+                                  <p:childTnLst>
+                                    <p:set>
+                                      <p:cBhvr>
+                                        <p:cTn id="6" dur="1" fill="hold">
+                                          <p:stCondLst>
+                                            <p:cond delay="0"/>
+                                          </p:stCondLst>
+                                        </p:cTn>
+                                        <p:tgtEl>
+                                          <p:spTgt spid="2">
+                                            <p:txEl>
+                                              <p:pRg st="2" end="2"/>
+                                            </p:txEl>
+                                          </p:spTgt>
+                                        </p:tgtEl>
+                                        <p:attrNameLst>
+                                          <p:attrName>style.visibility</p:attrName>
+                                        </p:attrNameLst>
+                                      </p:cBhvr>
+                                      <p:to>
+                                        <p:strVal val="visible"/>
+                                      </p:to>
+                                    </p:set>
+                                    <p:animEffect transition="in" filter="fade">
+                                      <p:cBhvr>
+                                        <p:cTn id="7" dur="500"/>
+                                        <p:tgtEl>
+                                          <p:spTgt spid="2">
+                                            <p:txEl>
+                                              <p:pRg st="2" end="2"/>
+                                            </p:txEl>
+                                          </p:spTgt>
+                                        </p:tgtEl>
+                                      </p:cBhvr>
+                                    </p:animEffect>
+                                  </p:childTnLst>
+                                </p:cTn>
+                              </p:par>
+                              <p:par>
+                                <p:cTn id="8" presetID="10" presetClass="entr" presetSubtype="0" fill="hold" nodeType="withEffect">
+                                  <p:stCondLst>
+                                    <p:cond delay="0"/>
+                                  </p:stCondLst>
+                                  <p:childTnLst>
+                                    <p:set>
+                                      <p:cBhvr>
+                                        <p:cTn id="9" dur="1" fill="hold">
+                                          <p:stCondLst>
+                                            <p:cond delay="0"/>
+                                          </p:stCondLst>
+                                        </p:cTn>
+                                        <p:tgtEl>
+                                          <p:spTgt spid="2">
+                                            <p:txEl>
+                                              <p:pRg st="3" end="3"/>
+                                            </p:txEl>
+                                          </p:spTgt>
+                                        </p:tgtEl>
+                                        <p:attrNameLst>
+                                          <p:attrName>style.visibility</p:attrName>
+                                        </p:attrNameLst>
+                                      </p:cBhvr>
+                                      <p:to>
+                                        <p:strVal val="visible"/>
+                                      </p:to>
+                                    </p:set>
+                                    <p:animEffect transition="in" filter="fade">
+                                      <p:cBhvr>
+                                        <p:cTn id="10" dur="500"/>
+                                        <p:tgtEl>
+                                          <p:spTgt spid="2">
+                                            <p:txEl>
+                                              <p:pRg st="3" end="3"/>
+                                            </p:txEl>
+                                          </p:spTgt>
+                                        </p:tgtEl>
+                                      </p:cBhvr>
+                                    </p:animEffect>
+                                  </p:childTnLst>
+                                </p:cTn>
+                              </p:par>
+                            </p:childTnLst>
+                          </p:cTn>
+                        </p:par>
+                      </p:childTnLst>
+                    </p:cTn>
+                  </p:par>
+                  <p:par>
+                    <p:cTn id="11" fill="hold">
+                      <p:stCondLst>
+                        <p:cond delay="indefinite"/>
+                      </p:stCondLst>
+                      <p:childTnLst>
+                        <p:par>
+                          <p:cTn id="12" fill="hold">
+                            <p:stCondLst>
+                              <p:cond delay="0"/>
+                            </p:stCondLst>
+                            <p:childTnLst>
+                              <p:par>
+                                <p:cTn id="13" presetID="10" presetClass="entr" presetSubtype="0" fill="hold" nodeType="clickEffect">
+                                  <p:stCondLst>
+                                    <p:cond delay="0"/>
+                                  </p:stCondLst>
+                                  <p:childTnLst>
+                                    <p:set>
+                                      <p:cBhvr>
+                                        <p:cTn id="14" dur="1" fill="hold">
+                                          <p:stCondLst>
+                                            <p:cond delay="0"/>
+                                          </p:stCondLst>
+                                        </p:cTn>
+                                        <p:tgtEl>
+                                          <p:spTgt spid="2">
+                                            <p:txEl>
+                                              <p:pRg st="4" end="4"/>
+                                            </p:txEl>
+                                          </p:spTgt>
+                                        </p:tgtEl>
+                                        <p:attrNameLst>
+                                          <p:attrName>style.visibility</p:attrName>
+                                        </p:attrNameLst>
+                                      </p:cBhvr>
+                                      <p:to>
+                                        <p:strVal val="visible"/>
+                                      </p:to>
+                                    </p:set>
+                                    <p:animEffect transition="in" filter="fade">
+                                      <p:cBhvr>
+                                        <p:cTn id="15" dur="500"/>
+                                        <p:tgtEl>
+                                          <p:spTgt spid="2">
+                                            <p:txEl>
+                                              <p:pRg st="4" end="4"/>
+                                            </p:txEl>
+                                          </p:spTgt>
+                                        </p:tgtEl>
+                                      </p:cBhvr>
+                                    </p:animEffect>
+                                  </p:childTnLst>
+                                </p:cTn>
+                              </p:par>
+                              <p:par>
+                                <p:cTn id="16" presetID="10" presetClass="entr" presetSubtype="0" fill="hold" nodeType="withEffect">
+                                  <p:stCondLst>
+                                    <p:cond delay="0"/>
+                                  </p:stCondLst>
+                                  <p:childTnLst>
+                                    <p:set>
+                                      <p:cBhvr>
+                                        <p:cTn id="17" dur="1" fill="hold">
+                                          <p:stCondLst>
+                                            <p:cond delay="0"/>
+                                          </p:stCondLst>
+                                        </p:cTn>
+                                        <p:tgtEl>
+                                          <p:spTgt spid="2">
+                                            <p:txEl>
+                                              <p:pRg st="5" end="5"/>
+                                            </p:txEl>
+                                          </p:spTgt>
+                                        </p:tgtEl>
+                                        <p:attrNameLst>
+                                          <p:attrName>style.visibility</p:attrName>
+                                        </p:attrNameLst>
+                                      </p:cBhvr>
+                                      <p:to>
+                                        <p:strVal val="visible"/>
+                                      </p:to>
+                                    </p:set>
+                                    <p:animEffect transition="in" filter="fade">
+                                      <p:cBhvr>
+                                        <p:cTn id="18" dur="500"/>
+                                        <p:tgtEl>
+                                          <p:spTgt spid="2">
+                                            <p:txEl>
+                                              <p:pRg st="5" end="5"/>
+                                            </p:txEl>
+                                          </p:spTgt>
+                                        </p:tgtEl>
+                                      </p:cBhvr>
+                                    </p:animEffect>
+                                  </p:childTnLst>
+                                </p:cTn>
+                              </p:par>
+                            </p:childTnLst>
+                          </p:cTn>
+                        </p:par>
+                      </p:childTnLst>
+                    </p:cTn>
+                  </p:par>
+                  <p:par>
+                    <p:cTn id="19" fill="hold">
+                      <p:stCondLst>
+                        <p:cond delay="indefinite"/>
+                      </p:stCondLst>
+                      <p:childTnLst>
+                        <p:par>
+                          <p:cTn id="20" fill="hold">
+                            <p:stCondLst>
+                              <p:cond delay="0"/>
+                            </p:stCondLst>
+                            <p:childTnLst>
+                              <p:par>
+                                <p:cTn id="21" presetID="10" presetClass="entr" presetSubtype="0" fill="hold" nodeType="clickEffect">
+                                  <p:stCondLst>
+                                    <p:cond delay="0"/>
+                                  </p:stCondLst>
+                                  <p:childTnLst>
+                                    <p:set>
+                                      <p:cBhvr>
+                                        <p:cTn id="22" dur="1" fill="hold">
+                                          <p:stCondLst>
+                                            <p:cond delay="0"/>
+                                          </p:stCondLst>
+                                        </p:cTn>
+                                        <p:tgtEl>
+                                          <p:spTgt spid="2">
+                                            <p:txEl>
+                                              <p:pRg st="6" end="6"/>
+                                            </p:txEl>
+                                          </p:spTgt>
+                                        </p:tgtEl>
+                                        <p:attrNameLst>
+                                          <p:attrName>style.visibility</p:attrName>
+                                        </p:attrNameLst>
+                                      </p:cBhvr>
+                                      <p:to>
+                                        <p:strVal val="visible"/>
+                                      </p:to>
+                                    </p:set>
+                                    <p:animEffect transition="in" filter="fade">
+                                      <p:cBhvr>
+                                        <p:cTn id="23" dur="500"/>
+                                        <p:tgtEl>
+                                          <p:spTgt spid="2">
+                                            <p:txEl>
+                                              <p:pRg st="6" end="6"/>
+                                            </p:txEl>
+                                          </p:spTgt>
+                                        </p:tgtEl>
+                                      </p:cBhvr>
+                                    </p:animEffect>
+                                  </p:childTnLst>
+                                </p:cTn>
+                              </p:par>
+                            </p:childTnLst>
+                          </p:cTn>
+                        </p:par>
+                      </p:childTnLst>
+                    </p:cTn>
+                  </p:par>
+                </p:childTnLst>
+              </p:cTn>
+              <p:prevCondLst>
+                <p:cond evt="onPrev" delay="0">
+                  <p:tgtEl>
+                    <p:sldTgt/>
+                  </p:tgtEl>
+                </p:cond>
+              </p:prevCondLst>
+              <p:nextCondLst>
+                <p:cond evt="onNext" delay="0">
+                  <p:tgtEl>
+                    <p:sldTgt/>
+                  </p:tgtEl>
+                </p:cond>
+              </p:nextCondLst>
+            </p:seq>
+          </p:childTnLst>
+        </p:cTn>
+      </p:par>
+    </p:tnLst>
+  </p:timing>
 </p:sld>
 </file>
 
@@ -12916,7 +13644,12 @@
             <p:ph idx="1"/>
           </p:nvPr>
         </p:nvSpPr>
-        <p:spPr/>
+        <p:spPr>
+          <a:xfrm>
+            <a:off x="1097280" y="1972399"/>
+            <a:ext cx="10058400" cy="3760891"/>
+          </a:xfrm>
+        </p:spPr>
         <p:txBody>
           <a:bodyPr>
             <a:normAutofit fontScale="92500" lnSpcReduction="20000"/>
@@ -12925,22 +13658,13 @@
           <a:p>
             <a:r>
               <a:rPr lang="en-US" dirty="0" smtClean="0"/>
-              <a:t>1. </a:t>
-            </a:r>
+              <a:t>1. Background and Research Questions</a:t>
+            </a:r>
+          </a:p>
+          <a:p>
             <a:r>
               <a:rPr lang="en-US" dirty="0" smtClean="0"/>
-              <a:t>Background and Research Questions</a:t>
-            </a:r>
-            <a:endParaRPr lang="en-US" dirty="0" smtClean="0"/>
-          </a:p>
-          <a:p>
-            <a:r>
-              <a:rPr lang="en-US" dirty="0" smtClean="0"/>
-              <a:t>2. Individual </a:t>
-            </a:r>
-            <a:r>
-              <a:rPr lang="en-US" dirty="0" smtClean="0"/>
-              <a:t>data analysis</a:t>
+              <a:t>2. Individual data analysis</a:t>
             </a:r>
           </a:p>
           <a:p>
@@ -12964,15 +13688,7 @@
           <a:p>
             <a:r>
               <a:rPr lang="en-US" dirty="0" smtClean="0"/>
-              <a:t>3</a:t>
-            </a:r>
-            <a:r>
-              <a:rPr lang="en-US" dirty="0" smtClean="0"/>
-              <a:t>. State-wide </a:t>
-            </a:r>
-            <a:r>
-              <a:rPr lang="en-US" dirty="0" smtClean="0"/>
-              <a:t>data analysis</a:t>
+              <a:t>3. State-wide data analysis</a:t>
             </a:r>
           </a:p>
           <a:p>
@@ -12985,20 +13701,11 @@
               <a:rPr lang="en-US" dirty="0" smtClean="0"/>
               <a:t>elf-reported poor mental health and unemployment</a:t>
             </a:r>
-            <a:endParaRPr lang="en-US" dirty="0" smtClean="0"/>
           </a:p>
           <a:p>
             <a:r>
               <a:rPr lang="en-US" dirty="0" smtClean="0"/>
-              <a:t>4</a:t>
-            </a:r>
-            <a:r>
-              <a:rPr lang="en-US" dirty="0" smtClean="0"/>
-              <a:t>. Geographic </a:t>
-            </a:r>
-            <a:r>
-              <a:rPr lang="en-US" dirty="0" smtClean="0"/>
-              <a:t>analysis</a:t>
+              <a:t>4. Geographic analysis</a:t>
             </a:r>
           </a:p>
           <a:p>
@@ -13064,6 +13771,13 @@
   <p:clrMapOvr>
     <a:masterClrMapping/>
   </p:clrMapOvr>
+  <p:timing>
+    <p:tnLst>
+      <p:par>
+        <p:cTn id="1" dur="indefinite" restart="never" nodeType="tmRoot"/>
+      </p:par>
+    </p:tnLst>
+  </p:timing>
 </p:sld>
 </file>
 
@@ -13309,6 +14023,434 @@
   <p:clrMapOvr>
     <a:masterClrMapping/>
   </p:clrMapOvr>
+  <p:timing>
+    <p:tnLst>
+      <p:par>
+        <p:cTn id="1" dur="indefinite" restart="never" nodeType="tmRoot">
+          <p:childTnLst>
+            <p:seq concurrent="1" nextAc="seek">
+              <p:cTn id="2" dur="indefinite" nodeType="mainSeq">
+                <p:childTnLst>
+                  <p:par>
+                    <p:cTn id="3" fill="hold">
+                      <p:stCondLst>
+                        <p:cond delay="indefinite"/>
+                      </p:stCondLst>
+                      <p:childTnLst>
+                        <p:par>
+                          <p:cTn id="4" fill="hold">
+                            <p:stCondLst>
+                              <p:cond delay="0"/>
+                            </p:stCondLst>
+                            <p:childTnLst>
+                              <p:par>
+                                <p:cTn id="5" presetID="10" presetClass="entr" presetSubtype="0" fill="hold" nodeType="clickEffect">
+                                  <p:stCondLst>
+                                    <p:cond delay="0"/>
+                                  </p:stCondLst>
+                                  <p:childTnLst>
+                                    <p:set>
+                                      <p:cBhvr>
+                                        <p:cTn id="6" dur="1" fill="hold">
+                                          <p:stCondLst>
+                                            <p:cond delay="0"/>
+                                          </p:stCondLst>
+                                        </p:cTn>
+                                        <p:tgtEl>
+                                          <p:spTgt spid="11">
+                                            <p:txEl>
+                                              <p:pRg st="1" end="1"/>
+                                            </p:txEl>
+                                          </p:spTgt>
+                                        </p:tgtEl>
+                                        <p:attrNameLst>
+                                          <p:attrName>style.visibility</p:attrName>
+                                        </p:attrNameLst>
+                                      </p:cBhvr>
+                                      <p:to>
+                                        <p:strVal val="visible"/>
+                                      </p:to>
+                                    </p:set>
+                                    <p:animEffect transition="in" filter="fade">
+                                      <p:cBhvr>
+                                        <p:cTn id="7" dur="500"/>
+                                        <p:tgtEl>
+                                          <p:spTgt spid="11">
+                                            <p:txEl>
+                                              <p:pRg st="1" end="1"/>
+                                            </p:txEl>
+                                          </p:spTgt>
+                                        </p:tgtEl>
+                                      </p:cBhvr>
+                                    </p:animEffect>
+                                  </p:childTnLst>
+                                </p:cTn>
+                              </p:par>
+                            </p:childTnLst>
+                          </p:cTn>
+                        </p:par>
+                      </p:childTnLst>
+                    </p:cTn>
+                  </p:par>
+                  <p:par>
+                    <p:cTn id="8" fill="hold">
+                      <p:stCondLst>
+                        <p:cond delay="indefinite"/>
+                      </p:stCondLst>
+                      <p:childTnLst>
+                        <p:par>
+                          <p:cTn id="9" fill="hold">
+                            <p:stCondLst>
+                              <p:cond delay="0"/>
+                            </p:stCondLst>
+                            <p:childTnLst>
+                              <p:par>
+                                <p:cTn id="10" presetID="10" presetClass="entr" presetSubtype="0" fill="hold" nodeType="clickEffect">
+                                  <p:stCondLst>
+                                    <p:cond delay="0"/>
+                                  </p:stCondLst>
+                                  <p:childTnLst>
+                                    <p:set>
+                                      <p:cBhvr>
+                                        <p:cTn id="11" dur="1" fill="hold">
+                                          <p:stCondLst>
+                                            <p:cond delay="0"/>
+                                          </p:stCondLst>
+                                        </p:cTn>
+                                        <p:tgtEl>
+                                          <p:spTgt spid="11">
+                                            <p:txEl>
+                                              <p:pRg st="2" end="2"/>
+                                            </p:txEl>
+                                          </p:spTgt>
+                                        </p:tgtEl>
+                                        <p:attrNameLst>
+                                          <p:attrName>style.visibility</p:attrName>
+                                        </p:attrNameLst>
+                                      </p:cBhvr>
+                                      <p:to>
+                                        <p:strVal val="visible"/>
+                                      </p:to>
+                                    </p:set>
+                                    <p:animEffect transition="in" filter="fade">
+                                      <p:cBhvr>
+                                        <p:cTn id="12" dur="500"/>
+                                        <p:tgtEl>
+                                          <p:spTgt spid="11">
+                                            <p:txEl>
+                                              <p:pRg st="2" end="2"/>
+                                            </p:txEl>
+                                          </p:spTgt>
+                                        </p:tgtEl>
+                                      </p:cBhvr>
+                                    </p:animEffect>
+                                  </p:childTnLst>
+                                </p:cTn>
+                              </p:par>
+                            </p:childTnLst>
+                          </p:cTn>
+                        </p:par>
+                      </p:childTnLst>
+                    </p:cTn>
+                  </p:par>
+                  <p:par>
+                    <p:cTn id="13" fill="hold">
+                      <p:stCondLst>
+                        <p:cond delay="indefinite"/>
+                      </p:stCondLst>
+                      <p:childTnLst>
+                        <p:par>
+                          <p:cTn id="14" fill="hold">
+                            <p:stCondLst>
+                              <p:cond delay="0"/>
+                            </p:stCondLst>
+                            <p:childTnLst>
+                              <p:par>
+                                <p:cTn id="15" presetID="10" presetClass="entr" presetSubtype="0" fill="hold" nodeType="clickEffect">
+                                  <p:stCondLst>
+                                    <p:cond delay="0"/>
+                                  </p:stCondLst>
+                                  <p:childTnLst>
+                                    <p:set>
+                                      <p:cBhvr>
+                                        <p:cTn id="16" dur="1" fill="hold">
+                                          <p:stCondLst>
+                                            <p:cond delay="0"/>
+                                          </p:stCondLst>
+                                        </p:cTn>
+                                        <p:tgtEl>
+                                          <p:spTgt spid="11">
+                                            <p:txEl>
+                                              <p:pRg st="3" end="3"/>
+                                            </p:txEl>
+                                          </p:spTgt>
+                                        </p:tgtEl>
+                                        <p:attrNameLst>
+                                          <p:attrName>style.visibility</p:attrName>
+                                        </p:attrNameLst>
+                                      </p:cBhvr>
+                                      <p:to>
+                                        <p:strVal val="visible"/>
+                                      </p:to>
+                                    </p:set>
+                                    <p:animEffect transition="in" filter="fade">
+                                      <p:cBhvr>
+                                        <p:cTn id="17" dur="500"/>
+                                        <p:tgtEl>
+                                          <p:spTgt spid="11">
+                                            <p:txEl>
+                                              <p:pRg st="3" end="3"/>
+                                            </p:txEl>
+                                          </p:spTgt>
+                                        </p:tgtEl>
+                                      </p:cBhvr>
+                                    </p:animEffect>
+                                  </p:childTnLst>
+                                </p:cTn>
+                              </p:par>
+                              <p:par>
+                                <p:cTn id="18" presetID="10" presetClass="entr" presetSubtype="0" fill="hold" nodeType="withEffect">
+                                  <p:stCondLst>
+                                    <p:cond delay="0"/>
+                                  </p:stCondLst>
+                                  <p:childTnLst>
+                                    <p:set>
+                                      <p:cBhvr>
+                                        <p:cTn id="19" dur="1" fill="hold">
+                                          <p:stCondLst>
+                                            <p:cond delay="0"/>
+                                          </p:stCondLst>
+                                        </p:cTn>
+                                        <p:tgtEl>
+                                          <p:spTgt spid="11">
+                                            <p:txEl>
+                                              <p:pRg st="4" end="4"/>
+                                            </p:txEl>
+                                          </p:spTgt>
+                                        </p:tgtEl>
+                                        <p:attrNameLst>
+                                          <p:attrName>style.visibility</p:attrName>
+                                        </p:attrNameLst>
+                                      </p:cBhvr>
+                                      <p:to>
+                                        <p:strVal val="visible"/>
+                                      </p:to>
+                                    </p:set>
+                                    <p:animEffect transition="in" filter="fade">
+                                      <p:cBhvr>
+                                        <p:cTn id="20" dur="500"/>
+                                        <p:tgtEl>
+                                          <p:spTgt spid="11">
+                                            <p:txEl>
+                                              <p:pRg st="4" end="4"/>
+                                            </p:txEl>
+                                          </p:spTgt>
+                                        </p:tgtEl>
+                                      </p:cBhvr>
+                                    </p:animEffect>
+                                  </p:childTnLst>
+                                </p:cTn>
+                              </p:par>
+                              <p:par>
+                                <p:cTn id="21" presetID="10" presetClass="entr" presetSubtype="0" fill="hold" nodeType="withEffect">
+                                  <p:stCondLst>
+                                    <p:cond delay="0"/>
+                                  </p:stCondLst>
+                                  <p:childTnLst>
+                                    <p:set>
+                                      <p:cBhvr>
+                                        <p:cTn id="22" dur="1" fill="hold">
+                                          <p:stCondLst>
+                                            <p:cond delay="0"/>
+                                          </p:stCondLst>
+                                        </p:cTn>
+                                        <p:tgtEl>
+                                          <p:spTgt spid="11">
+                                            <p:txEl>
+                                              <p:pRg st="5" end="5"/>
+                                            </p:txEl>
+                                          </p:spTgt>
+                                        </p:tgtEl>
+                                        <p:attrNameLst>
+                                          <p:attrName>style.visibility</p:attrName>
+                                        </p:attrNameLst>
+                                      </p:cBhvr>
+                                      <p:to>
+                                        <p:strVal val="visible"/>
+                                      </p:to>
+                                    </p:set>
+                                    <p:animEffect transition="in" filter="fade">
+                                      <p:cBhvr>
+                                        <p:cTn id="23" dur="500"/>
+                                        <p:tgtEl>
+                                          <p:spTgt spid="11">
+                                            <p:txEl>
+                                              <p:pRg st="5" end="5"/>
+                                            </p:txEl>
+                                          </p:spTgt>
+                                        </p:tgtEl>
+                                      </p:cBhvr>
+                                    </p:animEffect>
+                                  </p:childTnLst>
+                                </p:cTn>
+                              </p:par>
+                              <p:par>
+                                <p:cTn id="24" presetID="10" presetClass="entr" presetSubtype="0" fill="hold" nodeType="withEffect">
+                                  <p:stCondLst>
+                                    <p:cond delay="0"/>
+                                  </p:stCondLst>
+                                  <p:childTnLst>
+                                    <p:set>
+                                      <p:cBhvr>
+                                        <p:cTn id="25" dur="1" fill="hold">
+                                          <p:stCondLst>
+                                            <p:cond delay="0"/>
+                                          </p:stCondLst>
+                                        </p:cTn>
+                                        <p:tgtEl>
+                                          <p:spTgt spid="11">
+                                            <p:txEl>
+                                              <p:pRg st="6" end="6"/>
+                                            </p:txEl>
+                                          </p:spTgt>
+                                        </p:tgtEl>
+                                        <p:attrNameLst>
+                                          <p:attrName>style.visibility</p:attrName>
+                                        </p:attrNameLst>
+                                      </p:cBhvr>
+                                      <p:to>
+                                        <p:strVal val="visible"/>
+                                      </p:to>
+                                    </p:set>
+                                    <p:animEffect transition="in" filter="fade">
+                                      <p:cBhvr>
+                                        <p:cTn id="26" dur="500"/>
+                                        <p:tgtEl>
+                                          <p:spTgt spid="11">
+                                            <p:txEl>
+                                              <p:pRg st="6" end="6"/>
+                                            </p:txEl>
+                                          </p:spTgt>
+                                        </p:tgtEl>
+                                      </p:cBhvr>
+                                    </p:animEffect>
+                                  </p:childTnLst>
+                                </p:cTn>
+                              </p:par>
+                              <p:par>
+                                <p:cTn id="27" presetID="10" presetClass="entr" presetSubtype="0" fill="hold" nodeType="withEffect">
+                                  <p:stCondLst>
+                                    <p:cond delay="0"/>
+                                  </p:stCondLst>
+                                  <p:childTnLst>
+                                    <p:set>
+                                      <p:cBhvr>
+                                        <p:cTn id="28" dur="1" fill="hold">
+                                          <p:stCondLst>
+                                            <p:cond delay="0"/>
+                                          </p:stCondLst>
+                                        </p:cTn>
+                                        <p:tgtEl>
+                                          <p:spTgt spid="11">
+                                            <p:txEl>
+                                              <p:pRg st="7" end="7"/>
+                                            </p:txEl>
+                                          </p:spTgt>
+                                        </p:tgtEl>
+                                        <p:attrNameLst>
+                                          <p:attrName>style.visibility</p:attrName>
+                                        </p:attrNameLst>
+                                      </p:cBhvr>
+                                      <p:to>
+                                        <p:strVal val="visible"/>
+                                      </p:to>
+                                    </p:set>
+                                    <p:animEffect transition="in" filter="fade">
+                                      <p:cBhvr>
+                                        <p:cTn id="29" dur="500"/>
+                                        <p:tgtEl>
+                                          <p:spTgt spid="11">
+                                            <p:txEl>
+                                              <p:pRg st="7" end="7"/>
+                                            </p:txEl>
+                                          </p:spTgt>
+                                        </p:tgtEl>
+                                      </p:cBhvr>
+                                    </p:animEffect>
+                                  </p:childTnLst>
+                                </p:cTn>
+                              </p:par>
+                              <p:par>
+                                <p:cTn id="30" presetID="10" presetClass="entr" presetSubtype="0" fill="hold" nodeType="withEffect">
+                                  <p:stCondLst>
+                                    <p:cond delay="0"/>
+                                  </p:stCondLst>
+                                  <p:childTnLst>
+                                    <p:set>
+                                      <p:cBhvr>
+                                        <p:cTn id="31" dur="1" fill="hold">
+                                          <p:stCondLst>
+                                            <p:cond delay="0"/>
+                                          </p:stCondLst>
+                                        </p:cTn>
+                                        <p:tgtEl>
+                                          <p:spTgt spid="11">
+                                            <p:txEl>
+                                              <p:pRg st="8" end="8"/>
+                                            </p:txEl>
+                                          </p:spTgt>
+                                        </p:tgtEl>
+                                        <p:attrNameLst>
+                                          <p:attrName>style.visibility</p:attrName>
+                                        </p:attrNameLst>
+                                      </p:cBhvr>
+                                      <p:to>
+                                        <p:strVal val="visible"/>
+                                      </p:to>
+                                    </p:set>
+                                    <p:animEffect transition="in" filter="fade">
+                                      <p:cBhvr>
+                                        <p:cTn id="32" dur="500"/>
+                                        <p:tgtEl>
+                                          <p:spTgt spid="11">
+                                            <p:txEl>
+                                              <p:pRg st="8" end="8"/>
+                                            </p:txEl>
+                                          </p:spTgt>
+                                        </p:tgtEl>
+                                      </p:cBhvr>
+                                    </p:animEffect>
+                                  </p:childTnLst>
+                                </p:cTn>
+                              </p:par>
+                            </p:childTnLst>
+                          </p:cTn>
+                        </p:par>
+                      </p:childTnLst>
+                    </p:cTn>
+                  </p:par>
+                </p:childTnLst>
+              </p:cTn>
+              <p:prevCondLst>
+                <p:cond evt="onPrev" delay="0">
+                  <p:tgtEl>
+                    <p:sldTgt/>
+                  </p:tgtEl>
+                </p:cond>
+              </p:prevCondLst>
+              <p:nextCondLst>
+                <p:cond evt="onNext" delay="0">
+                  <p:tgtEl>
+                    <p:sldTgt/>
+                  </p:tgtEl>
+                </p:cond>
+              </p:nextCondLst>
+            </p:seq>
+          </p:childTnLst>
+        </p:cTn>
+      </p:par>
+    </p:tnLst>
+  </p:timing>
 </p:sld>
 </file>
 
@@ -13403,6 +14545,13 @@
   <p:clrMapOvr>
     <a:masterClrMapping/>
   </p:clrMapOvr>
+  <p:timing>
+    <p:tnLst>
+      <p:par>
+        <p:cTn id="1" dur="indefinite" restart="never" nodeType="tmRoot"/>
+      </p:par>
+    </p:tnLst>
+  </p:timing>
 </p:sld>
 </file>
 
@@ -13528,6 +14677,13 @@
   <p:clrMapOvr>
     <a:masterClrMapping/>
   </p:clrMapOvr>
+  <p:timing>
+    <p:tnLst>
+      <p:par>
+        <p:cTn id="1" dur="indefinite" restart="never" nodeType="tmRoot"/>
+      </p:par>
+    </p:tnLst>
+  </p:timing>
 </p:sld>
 </file>
 
@@ -13998,6 +15154,13 @@
   <p:clrMapOvr>
     <a:masterClrMapping/>
   </p:clrMapOvr>
+  <p:timing>
+    <p:tnLst>
+      <p:par>
+        <p:cTn id="1" dur="indefinite" restart="never" nodeType="tmRoot"/>
+      </p:par>
+    </p:tnLst>
+  </p:timing>
 </p:sld>
 </file>
 
@@ -14071,7 +15234,11 @@
           <a:p>
             <a:r>
               <a:rPr lang="en-US" dirty="0" smtClean="0"/>
-              <a:t>Unemployed individuals more likely to suffer from one or more mental health conditions</a:t>
+              <a:t>Unemployed individuals more likely to suffer from one or more mental health </a:t>
+            </a:r>
+            <a:r>
+              <a:rPr lang="en-US" dirty="0" smtClean="0"/>
+              <a:t>Symptoms</a:t>
             </a:r>
             <a:endParaRPr lang="en-US" dirty="0"/>
           </a:p>
@@ -14086,7 +15253,7 @@
         <p:spPr>
           <a:xfrm>
             <a:off x="7078133" y="2218267"/>
-            <a:ext cx="3084499" cy="2308324"/>
+            <a:ext cx="3041217" cy="2308324"/>
           </a:xfrm>
           <a:prstGeom prst="rect">
             <a:avLst/>
@@ -14101,8 +15268,13 @@
           <a:p>
             <a:r>
               <a:rPr lang="en-US" dirty="0" smtClean="0"/>
-              <a:t>Mental Health Conditions:</a:t>
-            </a:r>
+              <a:t>Mental Health </a:t>
+            </a:r>
+            <a:r>
+              <a:rPr lang="en-US" dirty="0" smtClean="0"/>
+              <a:t>Symptoms:</a:t>
+            </a:r>
+            <a:endParaRPr lang="en-US" dirty="0" smtClean="0"/>
           </a:p>
           <a:p>
             <a:pPr marL="285750" indent="-285750">
@@ -14186,6 +15358,13 @@
   <p:clrMapOvr>
     <a:masterClrMapping/>
   </p:clrMapOvr>
+  <p:timing>
+    <p:tnLst>
+      <p:par>
+        <p:cTn id="1" dur="indefinite" restart="never" nodeType="tmRoot"/>
+      </p:par>
+    </p:tnLst>
+  </p:timing>
 </p:sld>
 </file>
 
@@ -14255,50 +15434,12 @@
             <a:pPr algn="ctr"/>
             <a:r>
               <a:rPr lang="en-US" dirty="0" smtClean="0"/>
-              <a:t>Individual Education level is </a:t>
-            </a:r>
-            <a:r>
-              <a:rPr lang="en-US" dirty="0" smtClean="0"/>
-              <a:t>correlated </a:t>
-            </a:r>
-            <a:r>
-              <a:rPr lang="en-US" dirty="0" smtClean="0"/>
-              <a:t>with unemployment risk</a:t>
+              <a:t>Individual Education level is correlated with unemployment risk</a:t>
             </a:r>
             <a:endParaRPr lang="en-US" dirty="0"/>
           </a:p>
         </p:txBody>
       </p:sp>
-      <p:pic>
-        <p:nvPicPr>
-          <p:cNvPr id="5" name="Picture 4"/>
-          <p:cNvPicPr>
-            <a:picLocks noChangeAspect="1"/>
-          </p:cNvPicPr>
-          <p:nvPr/>
-        </p:nvPicPr>
-        <p:blipFill>
-          <a:blip r:embed="rId3">
-            <a:extLst>
-              <a:ext uri="{28A0092B-C50C-407E-A947-70E740481C1C}">
-                <a14:useLocalDpi xmlns:a14="http://schemas.microsoft.com/office/drawing/2010/main" val="0"/>
-              </a:ext>
-            </a:extLst>
-          </a:blip>
-          <a:stretch>
-            <a:fillRect/>
-          </a:stretch>
-        </p:blipFill>
-        <p:spPr>
-          <a:xfrm>
-            <a:off x="4087886" y="2444290"/>
-            <a:ext cx="3397461" cy="3291840"/>
-          </a:xfrm>
-          <a:prstGeom prst="rect">
-            <a:avLst/>
-          </a:prstGeom>
-        </p:spPr>
-      </p:pic>
       <p:pic>
         <p:nvPicPr>
           <p:cNvPr id="6" name="Picture 5"/>
@@ -14308,7 +15449,7 @@
           <p:nvPr/>
         </p:nvPicPr>
         <p:blipFill>
-          <a:blip r:embed="rId4">
+          <a:blip r:embed="rId3">
             <a:extLst>
               <a:ext uri="{28A0092B-C50C-407E-A947-70E740481C1C}">
                 <a14:useLocalDpi xmlns:a14="http://schemas.microsoft.com/office/drawing/2010/main" val="0"/>
@@ -14338,7 +15479,7 @@
           <p:nvPr/>
         </p:nvPicPr>
         <p:blipFill>
-          <a:blip r:embed="rId5">
+          <a:blip r:embed="rId4">
             <a:extLst>
               <a:ext uri="{28A0092B-C50C-407E-A947-70E740481C1C}">
                 <a14:useLocalDpi xmlns:a14="http://schemas.microsoft.com/office/drawing/2010/main" val="0"/>
@@ -14426,6 +15567,69 @@
           </a:fontRef>
         </p:style>
       </p:cxnSp>
+      <p:pic>
+        <p:nvPicPr>
+          <p:cNvPr id="9" name="Picture 8"/>
+          <p:cNvPicPr>
+            <a:picLocks noChangeAspect="1"/>
+          </p:cNvPicPr>
+          <p:nvPr/>
+        </p:nvPicPr>
+        <p:blipFill>
+          <a:blip r:embed="rId5">
+            <a:extLst>
+              <a:ext uri="{28A0092B-C50C-407E-A947-70E740481C1C}">
+                <a14:useLocalDpi xmlns:a14="http://schemas.microsoft.com/office/drawing/2010/main" val="0"/>
+              </a:ext>
+            </a:extLst>
+          </a:blip>
+          <a:stretch>
+            <a:fillRect/>
+          </a:stretch>
+        </p:blipFill>
+        <p:spPr>
+          <a:xfrm>
+            <a:off x="4131746" y="2476318"/>
+            <a:ext cx="3397461" cy="3291840"/>
+          </a:xfrm>
+          <a:prstGeom prst="rect">
+            <a:avLst/>
+          </a:prstGeom>
+        </p:spPr>
+      </p:pic>
+      <p:cxnSp>
+        <p:nvCxnSpPr>
+          <p:cNvPr id="11" name="Straight Arrow Connector 10"/>
+          <p:cNvCxnSpPr/>
+          <p:nvPr/>
+        </p:nvCxnSpPr>
+        <p:spPr>
+          <a:xfrm>
+            <a:off x="4919472" y="2754936"/>
+            <a:ext cx="1691640" cy="1143000"/>
+          </a:xfrm>
+          <a:prstGeom prst="straightConnector1">
+            <a:avLst/>
+          </a:prstGeom>
+          <a:ln>
+            <a:tailEnd type="triangle"/>
+          </a:ln>
+        </p:spPr>
+        <p:style>
+          <a:lnRef idx="1">
+            <a:schemeClr val="accent3"/>
+          </a:lnRef>
+          <a:fillRef idx="0">
+            <a:schemeClr val="accent3"/>
+          </a:fillRef>
+          <a:effectRef idx="0">
+            <a:schemeClr val="accent3"/>
+          </a:effectRef>
+          <a:fontRef idx="minor">
+            <a:schemeClr val="tx1"/>
+          </a:fontRef>
+        </p:style>
+      </p:cxnSp>
     </p:spTree>
     <p:extLst>
       <p:ext uri="{BB962C8B-B14F-4D97-AF65-F5344CB8AC3E}">
@@ -14436,6 +15640,356 @@
   <p:clrMapOvr>
     <a:masterClrMapping/>
   </p:clrMapOvr>
+  <p:timing>
+    <p:tnLst>
+      <p:par>
+        <p:cTn id="1" dur="indefinite" restart="never" nodeType="tmRoot">
+          <p:childTnLst>
+            <p:seq concurrent="1" nextAc="seek">
+              <p:cTn id="2" dur="indefinite" nodeType="mainSeq">
+                <p:childTnLst>
+                  <p:par>
+                    <p:cTn id="3" fill="hold">
+                      <p:stCondLst>
+                        <p:cond delay="indefinite"/>
+                      </p:stCondLst>
+                      <p:childTnLst>
+                        <p:par>
+                          <p:cTn id="4" fill="hold">
+                            <p:stCondLst>
+                              <p:cond delay="0"/>
+                            </p:stCondLst>
+                            <p:childTnLst>
+                              <p:par>
+                                <p:cTn id="5" presetID="10" presetClass="entr" presetSubtype="0" fill="hold" nodeType="clickEffect">
+                                  <p:stCondLst>
+                                    <p:cond delay="0"/>
+                                  </p:stCondLst>
+                                  <p:childTnLst>
+                                    <p:set>
+                                      <p:cBhvr>
+                                        <p:cTn id="6" dur="1" fill="hold">
+                                          <p:stCondLst>
+                                            <p:cond delay="0"/>
+                                          </p:stCondLst>
+                                        </p:cTn>
+                                        <p:tgtEl>
+                                          <p:spTgt spid="6"/>
+                                        </p:tgtEl>
+                                        <p:attrNameLst>
+                                          <p:attrName>style.visibility</p:attrName>
+                                        </p:attrNameLst>
+                                      </p:cBhvr>
+                                      <p:to>
+                                        <p:strVal val="visible"/>
+                                      </p:to>
+                                    </p:set>
+                                    <p:animEffect transition="in" filter="fade">
+                                      <p:cBhvr>
+                                        <p:cTn id="7" dur="500"/>
+                                        <p:tgtEl>
+                                          <p:spTgt spid="6"/>
+                                        </p:tgtEl>
+                                      </p:cBhvr>
+                                    </p:animEffect>
+                                  </p:childTnLst>
+                                </p:cTn>
+                              </p:par>
+                            </p:childTnLst>
+                          </p:cTn>
+                        </p:par>
+                      </p:childTnLst>
+                    </p:cTn>
+                  </p:par>
+                  <p:par>
+                    <p:cTn id="8" fill="hold">
+                      <p:stCondLst>
+                        <p:cond delay="indefinite"/>
+                      </p:stCondLst>
+                      <p:childTnLst>
+                        <p:par>
+                          <p:cTn id="9" fill="hold">
+                            <p:stCondLst>
+                              <p:cond delay="0"/>
+                            </p:stCondLst>
+                            <p:childTnLst>
+                              <p:par>
+                                <p:cTn id="10" presetID="10" presetClass="entr" presetSubtype="0" fill="hold" nodeType="clickEffect">
+                                  <p:stCondLst>
+                                    <p:cond delay="0"/>
+                                  </p:stCondLst>
+                                  <p:childTnLst>
+                                    <p:set>
+                                      <p:cBhvr>
+                                        <p:cTn id="11" dur="1" fill="hold">
+                                          <p:stCondLst>
+                                            <p:cond delay="0"/>
+                                          </p:stCondLst>
+                                        </p:cTn>
+                                        <p:tgtEl>
+                                          <p:spTgt spid="4"/>
+                                        </p:tgtEl>
+                                        <p:attrNameLst>
+                                          <p:attrName>style.visibility</p:attrName>
+                                        </p:attrNameLst>
+                                      </p:cBhvr>
+                                      <p:to>
+                                        <p:strVal val="visible"/>
+                                      </p:to>
+                                    </p:set>
+                                    <p:animEffect transition="in" filter="fade">
+                                      <p:cBhvr>
+                                        <p:cTn id="12" dur="500"/>
+                                        <p:tgtEl>
+                                          <p:spTgt spid="4"/>
+                                        </p:tgtEl>
+                                      </p:cBhvr>
+                                    </p:animEffect>
+                                  </p:childTnLst>
+                                </p:cTn>
+                              </p:par>
+                            </p:childTnLst>
+                          </p:cTn>
+                        </p:par>
+                      </p:childTnLst>
+                    </p:cTn>
+                  </p:par>
+                  <p:par>
+                    <p:cTn id="13" fill="hold">
+                      <p:stCondLst>
+                        <p:cond delay="indefinite"/>
+                      </p:stCondLst>
+                      <p:childTnLst>
+                        <p:par>
+                          <p:cTn id="14" fill="hold">
+                            <p:stCondLst>
+                              <p:cond delay="0"/>
+                            </p:stCondLst>
+                            <p:childTnLst>
+                              <p:par>
+                                <p:cTn id="15" presetID="10" presetClass="entr" presetSubtype="0" fill="hold" nodeType="clickEffect">
+                                  <p:stCondLst>
+                                    <p:cond delay="0"/>
+                                  </p:stCondLst>
+                                  <p:childTnLst>
+                                    <p:set>
+                                      <p:cBhvr>
+                                        <p:cTn id="16" dur="1" fill="hold">
+                                          <p:stCondLst>
+                                            <p:cond delay="0"/>
+                                          </p:stCondLst>
+                                        </p:cTn>
+                                        <p:tgtEl>
+                                          <p:spTgt spid="9"/>
+                                        </p:tgtEl>
+                                        <p:attrNameLst>
+                                          <p:attrName>style.visibility</p:attrName>
+                                        </p:attrNameLst>
+                                      </p:cBhvr>
+                                      <p:to>
+                                        <p:strVal val="visible"/>
+                                      </p:to>
+                                    </p:set>
+                                    <p:animEffect transition="in" filter="fade">
+                                      <p:cBhvr>
+                                        <p:cTn id="17" dur="500"/>
+                                        <p:tgtEl>
+                                          <p:spTgt spid="9"/>
+                                        </p:tgtEl>
+                                      </p:cBhvr>
+                                    </p:animEffect>
+                                  </p:childTnLst>
+                                </p:cTn>
+                              </p:par>
+                              <p:par>
+                                <p:cTn id="18" presetID="10" presetClass="entr" presetSubtype="0" fill="hold" nodeType="withEffect">
+                                  <p:stCondLst>
+                                    <p:cond delay="0"/>
+                                  </p:stCondLst>
+                                  <p:childTnLst>
+                                    <p:set>
+                                      <p:cBhvr>
+                                        <p:cTn id="19" dur="1" fill="hold">
+                                          <p:stCondLst>
+                                            <p:cond delay="0"/>
+                                          </p:stCondLst>
+                                        </p:cTn>
+                                        <p:tgtEl>
+                                          <p:spTgt spid="11"/>
+                                        </p:tgtEl>
+                                        <p:attrNameLst>
+                                          <p:attrName>style.visibility</p:attrName>
+                                        </p:attrNameLst>
+                                      </p:cBhvr>
+                                      <p:to>
+                                        <p:strVal val="visible"/>
+                                      </p:to>
+                                    </p:set>
+                                    <p:animEffect transition="in" filter="fade">
+                                      <p:cBhvr>
+                                        <p:cTn id="20" dur="500"/>
+                                        <p:tgtEl>
+                                          <p:spTgt spid="11"/>
+                                        </p:tgtEl>
+                                      </p:cBhvr>
+                                    </p:animEffect>
+                                  </p:childTnLst>
+                                </p:cTn>
+                              </p:par>
+                            </p:childTnLst>
+                          </p:cTn>
+                        </p:par>
+                      </p:childTnLst>
+                    </p:cTn>
+                  </p:par>
+                  <p:par>
+                    <p:cTn id="21" fill="hold">
+                      <p:stCondLst>
+                        <p:cond delay="indefinite"/>
+                      </p:stCondLst>
+                      <p:childTnLst>
+                        <p:par>
+                          <p:cTn id="22" fill="hold">
+                            <p:stCondLst>
+                              <p:cond delay="0"/>
+                            </p:stCondLst>
+                            <p:childTnLst>
+                              <p:par>
+                                <p:cTn id="23" presetID="10" presetClass="entr" presetSubtype="0" fill="hold" nodeType="clickEffect">
+                                  <p:stCondLst>
+                                    <p:cond delay="0"/>
+                                  </p:stCondLst>
+                                  <p:childTnLst>
+                                    <p:set>
+                                      <p:cBhvr>
+                                        <p:cTn id="24" dur="1" fill="hold">
+                                          <p:stCondLst>
+                                            <p:cond delay="0"/>
+                                          </p:stCondLst>
+                                        </p:cTn>
+                                        <p:tgtEl>
+                                          <p:spTgt spid="7"/>
+                                        </p:tgtEl>
+                                        <p:attrNameLst>
+                                          <p:attrName>style.visibility</p:attrName>
+                                        </p:attrNameLst>
+                                      </p:cBhvr>
+                                      <p:to>
+                                        <p:strVal val="visible"/>
+                                      </p:to>
+                                    </p:set>
+                                    <p:animEffect transition="in" filter="fade">
+                                      <p:cBhvr>
+                                        <p:cTn id="25" dur="500"/>
+                                        <p:tgtEl>
+                                          <p:spTgt spid="7"/>
+                                        </p:tgtEl>
+                                      </p:cBhvr>
+                                    </p:animEffect>
+                                  </p:childTnLst>
+                                </p:cTn>
+                              </p:par>
+                              <p:par>
+                                <p:cTn id="26" presetID="10" presetClass="entr" presetSubtype="0" fill="hold" nodeType="withEffect">
+                                  <p:stCondLst>
+                                    <p:cond delay="0"/>
+                                  </p:stCondLst>
+                                  <p:childTnLst>
+                                    <p:set>
+                                      <p:cBhvr>
+                                        <p:cTn id="27" dur="1" fill="hold">
+                                          <p:stCondLst>
+                                            <p:cond delay="0"/>
+                                          </p:stCondLst>
+                                        </p:cTn>
+                                        <p:tgtEl>
+                                          <p:spTgt spid="10"/>
+                                        </p:tgtEl>
+                                        <p:attrNameLst>
+                                          <p:attrName>style.visibility</p:attrName>
+                                        </p:attrNameLst>
+                                      </p:cBhvr>
+                                      <p:to>
+                                        <p:strVal val="visible"/>
+                                      </p:to>
+                                    </p:set>
+                                    <p:animEffect transition="in" filter="fade">
+                                      <p:cBhvr>
+                                        <p:cTn id="28" dur="500"/>
+                                        <p:tgtEl>
+                                          <p:spTgt spid="10"/>
+                                        </p:tgtEl>
+                                      </p:cBhvr>
+                                    </p:animEffect>
+                                  </p:childTnLst>
+                                </p:cTn>
+                              </p:par>
+                              <p:par>
+                                <p:cTn id="29" presetID="10" presetClass="entr" presetSubtype="0" fill="hold" grpId="0" nodeType="withEffect">
+                                  <p:stCondLst>
+                                    <p:cond delay="0"/>
+                                  </p:stCondLst>
+                                  <p:childTnLst>
+                                    <p:set>
+                                      <p:cBhvr>
+                                        <p:cTn id="30" dur="1" fill="hold">
+                                          <p:stCondLst>
+                                            <p:cond delay="0"/>
+                                          </p:stCondLst>
+                                        </p:cTn>
+                                        <p:tgtEl>
+                                          <p:spTgt spid="8"/>
+                                        </p:tgtEl>
+                                        <p:attrNameLst>
+                                          <p:attrName>style.visibility</p:attrName>
+                                        </p:attrNameLst>
+                                      </p:cBhvr>
+                                      <p:to>
+                                        <p:strVal val="visible"/>
+                                      </p:to>
+                                    </p:set>
+                                    <p:animEffect transition="in" filter="fade">
+                                      <p:cBhvr>
+                                        <p:cTn id="31" dur="500"/>
+                                        <p:tgtEl>
+                                          <p:spTgt spid="8"/>
+                                        </p:tgtEl>
+                                      </p:cBhvr>
+                                    </p:animEffect>
+                                  </p:childTnLst>
+                                </p:cTn>
+                              </p:par>
+                            </p:childTnLst>
+                          </p:cTn>
+                        </p:par>
+                      </p:childTnLst>
+                    </p:cTn>
+                  </p:par>
+                </p:childTnLst>
+              </p:cTn>
+              <p:prevCondLst>
+                <p:cond evt="onPrev" delay="0">
+                  <p:tgtEl>
+                    <p:sldTgt/>
+                  </p:tgtEl>
+                </p:cond>
+              </p:prevCondLst>
+              <p:nextCondLst>
+                <p:cond evt="onNext" delay="0">
+                  <p:tgtEl>
+                    <p:sldTgt/>
+                  </p:tgtEl>
+                </p:cond>
+              </p:nextCondLst>
+            </p:seq>
+          </p:childTnLst>
+        </p:cTn>
+      </p:par>
+    </p:tnLst>
+    <p:bldLst>
+      <p:bldP spid="8" grpId="0"/>
+    </p:bldLst>
+  </p:timing>
 </p:sld>
 </file>
 
@@ -14512,7 +16066,7 @@
       </p:sp>
       <p:pic>
         <p:nvPicPr>
-          <p:cNvPr id="5" name="Picture 4"/>
+          <p:cNvPr id="6" name="Picture 5"/>
           <p:cNvPicPr>
             <a:picLocks noChangeAspect="1"/>
           </p:cNvPicPr>
@@ -14520,36 +16074,6 @@
         </p:nvPicPr>
         <p:blipFill>
           <a:blip r:embed="rId3">
-            <a:extLst>
-              <a:ext uri="{28A0092B-C50C-407E-A947-70E740481C1C}">
-                <a14:useLocalDpi xmlns:a14="http://schemas.microsoft.com/office/drawing/2010/main" val="0"/>
-              </a:ext>
-            </a:extLst>
-          </a:blip>
-          <a:stretch>
-            <a:fillRect/>
-          </a:stretch>
-        </p:blipFill>
-        <p:spPr>
-          <a:xfrm>
-            <a:off x="4287310" y="2510683"/>
-            <a:ext cx="3450271" cy="3291840"/>
-          </a:xfrm>
-          <a:prstGeom prst="rect">
-            <a:avLst/>
-          </a:prstGeom>
-        </p:spPr>
-      </p:pic>
-      <p:pic>
-        <p:nvPicPr>
-          <p:cNvPr id="6" name="Picture 5"/>
-          <p:cNvPicPr>
-            <a:picLocks noChangeAspect="1"/>
-          </p:cNvPicPr>
-          <p:nvPr/>
-        </p:nvPicPr>
-        <p:blipFill>
-          <a:blip r:embed="rId4">
             <a:extLst>
               <a:ext uri="{28A0092B-C50C-407E-A947-70E740481C1C}">
                 <a14:useLocalDpi xmlns:a14="http://schemas.microsoft.com/office/drawing/2010/main" val="0"/>
@@ -14579,7 +16103,7 @@
           <p:nvPr/>
         </p:nvPicPr>
         <p:blipFill>
-          <a:blip r:embed="rId5">
+          <a:blip r:embed="rId4">
             <a:extLst>
               <a:ext uri="{28A0092B-C50C-407E-A947-70E740481C1C}">
                 <a14:useLocalDpi xmlns:a14="http://schemas.microsoft.com/office/drawing/2010/main" val="0"/>
@@ -14600,6 +16124,102 @@
           </a:prstGeom>
         </p:spPr>
       </p:pic>
+      <p:cxnSp>
+        <p:nvCxnSpPr>
+          <p:cNvPr id="8" name="Straight Arrow Connector 7"/>
+          <p:cNvCxnSpPr/>
+          <p:nvPr/>
+        </p:nvCxnSpPr>
+        <p:spPr>
+          <a:xfrm>
+            <a:off x="8705088" y="2788920"/>
+            <a:ext cx="1764792" cy="1042416"/>
+          </a:xfrm>
+          <a:prstGeom prst="straightConnector1">
+            <a:avLst/>
+          </a:prstGeom>
+          <a:ln>
+            <a:tailEnd type="triangle"/>
+          </a:ln>
+        </p:spPr>
+        <p:style>
+          <a:lnRef idx="1">
+            <a:schemeClr val="accent3"/>
+          </a:lnRef>
+          <a:fillRef idx="0">
+            <a:schemeClr val="accent3"/>
+          </a:fillRef>
+          <a:effectRef idx="0">
+            <a:schemeClr val="accent3"/>
+          </a:effectRef>
+          <a:fontRef idx="minor">
+            <a:schemeClr val="tx1"/>
+          </a:fontRef>
+        </p:style>
+      </p:cxnSp>
+      <p:cxnSp>
+        <p:nvCxnSpPr>
+          <p:cNvPr id="10" name="Straight Arrow Connector 9"/>
+          <p:cNvCxnSpPr/>
+          <p:nvPr/>
+        </p:nvCxnSpPr>
+        <p:spPr>
+          <a:xfrm>
+            <a:off x="2008632" y="4156603"/>
+            <a:ext cx="1764792" cy="1042416"/>
+          </a:xfrm>
+          <a:prstGeom prst="straightConnector1">
+            <a:avLst/>
+          </a:prstGeom>
+          <a:ln>
+            <a:tailEnd type="triangle"/>
+          </a:ln>
+        </p:spPr>
+        <p:style>
+          <a:lnRef idx="1">
+            <a:schemeClr val="accent3"/>
+          </a:lnRef>
+          <a:fillRef idx="0">
+            <a:schemeClr val="accent3"/>
+          </a:fillRef>
+          <a:effectRef idx="0">
+            <a:schemeClr val="accent3"/>
+          </a:effectRef>
+          <a:fontRef idx="minor">
+            <a:schemeClr val="tx1"/>
+          </a:fontRef>
+        </p:style>
+      </p:cxnSp>
+      <p:pic>
+        <p:nvPicPr>
+          <p:cNvPr id="11" name="Picture 10"/>
+          <p:cNvPicPr>
+            <a:picLocks noChangeAspect="1"/>
+          </p:cNvPicPr>
+          <p:nvPr/>
+        </p:nvPicPr>
+        <p:blipFill>
+          <a:blip r:embed="rId5">
+            <a:extLst>
+              <a:ext uri="{28A0092B-C50C-407E-A947-70E740481C1C}">
+                <a14:useLocalDpi xmlns:a14="http://schemas.microsoft.com/office/drawing/2010/main" val="0"/>
+              </a:ext>
+            </a:extLst>
+          </a:blip>
+          <a:stretch>
+            <a:fillRect/>
+          </a:stretch>
+        </p:blipFill>
+        <p:spPr>
+          <a:xfrm>
+            <a:off x="4289381" y="2522207"/>
+            <a:ext cx="3450271" cy="3291840"/>
+          </a:xfrm>
+          <a:prstGeom prst="rect">
+            <a:avLst/>
+          </a:prstGeom>
+        </p:spPr>
+      </p:pic>
     </p:spTree>
     <p:extLst>
       <p:ext uri="{BB962C8B-B14F-4D97-AF65-F5344CB8AC3E}">
@@ -14610,6 +16230,318 @@
   <p:clrMapOvr>
     <a:masterClrMapping/>
   </p:clrMapOvr>
+  <p:timing>
+    <p:tnLst>
+      <p:par>
+        <p:cTn id="1" dur="indefinite" restart="never" nodeType="tmRoot">
+          <p:childTnLst>
+            <p:seq concurrent="1" nextAc="seek">
+              <p:cTn id="2" dur="indefinite" nodeType="mainSeq">
+                <p:childTnLst>
+                  <p:par>
+                    <p:cTn id="3" fill="hold">
+                      <p:stCondLst>
+                        <p:cond delay="indefinite"/>
+                      </p:stCondLst>
+                      <p:childTnLst>
+                        <p:par>
+                          <p:cTn id="4" fill="hold">
+                            <p:stCondLst>
+                              <p:cond delay="0"/>
+                            </p:stCondLst>
+                            <p:childTnLst>
+                              <p:par>
+                                <p:cTn id="5" presetID="10" presetClass="entr" presetSubtype="0" fill="hold" nodeType="clickEffect">
+                                  <p:stCondLst>
+                                    <p:cond delay="0"/>
+                                  </p:stCondLst>
+                                  <p:childTnLst>
+                                    <p:set>
+                                      <p:cBhvr>
+                                        <p:cTn id="6" dur="1" fill="hold">
+                                          <p:stCondLst>
+                                            <p:cond delay="0"/>
+                                          </p:stCondLst>
+                                        </p:cTn>
+                                        <p:tgtEl>
+                                          <p:spTgt spid="6"/>
+                                        </p:tgtEl>
+                                        <p:attrNameLst>
+                                          <p:attrName>style.visibility</p:attrName>
+                                        </p:attrNameLst>
+                                      </p:cBhvr>
+                                      <p:to>
+                                        <p:strVal val="visible"/>
+                                      </p:to>
+                                    </p:set>
+                                    <p:animEffect transition="in" filter="fade">
+                                      <p:cBhvr>
+                                        <p:cTn id="7" dur="500"/>
+                                        <p:tgtEl>
+                                          <p:spTgt spid="6"/>
+                                        </p:tgtEl>
+                                      </p:cBhvr>
+                                    </p:animEffect>
+                                  </p:childTnLst>
+                                </p:cTn>
+                              </p:par>
+                            </p:childTnLst>
+                          </p:cTn>
+                        </p:par>
+                      </p:childTnLst>
+                    </p:cTn>
+                  </p:par>
+                  <p:par>
+                    <p:cTn id="8" fill="hold">
+                      <p:stCondLst>
+                        <p:cond delay="indefinite"/>
+                      </p:stCondLst>
+                      <p:childTnLst>
+                        <p:par>
+                          <p:cTn id="9" fill="hold">
+                            <p:stCondLst>
+                              <p:cond delay="0"/>
+                            </p:stCondLst>
+                            <p:childTnLst>
+                              <p:par>
+                                <p:cTn id="10" presetID="10" presetClass="entr" presetSubtype="0" fill="hold" nodeType="clickEffect">
+                                  <p:stCondLst>
+                                    <p:cond delay="0"/>
+                                  </p:stCondLst>
+                                  <p:childTnLst>
+                                    <p:set>
+                                      <p:cBhvr>
+                                        <p:cTn id="11" dur="1" fill="hold">
+                                          <p:stCondLst>
+                                            <p:cond delay="0"/>
+                                          </p:stCondLst>
+                                        </p:cTn>
+                                        <p:tgtEl>
+                                          <p:spTgt spid="4"/>
+                                        </p:tgtEl>
+                                        <p:attrNameLst>
+                                          <p:attrName>style.visibility</p:attrName>
+                                        </p:attrNameLst>
+                                      </p:cBhvr>
+                                      <p:to>
+                                        <p:strVal val="visible"/>
+                                      </p:to>
+                                    </p:set>
+                                    <p:animEffect transition="in" filter="fade">
+                                      <p:cBhvr>
+                                        <p:cTn id="12" dur="500"/>
+                                        <p:tgtEl>
+                                          <p:spTgt spid="4"/>
+                                        </p:tgtEl>
+                                      </p:cBhvr>
+                                    </p:animEffect>
+                                  </p:childTnLst>
+                                </p:cTn>
+                              </p:par>
+                              <p:par>
+                                <p:cTn id="13" presetID="10" presetClass="entr" presetSubtype="0" fill="hold" nodeType="withEffect">
+                                  <p:stCondLst>
+                                    <p:cond delay="0"/>
+                                  </p:stCondLst>
+                                  <p:childTnLst>
+                                    <p:set>
+                                      <p:cBhvr>
+                                        <p:cTn id="14" dur="1" fill="hold">
+                                          <p:stCondLst>
+                                            <p:cond delay="0"/>
+                                          </p:stCondLst>
+                                        </p:cTn>
+                                        <p:tgtEl>
+                                          <p:spTgt spid="10"/>
+                                        </p:tgtEl>
+                                        <p:attrNameLst>
+                                          <p:attrName>style.visibility</p:attrName>
+                                        </p:attrNameLst>
+                                      </p:cBhvr>
+                                      <p:to>
+                                        <p:strVal val="visible"/>
+                                      </p:to>
+                                    </p:set>
+                                    <p:animEffect transition="in" filter="fade">
+                                      <p:cBhvr>
+                                        <p:cTn id="15" dur="500"/>
+                                        <p:tgtEl>
+                                          <p:spTgt spid="10"/>
+                                        </p:tgtEl>
+                                      </p:cBhvr>
+                                    </p:animEffect>
+                                  </p:childTnLst>
+                                </p:cTn>
+                              </p:par>
+                            </p:childTnLst>
+                          </p:cTn>
+                        </p:par>
+                      </p:childTnLst>
+                    </p:cTn>
+                  </p:par>
+                  <p:par>
+                    <p:cTn id="16" fill="hold">
+                      <p:stCondLst>
+                        <p:cond delay="indefinite"/>
+                      </p:stCondLst>
+                      <p:childTnLst>
+                        <p:par>
+                          <p:cTn id="17" fill="hold">
+                            <p:stCondLst>
+                              <p:cond delay="0"/>
+                            </p:stCondLst>
+                            <p:childTnLst>
+                              <p:par>
+                                <p:cTn id="18" presetID="10" presetClass="entr" presetSubtype="0" fill="hold" nodeType="clickEffect">
+                                  <p:stCondLst>
+                                    <p:cond delay="0"/>
+                                  </p:stCondLst>
+                                  <p:childTnLst>
+                                    <p:set>
+                                      <p:cBhvr>
+                                        <p:cTn id="19" dur="1" fill="hold">
+                                          <p:stCondLst>
+                                            <p:cond delay="0"/>
+                                          </p:stCondLst>
+                                        </p:cTn>
+                                        <p:tgtEl>
+                                          <p:spTgt spid="11"/>
+                                        </p:tgtEl>
+                                        <p:attrNameLst>
+                                          <p:attrName>style.visibility</p:attrName>
+                                        </p:attrNameLst>
+                                      </p:cBhvr>
+                                      <p:to>
+                                        <p:strVal val="visible"/>
+                                      </p:to>
+                                    </p:set>
+                                    <p:animEffect transition="in" filter="fade">
+                                      <p:cBhvr>
+                                        <p:cTn id="20" dur="500"/>
+                                        <p:tgtEl>
+                                          <p:spTgt spid="11"/>
+                                        </p:tgtEl>
+                                      </p:cBhvr>
+                                    </p:animEffect>
+                                  </p:childTnLst>
+                                </p:cTn>
+                              </p:par>
+                            </p:childTnLst>
+                          </p:cTn>
+                        </p:par>
+                      </p:childTnLst>
+                    </p:cTn>
+                  </p:par>
+                  <p:par>
+                    <p:cTn id="21" fill="hold">
+                      <p:stCondLst>
+                        <p:cond delay="indefinite"/>
+                      </p:stCondLst>
+                      <p:childTnLst>
+                        <p:par>
+                          <p:cTn id="22" fill="hold">
+                            <p:stCondLst>
+                              <p:cond delay="0"/>
+                            </p:stCondLst>
+                            <p:childTnLst>
+                              <p:par>
+                                <p:cTn id="23" presetID="10" presetClass="entr" presetSubtype="0" fill="hold" nodeType="clickEffect">
+                                  <p:stCondLst>
+                                    <p:cond delay="0"/>
+                                  </p:stCondLst>
+                                  <p:childTnLst>
+                                    <p:set>
+                                      <p:cBhvr>
+                                        <p:cTn id="24" dur="1" fill="hold">
+                                          <p:stCondLst>
+                                            <p:cond delay="0"/>
+                                          </p:stCondLst>
+                                        </p:cTn>
+                                        <p:tgtEl>
+                                          <p:spTgt spid="7"/>
+                                        </p:tgtEl>
+                                        <p:attrNameLst>
+                                          <p:attrName>style.visibility</p:attrName>
+                                        </p:attrNameLst>
+                                      </p:cBhvr>
+                                      <p:to>
+                                        <p:strVal val="visible"/>
+                                      </p:to>
+                                    </p:set>
+                                    <p:animEffect transition="in" filter="fade">
+                                      <p:cBhvr>
+                                        <p:cTn id="25" dur="500"/>
+                                        <p:tgtEl>
+                                          <p:spTgt spid="7"/>
+                                        </p:tgtEl>
+                                      </p:cBhvr>
+                                    </p:animEffect>
+                                  </p:childTnLst>
+                                </p:cTn>
+                              </p:par>
+                              <p:par>
+                                <p:cTn id="26" presetID="10" presetClass="entr" presetSubtype="0" fill="hold" nodeType="withEffect">
+                                  <p:stCondLst>
+                                    <p:cond delay="0"/>
+                                  </p:stCondLst>
+                                  <p:childTnLst>
+                                    <p:set>
+                                      <p:cBhvr>
+                                        <p:cTn id="27" dur="1" fill="hold">
+                                          <p:stCondLst>
+                                            <p:cond delay="0"/>
+                                          </p:stCondLst>
+                                        </p:cTn>
+                                        <p:tgtEl>
+                                          <p:spTgt spid="8"/>
+                                        </p:tgtEl>
+                                        <p:attrNameLst>
+                                          <p:attrName>style.visibility</p:attrName>
+                                        </p:attrNameLst>
+                                      </p:cBhvr>
+                                      <p:to>
+                                        <p:strVal val="visible"/>
+                                      </p:to>
+                                    </p:set>
+                                    <p:animEffect transition="in" filter="fade">
+                                      <p:cBhvr>
+                                        <p:cTn id="28" dur="500"/>
+                                        <p:tgtEl>
+                                          <p:spTgt spid="8"/>
+                                        </p:tgtEl>
+                                      </p:cBhvr>
+                                    </p:animEffect>
+                                  </p:childTnLst>
+                                </p:cTn>
+                              </p:par>
+                            </p:childTnLst>
+                          </p:cTn>
+                        </p:par>
+                      </p:childTnLst>
+                    </p:cTn>
+                  </p:par>
+                </p:childTnLst>
+              </p:cTn>
+              <p:prevCondLst>
+                <p:cond evt="onPrev" delay="0">
+                  <p:tgtEl>
+                    <p:sldTgt/>
+                  </p:tgtEl>
+                </p:cond>
+              </p:prevCondLst>
+              <p:nextCondLst>
+                <p:cond evt="onNext" delay="0">
+                  <p:tgtEl>
+                    <p:sldTgt/>
+                  </p:tgtEl>
+                </p:cond>
+              </p:nextCondLst>
+            </p:seq>
+          </p:childTnLst>
+        </p:cTn>
+      </p:par>
+    </p:tnLst>
+  </p:timing>
 </p:sld>
 </file>
 
@@ -15158,15 +17090,6 @@
 </file>
 
 <file path=customXml/item1.xml><?xml version="1.0" encoding="utf-8"?>
-<p:properties xmlns:p="http://schemas.microsoft.com/office/2006/metadata/properties" xmlns:xsi="http://www.w3.org/2001/XMLSchema-instance" xmlns:pc="http://schemas.microsoft.com/office/infopath/2007/PartnerControls">
-  <documentManagement>
-    <Status xmlns="71af3243-3dd4-4a8d-8c0d-dd76da1f02a5">Not started</Status>
-    <MediaServiceKeyPoints xmlns="71af3243-3dd4-4a8d-8c0d-dd76da1f02a5" xsi:nil="true"/>
-  </documentManagement>
-</p:properties>
-</file>
-
-<file path=customXml/item2.xml><?xml version="1.0" encoding="utf-8"?>
 <ct:contentTypeSchema xmlns:ct="http://schemas.microsoft.com/office/2006/metadata/contentType" xmlns:ma="http://schemas.microsoft.com/office/2006/metadata/properties/metaAttributes" ct:_="" ma:_="" ma:contentTypeName="Document" ma:contentTypeID="0x01010079F111ED35F8CC479449609E8A0923A6" ma:contentTypeVersion="12" ma:contentTypeDescription="Create a new document." ma:contentTypeScope="" ma:versionID="fa6e671f1cd7e4d96ff9652be322dd5e">
   <xsd:schema xmlns:xsd="http://www.w3.org/2001/XMLSchema" xmlns:xs="http://www.w3.org/2001/XMLSchema" xmlns:p="http://schemas.microsoft.com/office/2006/metadata/properties" xmlns:ns2="71af3243-3dd4-4a8d-8c0d-dd76da1f02a5" xmlns:ns3="16c05727-aa75-4e4a-9b5f-8a80a1165891" targetNamespace="http://schemas.microsoft.com/office/2006/metadata/properties" ma:root="true" ma:fieldsID="4e2496f70b101db0b8013f30a071bbf7" ns2:_="" ns3:_="">
     <xsd:import namespace="71af3243-3dd4-4a8d-8c0d-dd76da1f02a5"/>
@@ -15387,6 +17310,15 @@
 </ct:contentTypeSchema>
 </file>
 
+<file path=customXml/item2.xml><?xml version="1.0" encoding="utf-8"?>
+<p:properties xmlns:p="http://schemas.microsoft.com/office/2006/metadata/properties" xmlns:xsi="http://www.w3.org/2001/XMLSchema-instance" xmlns:pc="http://schemas.microsoft.com/office/infopath/2007/PartnerControls">
+  <documentManagement>
+    <Status xmlns="71af3243-3dd4-4a8d-8c0d-dd76da1f02a5">Not started</Status>
+    <MediaServiceKeyPoints xmlns="71af3243-3dd4-4a8d-8c0d-dd76da1f02a5" xsi:nil="true"/>
+  </documentManagement>
+</p:properties>
+</file>
+
 <file path=customXml/item3.xml><?xml version="1.0" encoding="utf-8"?>
 <?mso-contentType ?>
 <FormTemplates xmlns="http://schemas.microsoft.com/sharepoint/v3/contenttype/forms">
@@ -15397,23 +17329,6 @@
 </file>
 
 <file path=customXml/itemProps1.xml><?xml version="1.0" encoding="utf-8"?>
-<ds:datastoreItem xmlns:ds="http://schemas.openxmlformats.org/officeDocument/2006/customXml" ds:itemID="{44FAF7B5-E40C-46BE-9C83-DA251FCAE61E}">
-  <ds:schemaRefs>
-    <ds:schemaRef ds:uri="http://schemas.openxmlformats.org/package/2006/metadata/core-properties"/>
-    <ds:schemaRef ds:uri="http://purl.org/dc/terms/"/>
-    <ds:schemaRef ds:uri="http://purl.org/dc/elements/1.1/"/>
-    <ds:schemaRef ds:uri="http://schemas.microsoft.com/office/2006/metadata/properties"/>
-    <ds:schemaRef ds:uri="16c05727-aa75-4e4a-9b5f-8a80a1165891"/>
-    <ds:schemaRef ds:uri="71af3243-3dd4-4a8d-8c0d-dd76da1f02a5"/>
-    <ds:schemaRef ds:uri="http://schemas.microsoft.com/office/2006/documentManagement/types"/>
-    <ds:schemaRef ds:uri="http://purl.org/dc/dcmitype/"/>
-    <ds:schemaRef ds:uri="http://schemas.microsoft.com/office/infopath/2007/PartnerControls"/>
-    <ds:schemaRef ds:uri="http://www.w3.org/XML/1998/namespace"/>
-  </ds:schemaRefs>
-</ds:datastoreItem>
-</file>
-
-<file path=customXml/itemProps2.xml><?xml version="1.0" encoding="utf-8"?>
 <ds:datastoreItem xmlns:ds="http://schemas.openxmlformats.org/officeDocument/2006/customXml" ds:itemID="{E0A43D08-F4F9-4D95-9CB2-7DE374416074}">
   <ds:schemaRefs>
     <ds:schemaRef ds:uri="http://schemas.microsoft.com/office/2006/metadata/contentType"/>
@@ -15432,6 +17347,23 @@
 </ds:datastoreItem>
 </file>
 
+<file path=customXml/itemProps2.xml><?xml version="1.0" encoding="utf-8"?>
+<ds:datastoreItem xmlns:ds="http://schemas.openxmlformats.org/officeDocument/2006/customXml" ds:itemID="{44FAF7B5-E40C-46BE-9C83-DA251FCAE61E}">
+  <ds:schemaRefs>
+    <ds:schemaRef ds:uri="http://schemas.openxmlformats.org/package/2006/metadata/core-properties"/>
+    <ds:schemaRef ds:uri="http://purl.org/dc/terms/"/>
+    <ds:schemaRef ds:uri="http://purl.org/dc/elements/1.1/"/>
+    <ds:schemaRef ds:uri="http://schemas.microsoft.com/office/2006/metadata/properties"/>
+    <ds:schemaRef ds:uri="16c05727-aa75-4e4a-9b5f-8a80a1165891"/>
+    <ds:schemaRef ds:uri="71af3243-3dd4-4a8d-8c0d-dd76da1f02a5"/>
+    <ds:schemaRef ds:uri="http://schemas.microsoft.com/office/2006/documentManagement/types"/>
+    <ds:schemaRef ds:uri="http://purl.org/dc/dcmitype/"/>
+    <ds:schemaRef ds:uri="http://schemas.microsoft.com/office/infopath/2007/PartnerControls"/>
+    <ds:schemaRef ds:uri="http://www.w3.org/XML/1998/namespace"/>
+  </ds:schemaRefs>
+</ds:datastoreItem>
+</file>
+
 <file path=customXml/itemProps3.xml><?xml version="1.0" encoding="utf-8"?>
 <ds:datastoreItem xmlns:ds="http://schemas.openxmlformats.org/officeDocument/2006/customXml" ds:itemID="{5029FA76-0C86-4BF1-99F1-A3115FBFFAB0}">
   <ds:schemaRefs>

</xml_diff>